<commit_message>
added slide on RIDL and crosstalk behaveour
</commit_message>
<xml_diff>
--- a/presentation1.pptx
+++ b/presentation1.pptx
@@ -1,21 +1,132 @@
 
 <file path=ppt/presentation.xml><?xml version="1.0" encoding="utf-8"?>
-<p:presentation xmlns:a="http://schemas.openxmlformats.org/drawingml/2006/main" xmlns:p="http://schemas.openxmlformats.org/presentationml/2006/main" xmlns:r="http://schemas.openxmlformats.org/officeDocument/2006/relationships" xmlns:p14="http://schemas.microsoft.com/office/powerpoint/2010/main" xmlns:p15="http://schemas.microsoft.com/office/powerpoint/2012/main" xmlns:mc="http://schemas.openxmlformats.org/markup-compatibility/2006">
+<p:presentation xmlns:a="http://schemas.openxmlformats.org/drawingml/2006/main" xmlns:r="http://schemas.openxmlformats.org/officeDocument/2006/relationships" xmlns:p="http://schemas.openxmlformats.org/presentationml/2006/main">
   <p:sldMasterIdLst>
-    <p:sldMasterId id="2147483648" r:id="rId2"/>
+    <p:sldMasterId id="2147483648" r:id="rId1"/>
   </p:sldMasterIdLst>
   <p:sldIdLst>
-    <p:sldId id="256" r:id="rId3"/>
-    <p:sldId id="257" r:id="rId4"/>
-    <p:sldId id="258" r:id="rId5"/>
+    <p:sldId id="256" r:id="rId2"/>
+    <p:sldId id="257" r:id="rId3"/>
+    <p:sldId id="258" r:id="rId4"/>
+    <p:sldId id="259" r:id="rId5"/>
+    <p:sldId id="260" r:id="rId6"/>
+    <p:sldId id="261" r:id="rId7"/>
+    <p:sldId id="262" r:id="rId8"/>
+    <p:sldId id="264" r:id="rId9"/>
+    <p:sldId id="263" r:id="rId10"/>
   </p:sldIdLst>
   <p:sldSz cx="10080625" cy="5670550"/>
   <p:notesSz cx="7772400" cy="10058400"/>
+  <p:defaultTextStyle>
+    <a:defPPr>
+      <a:defRPr lang="it-IT"/>
+    </a:defPPr>
+    <a:lvl1pPr marL="0" algn="l" defTabSz="914400" rtl="0" eaLnBrk="1" latinLnBrk="0" hangingPunct="1">
+      <a:defRPr sz="1800" kern="1200">
+        <a:solidFill>
+          <a:schemeClr val="tx1"/>
+        </a:solidFill>
+        <a:latin typeface="+mn-lt"/>
+        <a:ea typeface="+mn-ea"/>
+        <a:cs typeface="+mn-cs"/>
+      </a:defRPr>
+    </a:lvl1pPr>
+    <a:lvl2pPr marL="457200" algn="l" defTabSz="914400" rtl="0" eaLnBrk="1" latinLnBrk="0" hangingPunct="1">
+      <a:defRPr sz="1800" kern="1200">
+        <a:solidFill>
+          <a:schemeClr val="tx1"/>
+        </a:solidFill>
+        <a:latin typeface="+mn-lt"/>
+        <a:ea typeface="+mn-ea"/>
+        <a:cs typeface="+mn-cs"/>
+      </a:defRPr>
+    </a:lvl2pPr>
+    <a:lvl3pPr marL="914400" algn="l" defTabSz="914400" rtl="0" eaLnBrk="1" latinLnBrk="0" hangingPunct="1">
+      <a:defRPr sz="1800" kern="1200">
+        <a:solidFill>
+          <a:schemeClr val="tx1"/>
+        </a:solidFill>
+        <a:latin typeface="+mn-lt"/>
+        <a:ea typeface="+mn-ea"/>
+        <a:cs typeface="+mn-cs"/>
+      </a:defRPr>
+    </a:lvl3pPr>
+    <a:lvl4pPr marL="1371600" algn="l" defTabSz="914400" rtl="0" eaLnBrk="1" latinLnBrk="0" hangingPunct="1">
+      <a:defRPr sz="1800" kern="1200">
+        <a:solidFill>
+          <a:schemeClr val="tx1"/>
+        </a:solidFill>
+        <a:latin typeface="+mn-lt"/>
+        <a:ea typeface="+mn-ea"/>
+        <a:cs typeface="+mn-cs"/>
+      </a:defRPr>
+    </a:lvl4pPr>
+    <a:lvl5pPr marL="1828800" algn="l" defTabSz="914400" rtl="0" eaLnBrk="1" latinLnBrk="0" hangingPunct="1">
+      <a:defRPr sz="1800" kern="1200">
+        <a:solidFill>
+          <a:schemeClr val="tx1"/>
+        </a:solidFill>
+        <a:latin typeface="+mn-lt"/>
+        <a:ea typeface="+mn-ea"/>
+        <a:cs typeface="+mn-cs"/>
+      </a:defRPr>
+    </a:lvl5pPr>
+    <a:lvl6pPr marL="2286000" algn="l" defTabSz="914400" rtl="0" eaLnBrk="1" latinLnBrk="0" hangingPunct="1">
+      <a:defRPr sz="1800" kern="1200">
+        <a:solidFill>
+          <a:schemeClr val="tx1"/>
+        </a:solidFill>
+        <a:latin typeface="+mn-lt"/>
+        <a:ea typeface="+mn-ea"/>
+        <a:cs typeface="+mn-cs"/>
+      </a:defRPr>
+    </a:lvl6pPr>
+    <a:lvl7pPr marL="2743200" algn="l" defTabSz="914400" rtl="0" eaLnBrk="1" latinLnBrk="0" hangingPunct="1">
+      <a:defRPr sz="1800" kern="1200">
+        <a:solidFill>
+          <a:schemeClr val="tx1"/>
+        </a:solidFill>
+        <a:latin typeface="+mn-lt"/>
+        <a:ea typeface="+mn-ea"/>
+        <a:cs typeface="+mn-cs"/>
+      </a:defRPr>
+    </a:lvl7pPr>
+    <a:lvl8pPr marL="3200400" algn="l" defTabSz="914400" rtl="0" eaLnBrk="1" latinLnBrk="0" hangingPunct="1">
+      <a:defRPr sz="1800" kern="1200">
+        <a:solidFill>
+          <a:schemeClr val="tx1"/>
+        </a:solidFill>
+        <a:latin typeface="+mn-lt"/>
+        <a:ea typeface="+mn-ea"/>
+        <a:cs typeface="+mn-cs"/>
+      </a:defRPr>
+    </a:lvl8pPr>
+    <a:lvl9pPr marL="3657600" algn="l" defTabSz="914400" rtl="0" eaLnBrk="1" latinLnBrk="0" hangingPunct="1">
+      <a:defRPr sz="1800" kern="1200">
+        <a:solidFill>
+          <a:schemeClr val="tx1"/>
+        </a:solidFill>
+        <a:latin typeface="+mn-lt"/>
+        <a:ea typeface="+mn-ea"/>
+        <a:cs typeface="+mn-cs"/>
+      </a:defRPr>
+    </a:lvl9pPr>
+  </p:defaultTextStyle>
 </p:presentation>
 </file>
 
+<file path=ppt/revisionInfo.xml><?xml version="1.0" encoding="utf-8"?>
+<p1510:revInfo xmlns:a="http://schemas.openxmlformats.org/drawingml/2006/main" xmlns:r="http://schemas.openxmlformats.org/officeDocument/2006/relationships" xmlns:p1510="http://schemas.microsoft.com/office/powerpoint/2015/10/main">
+  <p1510:revLst>
+    <p1510:client id="{2A6379A7-71A9-BF5F-4147-9B14D7A953F0}" v="2600" dt="2021-03-24T20:33:02.347"/>
+    <p1510:client id="{54FD03F3-8CE9-14C0-1B18-DA455FF4301E}" v="1" dt="2021-03-23T10:35:01.490"/>
+    <p1510:client id="{9F58B79F-C06A-2000-CC1C-9360E8F04D69}" v="2" dt="2021-03-24T08:40:16.450"/>
+  </p1510:revLst>
+</p1510:revInfo>
+</file>
+
 <file path=ppt/slideLayouts/slideLayout1.xml><?xml version="1.0" encoding="utf-8"?>
-<p:sldLayout xmlns:a="http://schemas.openxmlformats.org/drawingml/2006/main" xmlns:p="http://schemas.openxmlformats.org/presentationml/2006/main" xmlns:r="http://schemas.openxmlformats.org/officeDocument/2006/relationships" xmlns:p14="http://schemas.microsoft.com/office/powerpoint/2010/main" xmlns:p15="http://schemas.microsoft.com/office/powerpoint/2012/main" xmlns:mc="http://schemas.openxmlformats.org/markup-compatibility/2006" type="blank" preserve="1">
+<p:sldLayout xmlns:a="http://schemas.openxmlformats.org/drawingml/2006/main" xmlns:r="http://schemas.openxmlformats.org/officeDocument/2006/relationships" xmlns:p="http://schemas.openxmlformats.org/presentationml/2006/main" type="blank" preserve="1">
   <p:cSld name="Blank Slide">
     <p:spTree>
       <p:nvGrpSpPr>
@@ -33,11 +144,15 @@
       </p:grpSpPr>
     </p:spTree>
   </p:cSld>
+  <p:clrMapOvr>
+    <a:masterClrMapping/>
+  </p:clrMapOvr>
+  <p:hf hdr="0" dt="0"/>
 </p:sldLayout>
 </file>
 
 <file path=ppt/slideLayouts/slideLayout10.xml><?xml version="1.0" encoding="utf-8"?>
-<p:sldLayout xmlns:a="http://schemas.openxmlformats.org/drawingml/2006/main" xmlns:p="http://schemas.openxmlformats.org/presentationml/2006/main" xmlns:r="http://schemas.openxmlformats.org/officeDocument/2006/relationships" xmlns:p14="http://schemas.microsoft.com/office/powerpoint/2010/main" xmlns:p15="http://schemas.microsoft.com/office/powerpoint/2012/main" xmlns:mc="http://schemas.openxmlformats.org/markup-compatibility/2006" type="objOverTx" preserve="1">
+<p:sldLayout xmlns:a="http://schemas.openxmlformats.org/drawingml/2006/main" xmlns:r="http://schemas.openxmlformats.org/officeDocument/2006/relationships" xmlns:p="http://schemas.openxmlformats.org/presentationml/2006/main" type="objOverTx" preserve="1">
   <p:cSld name="Title, Content over Content">
     <p:spTree>
       <p:nvGrpSpPr>
@@ -73,12 +188,13 @@
           </a:prstGeom>
         </p:spPr>
         <p:txBody>
-          <a:bodyPr lIns="0" rIns="0" tIns="0" bIns="0" anchor="ctr">
+          <a:bodyPr lIns="0" tIns="0" rIns="0" bIns="0" anchor="ctr">
             <a:noAutofit/>
           </a:bodyPr>
+          <a:lstStyle/>
           <a:p>
             <a:pPr algn="ctr"/>
-            <a:endParaRPr b="0" lang="it-IT" sz="4400" spc="-1" strike="noStrike">
+            <a:endParaRPr lang="it-IT" sz="4400" b="0" strike="noStrike" spc="-1">
               <a:latin typeface="Arial"/>
             </a:endParaRPr>
           </a:p>
@@ -104,11 +220,12 @@
           </a:prstGeom>
         </p:spPr>
         <p:txBody>
-          <a:bodyPr lIns="0" rIns="0" tIns="0" bIns="0">
+          <a:bodyPr lIns="0" tIns="0" rIns="0" bIns="0">
             <a:normAutofit/>
           </a:bodyPr>
-          <a:p>
-            <a:endParaRPr b="0" lang="it-IT" sz="3200" spc="-1" strike="noStrike">
+          <a:lstStyle/>
+          <a:p>
+            <a:endParaRPr lang="it-IT" sz="3200" b="0" strike="noStrike" spc="-1">
               <a:latin typeface="Arial"/>
             </a:endParaRPr>
           </a:p>
@@ -134,11 +251,12 @@
           </a:prstGeom>
         </p:spPr>
         <p:txBody>
-          <a:bodyPr lIns="0" rIns="0" tIns="0" bIns="0">
+          <a:bodyPr lIns="0" tIns="0" rIns="0" bIns="0">
             <a:normAutofit/>
           </a:bodyPr>
-          <a:p>
-            <a:endParaRPr b="0" lang="it-IT" sz="3200" spc="-1" strike="noStrike">
+          <a:lstStyle/>
+          <a:p>
+            <a:endParaRPr lang="it-IT" sz="3200" b="0" strike="noStrike" spc="-1">
               <a:latin typeface="Arial"/>
             </a:endParaRPr>
           </a:p>
@@ -146,11 +264,15 @@
       </p:sp>
     </p:spTree>
   </p:cSld>
+  <p:clrMapOvr>
+    <a:masterClrMapping/>
+  </p:clrMapOvr>
+  <p:hf hdr="0" dt="0"/>
 </p:sldLayout>
 </file>
 
 <file path=ppt/slideLayouts/slideLayout11.xml><?xml version="1.0" encoding="utf-8"?>
-<p:sldLayout xmlns:a="http://schemas.openxmlformats.org/drawingml/2006/main" xmlns:p="http://schemas.openxmlformats.org/presentationml/2006/main" xmlns:r="http://schemas.openxmlformats.org/officeDocument/2006/relationships" xmlns:p14="http://schemas.microsoft.com/office/powerpoint/2010/main" xmlns:p15="http://schemas.microsoft.com/office/powerpoint/2012/main" xmlns:mc="http://schemas.openxmlformats.org/markup-compatibility/2006" type="fourObj" preserve="1">
+<p:sldLayout xmlns:a="http://schemas.openxmlformats.org/drawingml/2006/main" xmlns:r="http://schemas.openxmlformats.org/officeDocument/2006/relationships" xmlns:p="http://schemas.openxmlformats.org/presentationml/2006/main" type="fourObj" preserve="1">
   <p:cSld name="Title, 4 Content">
     <p:spTree>
       <p:nvGrpSpPr>
@@ -186,12 +308,13 @@
           </a:prstGeom>
         </p:spPr>
         <p:txBody>
-          <a:bodyPr lIns="0" rIns="0" tIns="0" bIns="0" anchor="ctr">
+          <a:bodyPr lIns="0" tIns="0" rIns="0" bIns="0" anchor="ctr">
             <a:noAutofit/>
           </a:bodyPr>
+          <a:lstStyle/>
           <a:p>
             <a:pPr algn="ctr"/>
-            <a:endParaRPr b="0" lang="it-IT" sz="4400" spc="-1" strike="noStrike">
+            <a:endParaRPr lang="it-IT" sz="4400" b="0" strike="noStrike" spc="-1">
               <a:latin typeface="Arial"/>
             </a:endParaRPr>
           </a:p>
@@ -217,11 +340,12 @@
           </a:prstGeom>
         </p:spPr>
         <p:txBody>
-          <a:bodyPr lIns="0" rIns="0" tIns="0" bIns="0">
+          <a:bodyPr lIns="0" tIns="0" rIns="0" bIns="0">
             <a:normAutofit/>
           </a:bodyPr>
-          <a:p>
-            <a:endParaRPr b="0" lang="it-IT" sz="3200" spc="-1" strike="noStrike">
+          <a:lstStyle/>
+          <a:p>
+            <a:endParaRPr lang="it-IT" sz="3200" b="0" strike="noStrike" spc="-1">
               <a:latin typeface="Arial"/>
             </a:endParaRPr>
           </a:p>
@@ -247,11 +371,12 @@
           </a:prstGeom>
         </p:spPr>
         <p:txBody>
-          <a:bodyPr lIns="0" rIns="0" tIns="0" bIns="0">
+          <a:bodyPr lIns="0" tIns="0" rIns="0" bIns="0">
             <a:normAutofit/>
           </a:bodyPr>
-          <a:p>
-            <a:endParaRPr b="0" lang="it-IT" sz="3200" spc="-1" strike="noStrike">
+          <a:lstStyle/>
+          <a:p>
+            <a:endParaRPr lang="it-IT" sz="3200" b="0" strike="noStrike" spc="-1">
               <a:latin typeface="Arial"/>
             </a:endParaRPr>
           </a:p>
@@ -277,11 +402,12 @@
           </a:prstGeom>
         </p:spPr>
         <p:txBody>
-          <a:bodyPr lIns="0" rIns="0" tIns="0" bIns="0">
+          <a:bodyPr lIns="0" tIns="0" rIns="0" bIns="0">
             <a:normAutofit/>
           </a:bodyPr>
-          <a:p>
-            <a:endParaRPr b="0" lang="it-IT" sz="3200" spc="-1" strike="noStrike">
+          <a:lstStyle/>
+          <a:p>
+            <a:endParaRPr lang="it-IT" sz="3200" b="0" strike="noStrike" spc="-1">
               <a:latin typeface="Arial"/>
             </a:endParaRPr>
           </a:p>
@@ -307,11 +433,12 @@
           </a:prstGeom>
         </p:spPr>
         <p:txBody>
-          <a:bodyPr lIns="0" rIns="0" tIns="0" bIns="0">
+          <a:bodyPr lIns="0" tIns="0" rIns="0" bIns="0">
             <a:normAutofit/>
           </a:bodyPr>
-          <a:p>
-            <a:endParaRPr b="0" lang="it-IT" sz="3200" spc="-1" strike="noStrike">
+          <a:lstStyle/>
+          <a:p>
+            <a:endParaRPr lang="it-IT" sz="3200" b="0" strike="noStrike" spc="-1">
               <a:latin typeface="Arial"/>
             </a:endParaRPr>
           </a:p>
@@ -319,11 +446,15 @@
       </p:sp>
     </p:spTree>
   </p:cSld>
+  <p:clrMapOvr>
+    <a:masterClrMapping/>
+  </p:clrMapOvr>
+  <p:hf hdr="0" dt="0"/>
 </p:sldLayout>
 </file>
 
 <file path=ppt/slideLayouts/slideLayout12.xml><?xml version="1.0" encoding="utf-8"?>
-<p:sldLayout xmlns:a="http://schemas.openxmlformats.org/drawingml/2006/main" xmlns:p="http://schemas.openxmlformats.org/presentationml/2006/main" xmlns:r="http://schemas.openxmlformats.org/officeDocument/2006/relationships" xmlns:p14="http://schemas.microsoft.com/office/powerpoint/2010/main" xmlns:p15="http://schemas.microsoft.com/office/powerpoint/2012/main" xmlns:mc="http://schemas.openxmlformats.org/markup-compatibility/2006" type="blank" preserve="1">
+<p:sldLayout xmlns:a="http://schemas.openxmlformats.org/drawingml/2006/main" xmlns:r="http://schemas.openxmlformats.org/officeDocument/2006/relationships" xmlns:p="http://schemas.openxmlformats.org/presentationml/2006/main" type="blank" preserve="1">
   <p:cSld name="Title, 6 Content">
     <p:spTree>
       <p:nvGrpSpPr>
@@ -359,12 +490,13 @@
           </a:prstGeom>
         </p:spPr>
         <p:txBody>
-          <a:bodyPr lIns="0" rIns="0" tIns="0" bIns="0" anchor="ctr">
+          <a:bodyPr lIns="0" tIns="0" rIns="0" bIns="0" anchor="ctr">
             <a:noAutofit/>
           </a:bodyPr>
+          <a:lstStyle/>
           <a:p>
             <a:pPr algn="ctr"/>
-            <a:endParaRPr b="0" lang="it-IT" sz="4400" spc="-1" strike="noStrike">
+            <a:endParaRPr lang="it-IT" sz="4400" b="0" strike="noStrike" spc="-1">
               <a:latin typeface="Arial"/>
             </a:endParaRPr>
           </a:p>
@@ -390,11 +522,12 @@
           </a:prstGeom>
         </p:spPr>
         <p:txBody>
-          <a:bodyPr lIns="0" rIns="0" tIns="0" bIns="0">
+          <a:bodyPr lIns="0" tIns="0" rIns="0" bIns="0">
             <a:normAutofit/>
           </a:bodyPr>
-          <a:p>
-            <a:endParaRPr b="0" lang="it-IT" sz="3200" spc="-1" strike="noStrike">
+          <a:lstStyle/>
+          <a:p>
+            <a:endParaRPr lang="it-IT" sz="3200" b="0" strike="noStrike" spc="-1">
               <a:latin typeface="Arial"/>
             </a:endParaRPr>
           </a:p>
@@ -420,11 +553,12 @@
           </a:prstGeom>
         </p:spPr>
         <p:txBody>
-          <a:bodyPr lIns="0" rIns="0" tIns="0" bIns="0">
+          <a:bodyPr lIns="0" tIns="0" rIns="0" bIns="0">
             <a:normAutofit/>
           </a:bodyPr>
-          <a:p>
-            <a:endParaRPr b="0" lang="it-IT" sz="3200" spc="-1" strike="noStrike">
+          <a:lstStyle/>
+          <a:p>
+            <a:endParaRPr lang="it-IT" sz="3200" b="0" strike="noStrike" spc="-1">
               <a:latin typeface="Arial"/>
             </a:endParaRPr>
           </a:p>
@@ -450,11 +584,12 @@
           </a:prstGeom>
         </p:spPr>
         <p:txBody>
-          <a:bodyPr lIns="0" rIns="0" tIns="0" bIns="0">
+          <a:bodyPr lIns="0" tIns="0" rIns="0" bIns="0">
             <a:normAutofit/>
           </a:bodyPr>
-          <a:p>
-            <a:endParaRPr b="0" lang="it-IT" sz="3200" spc="-1" strike="noStrike">
+          <a:lstStyle/>
+          <a:p>
+            <a:endParaRPr lang="it-IT" sz="3200" b="0" strike="noStrike" spc="-1">
               <a:latin typeface="Arial"/>
             </a:endParaRPr>
           </a:p>
@@ -480,11 +615,12 @@
           </a:prstGeom>
         </p:spPr>
         <p:txBody>
-          <a:bodyPr lIns="0" rIns="0" tIns="0" bIns="0">
+          <a:bodyPr lIns="0" tIns="0" rIns="0" bIns="0">
             <a:normAutofit/>
           </a:bodyPr>
-          <a:p>
-            <a:endParaRPr b="0" lang="it-IT" sz="3200" spc="-1" strike="noStrike">
+          <a:lstStyle/>
+          <a:p>
+            <a:endParaRPr lang="it-IT" sz="3200" b="0" strike="noStrike" spc="-1">
               <a:latin typeface="Arial"/>
             </a:endParaRPr>
           </a:p>
@@ -510,11 +646,12 @@
           </a:prstGeom>
         </p:spPr>
         <p:txBody>
-          <a:bodyPr lIns="0" rIns="0" tIns="0" bIns="0">
+          <a:bodyPr lIns="0" tIns="0" rIns="0" bIns="0">
             <a:normAutofit/>
           </a:bodyPr>
-          <a:p>
-            <a:endParaRPr b="0" lang="it-IT" sz="3200" spc="-1" strike="noStrike">
+          <a:lstStyle/>
+          <a:p>
+            <a:endParaRPr lang="it-IT" sz="3200" b="0" strike="noStrike" spc="-1">
               <a:latin typeface="Arial"/>
             </a:endParaRPr>
           </a:p>
@@ -540,11 +677,12 @@
           </a:prstGeom>
         </p:spPr>
         <p:txBody>
-          <a:bodyPr lIns="0" rIns="0" tIns="0" bIns="0">
+          <a:bodyPr lIns="0" tIns="0" rIns="0" bIns="0">
             <a:normAutofit/>
           </a:bodyPr>
-          <a:p>
-            <a:endParaRPr b="0" lang="it-IT" sz="3200" spc="-1" strike="noStrike">
+          <a:lstStyle/>
+          <a:p>
+            <a:endParaRPr lang="it-IT" sz="3200" b="0" strike="noStrike" spc="-1">
               <a:latin typeface="Arial"/>
             </a:endParaRPr>
           </a:p>
@@ -552,11 +690,15 @@
       </p:sp>
     </p:spTree>
   </p:cSld>
+  <p:clrMapOvr>
+    <a:masterClrMapping/>
+  </p:clrMapOvr>
+  <p:hf hdr="0" dt="0"/>
 </p:sldLayout>
 </file>
 
 <file path=ppt/slideLayouts/slideLayout2.xml><?xml version="1.0" encoding="utf-8"?>
-<p:sldLayout xmlns:a="http://schemas.openxmlformats.org/drawingml/2006/main" xmlns:p="http://schemas.openxmlformats.org/presentationml/2006/main" xmlns:r="http://schemas.openxmlformats.org/officeDocument/2006/relationships" xmlns:p14="http://schemas.microsoft.com/office/powerpoint/2010/main" xmlns:p15="http://schemas.microsoft.com/office/powerpoint/2012/main" xmlns:mc="http://schemas.openxmlformats.org/markup-compatibility/2006" type="tx" preserve="1">
+<p:sldLayout xmlns:a="http://schemas.openxmlformats.org/drawingml/2006/main" xmlns:r="http://schemas.openxmlformats.org/officeDocument/2006/relationships" xmlns:p="http://schemas.openxmlformats.org/presentationml/2006/main" type="tx" preserve="1">
   <p:cSld name="Title Slide">
     <p:spTree>
       <p:nvGrpSpPr>
@@ -592,12 +734,13 @@
           </a:prstGeom>
         </p:spPr>
         <p:txBody>
-          <a:bodyPr lIns="0" rIns="0" tIns="0" bIns="0" anchor="ctr">
+          <a:bodyPr lIns="0" tIns="0" rIns="0" bIns="0" anchor="ctr">
             <a:noAutofit/>
           </a:bodyPr>
+          <a:lstStyle/>
           <a:p>
             <a:pPr algn="ctr"/>
-            <a:endParaRPr b="0" lang="it-IT" sz="4400" spc="-1" strike="noStrike">
+            <a:endParaRPr lang="it-IT" sz="4400" b="0" strike="noStrike" spc="-1">
               <a:latin typeface="Arial"/>
             </a:endParaRPr>
           </a:p>
@@ -623,12 +766,13 @@
           </a:prstGeom>
         </p:spPr>
         <p:txBody>
-          <a:bodyPr lIns="0" rIns="0" tIns="0" bIns="0" anchor="ctr">
+          <a:bodyPr lIns="0" tIns="0" rIns="0" bIns="0" anchor="ctr">
             <a:noAutofit/>
           </a:bodyPr>
+          <a:lstStyle/>
           <a:p>
             <a:pPr algn="ctr"/>
-            <a:endParaRPr b="0" lang="it-IT" sz="3200" spc="-1" strike="noStrike">
+            <a:endParaRPr lang="it-IT" sz="3200" b="0" strike="noStrike" spc="-1">
               <a:latin typeface="Arial"/>
             </a:endParaRPr>
           </a:p>
@@ -636,11 +780,15 @@
       </p:sp>
     </p:spTree>
   </p:cSld>
+  <p:clrMapOvr>
+    <a:masterClrMapping/>
+  </p:clrMapOvr>
+  <p:hf hdr="0" dt="0"/>
 </p:sldLayout>
 </file>
 
 <file path=ppt/slideLayouts/slideLayout3.xml><?xml version="1.0" encoding="utf-8"?>
-<p:sldLayout xmlns:a="http://schemas.openxmlformats.org/drawingml/2006/main" xmlns:p="http://schemas.openxmlformats.org/presentationml/2006/main" xmlns:r="http://schemas.openxmlformats.org/officeDocument/2006/relationships" xmlns:p14="http://schemas.microsoft.com/office/powerpoint/2010/main" xmlns:p15="http://schemas.microsoft.com/office/powerpoint/2012/main" xmlns:mc="http://schemas.openxmlformats.org/markup-compatibility/2006" type="obj" preserve="1">
+<p:sldLayout xmlns:a="http://schemas.openxmlformats.org/drawingml/2006/main" xmlns:r="http://schemas.openxmlformats.org/officeDocument/2006/relationships" xmlns:p="http://schemas.openxmlformats.org/presentationml/2006/main" type="obj" preserve="1">
   <p:cSld name="Title, Content">
     <p:spTree>
       <p:nvGrpSpPr>
@@ -676,12 +824,13 @@
           </a:prstGeom>
         </p:spPr>
         <p:txBody>
-          <a:bodyPr lIns="0" rIns="0" tIns="0" bIns="0" anchor="ctr">
+          <a:bodyPr lIns="0" tIns="0" rIns="0" bIns="0" anchor="ctr">
             <a:noAutofit/>
           </a:bodyPr>
+          <a:lstStyle/>
           <a:p>
             <a:pPr algn="ctr"/>
-            <a:endParaRPr b="0" lang="it-IT" sz="4400" spc="-1" strike="noStrike">
+            <a:endParaRPr lang="it-IT" sz="4400" b="0" strike="noStrike" spc="-1">
               <a:latin typeface="Arial"/>
             </a:endParaRPr>
           </a:p>
@@ -707,11 +856,12 @@
           </a:prstGeom>
         </p:spPr>
         <p:txBody>
-          <a:bodyPr lIns="0" rIns="0" tIns="0" bIns="0">
+          <a:bodyPr lIns="0" tIns="0" rIns="0" bIns="0">
             <a:normAutofit/>
           </a:bodyPr>
-          <a:p>
-            <a:endParaRPr b="0" lang="it-IT" sz="3200" spc="-1" strike="noStrike">
+          <a:lstStyle/>
+          <a:p>
+            <a:endParaRPr lang="it-IT" sz="3200" b="0" strike="noStrike" spc="-1">
               <a:latin typeface="Arial"/>
             </a:endParaRPr>
           </a:p>
@@ -719,11 +869,15 @@
       </p:sp>
     </p:spTree>
   </p:cSld>
+  <p:clrMapOvr>
+    <a:masterClrMapping/>
+  </p:clrMapOvr>
+  <p:hf hdr="0" dt="0"/>
 </p:sldLayout>
 </file>
 
 <file path=ppt/slideLayouts/slideLayout4.xml><?xml version="1.0" encoding="utf-8"?>
-<p:sldLayout xmlns:a="http://schemas.openxmlformats.org/drawingml/2006/main" xmlns:p="http://schemas.openxmlformats.org/presentationml/2006/main" xmlns:r="http://schemas.openxmlformats.org/officeDocument/2006/relationships" xmlns:p14="http://schemas.microsoft.com/office/powerpoint/2010/main" xmlns:p15="http://schemas.microsoft.com/office/powerpoint/2012/main" xmlns:mc="http://schemas.openxmlformats.org/markup-compatibility/2006" type="twoObj" preserve="1">
+<p:sldLayout xmlns:a="http://schemas.openxmlformats.org/drawingml/2006/main" xmlns:r="http://schemas.openxmlformats.org/officeDocument/2006/relationships" xmlns:p="http://schemas.openxmlformats.org/presentationml/2006/main" type="twoObj" preserve="1">
   <p:cSld name="Title, 2 Content">
     <p:spTree>
       <p:nvGrpSpPr>
@@ -759,12 +913,13 @@
           </a:prstGeom>
         </p:spPr>
         <p:txBody>
-          <a:bodyPr lIns="0" rIns="0" tIns="0" bIns="0" anchor="ctr">
+          <a:bodyPr lIns="0" tIns="0" rIns="0" bIns="0" anchor="ctr">
             <a:noAutofit/>
           </a:bodyPr>
+          <a:lstStyle/>
           <a:p>
             <a:pPr algn="ctr"/>
-            <a:endParaRPr b="0" lang="it-IT" sz="4400" spc="-1" strike="noStrike">
+            <a:endParaRPr lang="it-IT" sz="4400" b="0" strike="noStrike" spc="-1">
               <a:latin typeface="Arial"/>
             </a:endParaRPr>
           </a:p>
@@ -790,11 +945,12 @@
           </a:prstGeom>
         </p:spPr>
         <p:txBody>
-          <a:bodyPr lIns="0" rIns="0" tIns="0" bIns="0">
+          <a:bodyPr lIns="0" tIns="0" rIns="0" bIns="0">
             <a:normAutofit/>
           </a:bodyPr>
-          <a:p>
-            <a:endParaRPr b="0" lang="it-IT" sz="3200" spc="-1" strike="noStrike">
+          <a:lstStyle/>
+          <a:p>
+            <a:endParaRPr lang="it-IT" sz="3200" b="0" strike="noStrike" spc="-1">
               <a:latin typeface="Arial"/>
             </a:endParaRPr>
           </a:p>
@@ -820,11 +976,12 @@
           </a:prstGeom>
         </p:spPr>
         <p:txBody>
-          <a:bodyPr lIns="0" rIns="0" tIns="0" bIns="0">
+          <a:bodyPr lIns="0" tIns="0" rIns="0" bIns="0">
             <a:normAutofit/>
           </a:bodyPr>
-          <a:p>
-            <a:endParaRPr b="0" lang="it-IT" sz="3200" spc="-1" strike="noStrike">
+          <a:lstStyle/>
+          <a:p>
+            <a:endParaRPr lang="it-IT" sz="3200" b="0" strike="noStrike" spc="-1">
               <a:latin typeface="Arial"/>
             </a:endParaRPr>
           </a:p>
@@ -832,11 +989,15 @@
       </p:sp>
     </p:spTree>
   </p:cSld>
+  <p:clrMapOvr>
+    <a:masterClrMapping/>
+  </p:clrMapOvr>
+  <p:hf hdr="0" dt="0"/>
 </p:sldLayout>
 </file>
 
 <file path=ppt/slideLayouts/slideLayout5.xml><?xml version="1.0" encoding="utf-8"?>
-<p:sldLayout xmlns:a="http://schemas.openxmlformats.org/drawingml/2006/main" xmlns:p="http://schemas.openxmlformats.org/presentationml/2006/main" xmlns:r="http://schemas.openxmlformats.org/officeDocument/2006/relationships" xmlns:p14="http://schemas.microsoft.com/office/powerpoint/2010/main" xmlns:p15="http://schemas.microsoft.com/office/powerpoint/2012/main" xmlns:mc="http://schemas.openxmlformats.org/markup-compatibility/2006" type="titleOnly" preserve="1">
+<p:sldLayout xmlns:a="http://schemas.openxmlformats.org/drawingml/2006/main" xmlns:r="http://schemas.openxmlformats.org/officeDocument/2006/relationships" xmlns:p="http://schemas.openxmlformats.org/presentationml/2006/main" type="titleOnly" preserve="1">
   <p:cSld name="Title Only">
     <p:spTree>
       <p:nvGrpSpPr>
@@ -872,12 +1033,13 @@
           </a:prstGeom>
         </p:spPr>
         <p:txBody>
-          <a:bodyPr lIns="0" rIns="0" tIns="0" bIns="0" anchor="ctr">
+          <a:bodyPr lIns="0" tIns="0" rIns="0" bIns="0" anchor="ctr">
             <a:noAutofit/>
           </a:bodyPr>
+          <a:lstStyle/>
           <a:p>
             <a:pPr algn="ctr"/>
-            <a:endParaRPr b="0" lang="it-IT" sz="4400" spc="-1" strike="noStrike">
+            <a:endParaRPr lang="it-IT" sz="4400" b="0" strike="noStrike" spc="-1">
               <a:latin typeface="Arial"/>
             </a:endParaRPr>
           </a:p>
@@ -885,11 +1047,15 @@
       </p:sp>
     </p:spTree>
   </p:cSld>
+  <p:clrMapOvr>
+    <a:masterClrMapping/>
+  </p:clrMapOvr>
+  <p:hf hdr="0" dt="0"/>
 </p:sldLayout>
 </file>
 
 <file path=ppt/slideLayouts/slideLayout6.xml><?xml version="1.0" encoding="utf-8"?>
-<p:sldLayout xmlns:a="http://schemas.openxmlformats.org/drawingml/2006/main" xmlns:p="http://schemas.openxmlformats.org/presentationml/2006/main" xmlns:r="http://schemas.openxmlformats.org/officeDocument/2006/relationships" xmlns:p14="http://schemas.microsoft.com/office/powerpoint/2010/main" xmlns:p15="http://schemas.microsoft.com/office/powerpoint/2012/main" xmlns:mc="http://schemas.openxmlformats.org/markup-compatibility/2006" type="objOnly" preserve="1">
+<p:sldLayout xmlns:a="http://schemas.openxmlformats.org/drawingml/2006/main" xmlns:r="http://schemas.openxmlformats.org/officeDocument/2006/relationships" xmlns:p="http://schemas.openxmlformats.org/presentationml/2006/main" type="objOnly" preserve="1">
   <p:cSld name="Centered Text">
     <p:spTree>
       <p:nvGrpSpPr>
@@ -925,12 +1091,13 @@
           </a:prstGeom>
         </p:spPr>
         <p:txBody>
-          <a:bodyPr lIns="0" rIns="0" tIns="0" bIns="0" anchor="ctr">
+          <a:bodyPr lIns="0" tIns="0" rIns="0" bIns="0" anchor="ctr">
             <a:noAutofit/>
           </a:bodyPr>
+          <a:lstStyle/>
           <a:p>
             <a:pPr algn="ctr"/>
-            <a:endParaRPr b="0" lang="it-IT" sz="3200" spc="-1" strike="noStrike">
+            <a:endParaRPr lang="it-IT" sz="3200" b="0" strike="noStrike" spc="-1">
               <a:latin typeface="Arial"/>
             </a:endParaRPr>
           </a:p>
@@ -938,11 +1105,15 @@
       </p:sp>
     </p:spTree>
   </p:cSld>
+  <p:clrMapOvr>
+    <a:masterClrMapping/>
+  </p:clrMapOvr>
+  <p:hf hdr="0" dt="0"/>
 </p:sldLayout>
 </file>
 
 <file path=ppt/slideLayouts/slideLayout7.xml><?xml version="1.0" encoding="utf-8"?>
-<p:sldLayout xmlns:a="http://schemas.openxmlformats.org/drawingml/2006/main" xmlns:p="http://schemas.openxmlformats.org/presentationml/2006/main" xmlns:r="http://schemas.openxmlformats.org/officeDocument/2006/relationships" xmlns:p14="http://schemas.microsoft.com/office/powerpoint/2010/main" xmlns:p15="http://schemas.microsoft.com/office/powerpoint/2012/main" xmlns:mc="http://schemas.openxmlformats.org/markup-compatibility/2006" type="twoObjAndObj" preserve="1">
+<p:sldLayout xmlns:a="http://schemas.openxmlformats.org/drawingml/2006/main" xmlns:r="http://schemas.openxmlformats.org/officeDocument/2006/relationships" xmlns:p="http://schemas.openxmlformats.org/presentationml/2006/main" type="twoObjAndObj" preserve="1">
   <p:cSld name="Title, 2 Content and Content">
     <p:spTree>
       <p:nvGrpSpPr>
@@ -978,12 +1149,13 @@
           </a:prstGeom>
         </p:spPr>
         <p:txBody>
-          <a:bodyPr lIns="0" rIns="0" tIns="0" bIns="0" anchor="ctr">
+          <a:bodyPr lIns="0" tIns="0" rIns="0" bIns="0" anchor="ctr">
             <a:noAutofit/>
           </a:bodyPr>
+          <a:lstStyle/>
           <a:p>
             <a:pPr algn="ctr"/>
-            <a:endParaRPr b="0" lang="it-IT" sz="4400" spc="-1" strike="noStrike">
+            <a:endParaRPr lang="it-IT" sz="4400" b="0" strike="noStrike" spc="-1">
               <a:latin typeface="Arial"/>
             </a:endParaRPr>
           </a:p>
@@ -1009,11 +1181,12 @@
           </a:prstGeom>
         </p:spPr>
         <p:txBody>
-          <a:bodyPr lIns="0" rIns="0" tIns="0" bIns="0">
+          <a:bodyPr lIns="0" tIns="0" rIns="0" bIns="0">
             <a:normAutofit/>
           </a:bodyPr>
-          <a:p>
-            <a:endParaRPr b="0" lang="it-IT" sz="3200" spc="-1" strike="noStrike">
+          <a:lstStyle/>
+          <a:p>
+            <a:endParaRPr lang="it-IT" sz="3200" b="0" strike="noStrike" spc="-1">
               <a:latin typeface="Arial"/>
             </a:endParaRPr>
           </a:p>
@@ -1039,11 +1212,12 @@
           </a:prstGeom>
         </p:spPr>
         <p:txBody>
-          <a:bodyPr lIns="0" rIns="0" tIns="0" bIns="0">
+          <a:bodyPr lIns="0" tIns="0" rIns="0" bIns="0">
             <a:normAutofit/>
           </a:bodyPr>
-          <a:p>
-            <a:endParaRPr b="0" lang="it-IT" sz="3200" spc="-1" strike="noStrike">
+          <a:lstStyle/>
+          <a:p>
+            <a:endParaRPr lang="it-IT" sz="3200" b="0" strike="noStrike" spc="-1">
               <a:latin typeface="Arial"/>
             </a:endParaRPr>
           </a:p>
@@ -1069,11 +1243,12 @@
           </a:prstGeom>
         </p:spPr>
         <p:txBody>
-          <a:bodyPr lIns="0" rIns="0" tIns="0" bIns="0">
+          <a:bodyPr lIns="0" tIns="0" rIns="0" bIns="0">
             <a:normAutofit/>
           </a:bodyPr>
-          <a:p>
-            <a:endParaRPr b="0" lang="it-IT" sz="3200" spc="-1" strike="noStrike">
+          <a:lstStyle/>
+          <a:p>
+            <a:endParaRPr lang="it-IT" sz="3200" b="0" strike="noStrike" spc="-1">
               <a:latin typeface="Arial"/>
             </a:endParaRPr>
           </a:p>
@@ -1081,11 +1256,15 @@
       </p:sp>
     </p:spTree>
   </p:cSld>
+  <p:clrMapOvr>
+    <a:masterClrMapping/>
+  </p:clrMapOvr>
+  <p:hf hdr="0" dt="0"/>
 </p:sldLayout>
 </file>
 
 <file path=ppt/slideLayouts/slideLayout8.xml><?xml version="1.0" encoding="utf-8"?>
-<p:sldLayout xmlns:a="http://schemas.openxmlformats.org/drawingml/2006/main" xmlns:p="http://schemas.openxmlformats.org/presentationml/2006/main" xmlns:r="http://schemas.openxmlformats.org/officeDocument/2006/relationships" xmlns:p14="http://schemas.microsoft.com/office/powerpoint/2010/main" xmlns:p15="http://schemas.microsoft.com/office/powerpoint/2012/main" xmlns:mc="http://schemas.openxmlformats.org/markup-compatibility/2006" type="objAndTwoObj" preserve="1">
+<p:sldLayout xmlns:a="http://schemas.openxmlformats.org/drawingml/2006/main" xmlns:r="http://schemas.openxmlformats.org/officeDocument/2006/relationships" xmlns:p="http://schemas.openxmlformats.org/presentationml/2006/main" type="objAndTwoObj" preserve="1">
   <p:cSld name="Title Content and 2 Content">
     <p:spTree>
       <p:nvGrpSpPr>
@@ -1121,12 +1300,13 @@
           </a:prstGeom>
         </p:spPr>
         <p:txBody>
-          <a:bodyPr lIns="0" rIns="0" tIns="0" bIns="0" anchor="ctr">
+          <a:bodyPr lIns="0" tIns="0" rIns="0" bIns="0" anchor="ctr">
             <a:noAutofit/>
           </a:bodyPr>
+          <a:lstStyle/>
           <a:p>
             <a:pPr algn="ctr"/>
-            <a:endParaRPr b="0" lang="it-IT" sz="4400" spc="-1" strike="noStrike">
+            <a:endParaRPr lang="it-IT" sz="4400" b="0" strike="noStrike" spc="-1">
               <a:latin typeface="Arial"/>
             </a:endParaRPr>
           </a:p>
@@ -1152,11 +1332,12 @@
           </a:prstGeom>
         </p:spPr>
         <p:txBody>
-          <a:bodyPr lIns="0" rIns="0" tIns="0" bIns="0">
+          <a:bodyPr lIns="0" tIns="0" rIns="0" bIns="0">
             <a:normAutofit/>
           </a:bodyPr>
-          <a:p>
-            <a:endParaRPr b="0" lang="it-IT" sz="3200" spc="-1" strike="noStrike">
+          <a:lstStyle/>
+          <a:p>
+            <a:endParaRPr lang="it-IT" sz="3200" b="0" strike="noStrike" spc="-1">
               <a:latin typeface="Arial"/>
             </a:endParaRPr>
           </a:p>
@@ -1182,11 +1363,12 @@
           </a:prstGeom>
         </p:spPr>
         <p:txBody>
-          <a:bodyPr lIns="0" rIns="0" tIns="0" bIns="0">
+          <a:bodyPr lIns="0" tIns="0" rIns="0" bIns="0">
             <a:normAutofit/>
           </a:bodyPr>
-          <a:p>
-            <a:endParaRPr b="0" lang="it-IT" sz="3200" spc="-1" strike="noStrike">
+          <a:lstStyle/>
+          <a:p>
+            <a:endParaRPr lang="it-IT" sz="3200" b="0" strike="noStrike" spc="-1">
               <a:latin typeface="Arial"/>
             </a:endParaRPr>
           </a:p>
@@ -1212,11 +1394,12 @@
           </a:prstGeom>
         </p:spPr>
         <p:txBody>
-          <a:bodyPr lIns="0" rIns="0" tIns="0" bIns="0">
+          <a:bodyPr lIns="0" tIns="0" rIns="0" bIns="0">
             <a:normAutofit/>
           </a:bodyPr>
-          <a:p>
-            <a:endParaRPr b="0" lang="it-IT" sz="3200" spc="-1" strike="noStrike">
+          <a:lstStyle/>
+          <a:p>
+            <a:endParaRPr lang="it-IT" sz="3200" b="0" strike="noStrike" spc="-1">
               <a:latin typeface="Arial"/>
             </a:endParaRPr>
           </a:p>
@@ -1224,11 +1407,15 @@
       </p:sp>
     </p:spTree>
   </p:cSld>
+  <p:clrMapOvr>
+    <a:masterClrMapping/>
+  </p:clrMapOvr>
+  <p:hf hdr="0" dt="0"/>
 </p:sldLayout>
 </file>
 
 <file path=ppt/slideLayouts/slideLayout9.xml><?xml version="1.0" encoding="utf-8"?>
-<p:sldLayout xmlns:a="http://schemas.openxmlformats.org/drawingml/2006/main" xmlns:p="http://schemas.openxmlformats.org/presentationml/2006/main" xmlns:r="http://schemas.openxmlformats.org/officeDocument/2006/relationships" xmlns:p14="http://schemas.microsoft.com/office/powerpoint/2010/main" xmlns:p15="http://schemas.microsoft.com/office/powerpoint/2012/main" xmlns:mc="http://schemas.openxmlformats.org/markup-compatibility/2006" type="twoObjOverTx" preserve="1">
+<p:sldLayout xmlns:a="http://schemas.openxmlformats.org/drawingml/2006/main" xmlns:r="http://schemas.openxmlformats.org/officeDocument/2006/relationships" xmlns:p="http://schemas.openxmlformats.org/presentationml/2006/main" type="twoObjOverTx" preserve="1">
   <p:cSld name="Title, 2 Content over Content">
     <p:spTree>
       <p:nvGrpSpPr>
@@ -1264,12 +1451,13 @@
           </a:prstGeom>
         </p:spPr>
         <p:txBody>
-          <a:bodyPr lIns="0" rIns="0" tIns="0" bIns="0" anchor="ctr">
+          <a:bodyPr lIns="0" tIns="0" rIns="0" bIns="0" anchor="ctr">
             <a:noAutofit/>
           </a:bodyPr>
+          <a:lstStyle/>
           <a:p>
             <a:pPr algn="ctr"/>
-            <a:endParaRPr b="0" lang="it-IT" sz="4400" spc="-1" strike="noStrike">
+            <a:endParaRPr lang="it-IT" sz="4400" b="0" strike="noStrike" spc="-1">
               <a:latin typeface="Arial"/>
             </a:endParaRPr>
           </a:p>
@@ -1295,11 +1483,12 @@
           </a:prstGeom>
         </p:spPr>
         <p:txBody>
-          <a:bodyPr lIns="0" rIns="0" tIns="0" bIns="0">
+          <a:bodyPr lIns="0" tIns="0" rIns="0" bIns="0">
             <a:normAutofit/>
           </a:bodyPr>
-          <a:p>
-            <a:endParaRPr b="0" lang="it-IT" sz="3200" spc="-1" strike="noStrike">
+          <a:lstStyle/>
+          <a:p>
+            <a:endParaRPr lang="it-IT" sz="3200" b="0" strike="noStrike" spc="-1">
               <a:latin typeface="Arial"/>
             </a:endParaRPr>
           </a:p>
@@ -1325,11 +1514,12 @@
           </a:prstGeom>
         </p:spPr>
         <p:txBody>
-          <a:bodyPr lIns="0" rIns="0" tIns="0" bIns="0">
+          <a:bodyPr lIns="0" tIns="0" rIns="0" bIns="0">
             <a:normAutofit/>
           </a:bodyPr>
-          <a:p>
-            <a:endParaRPr b="0" lang="it-IT" sz="3200" spc="-1" strike="noStrike">
+          <a:lstStyle/>
+          <a:p>
+            <a:endParaRPr lang="it-IT" sz="3200" b="0" strike="noStrike" spc="-1">
               <a:latin typeface="Arial"/>
             </a:endParaRPr>
           </a:p>
@@ -1355,11 +1545,12 @@
           </a:prstGeom>
         </p:spPr>
         <p:txBody>
-          <a:bodyPr lIns="0" rIns="0" tIns="0" bIns="0">
+          <a:bodyPr lIns="0" tIns="0" rIns="0" bIns="0">
             <a:normAutofit/>
           </a:bodyPr>
-          <a:p>
-            <a:endParaRPr b="0" lang="it-IT" sz="3200" spc="-1" strike="noStrike">
+          <a:lstStyle/>
+          <a:p>
+            <a:endParaRPr lang="it-IT" sz="3200" b="0" strike="noStrike" spc="-1">
               <a:latin typeface="Arial"/>
             </a:endParaRPr>
           </a:p>
@@ -1367,12 +1558,21 @@
       </p:sp>
     </p:spTree>
   </p:cSld>
+  <p:clrMapOvr>
+    <a:masterClrMapping/>
+  </p:clrMapOvr>
+  <p:hf hdr="0" dt="0"/>
 </p:sldLayout>
 </file>
 
 <file path=ppt/slideMasters/slideMaster1.xml><?xml version="1.0" encoding="utf-8"?>
-<p:sldMaster xmlns:a="http://schemas.openxmlformats.org/drawingml/2006/main" xmlns:p="http://schemas.openxmlformats.org/presentationml/2006/main" xmlns:r="http://schemas.openxmlformats.org/officeDocument/2006/relationships" xmlns:p14="http://schemas.microsoft.com/office/powerpoint/2010/main" xmlns:p15="http://schemas.microsoft.com/office/powerpoint/2012/main" xmlns:mc="http://schemas.openxmlformats.org/markup-compatibility/2006">
+<p:sldMaster xmlns:a="http://schemas.openxmlformats.org/drawingml/2006/main" xmlns:r="http://schemas.openxmlformats.org/officeDocument/2006/relationships" xmlns:p="http://schemas.openxmlformats.org/presentationml/2006/main">
   <p:cSld>
+    <p:bg>
+      <p:bgRef idx="1001">
+        <a:schemeClr val="bg1"/>
+      </p:bgRef>
+    </p:bg>
     <p:spTree>
       <p:nvGrpSpPr>
         <p:cNvPr id="1" name=""/>
@@ -1389,7 +1589,7 @@
       </p:grpSpPr>
       <p:sp>
         <p:nvSpPr>
-          <p:cNvPr id="0" name="PlaceHolder 1"/>
+          <p:cNvPr id="5" name="PlaceHolder 1"/>
           <p:cNvSpPr>
             <a:spLocks noGrp="1"/>
           </p:cNvSpPr>
@@ -1407,26 +1607,24 @@
           </a:prstGeom>
         </p:spPr>
         <p:txBody>
-          <a:bodyPr lIns="0" rIns="0" tIns="0" bIns="0" anchor="ctr">
+          <a:bodyPr lIns="0" tIns="0" rIns="0" bIns="0" anchor="ctr">
             <a:noAutofit/>
           </a:bodyPr>
+          <a:lstStyle/>
           <a:p>
             <a:pPr algn="ctr"/>
             <a:r>
-              <a:rPr b="0" lang="it-IT" sz="4400" spc="-1" strike="noStrike">
+              <a:rPr lang="it-IT" sz="4400" b="0" strike="noStrike" spc="-1">
                 <a:latin typeface="Arial"/>
               </a:rPr>
               <a:t>Click to edit the title text format</a:t>
             </a:r>
-            <a:endParaRPr b="0" lang="it-IT" sz="4400" spc="-1" strike="noStrike">
-              <a:latin typeface="Arial"/>
-            </a:endParaRPr>
-          </a:p>
-        </p:txBody>
-      </p:sp>
-      <p:sp>
-        <p:nvSpPr>
-          <p:cNvPr id="1" name="PlaceHolder 2"/>
+          </a:p>
+        </p:txBody>
+      </p:sp>
+      <p:sp>
+        <p:nvSpPr>
+          <p:cNvPr id="6" name="PlaceHolder 2"/>
           <p:cNvSpPr>
             <a:spLocks noGrp="1"/>
           </p:cNvSpPr>
@@ -1444,9 +1642,10 @@
           </a:prstGeom>
         </p:spPr>
         <p:txBody>
-          <a:bodyPr lIns="0" rIns="0" tIns="0" bIns="0">
+          <a:bodyPr lIns="0" tIns="0" rIns="0" bIns="0">
             <a:normAutofit/>
           </a:bodyPr>
+          <a:lstStyle/>
           <a:p>
             <a:pPr marL="432000" indent="-324000">
               <a:spcBef>
@@ -1460,17 +1659,14 @@
               <a:buChar char=""/>
             </a:pPr>
             <a:r>
-              <a:rPr b="0" lang="it-IT" sz="3200" spc="-1" strike="noStrike">
+              <a:rPr lang="it-IT" sz="3200" b="0" strike="noStrike" spc="-1">
                 <a:latin typeface="Arial"/>
               </a:rPr>
               <a:t>Click to edit the outline text format</a:t>
             </a:r>
-            <a:endParaRPr b="0" lang="it-IT" sz="3200" spc="-1" strike="noStrike">
-              <a:latin typeface="Arial"/>
-            </a:endParaRPr>
-          </a:p>
-          <a:p>
-            <a:pPr lvl="1" marL="864000" indent="-324000">
+          </a:p>
+          <a:p>
+            <a:pPr marL="864000" lvl="1" indent="-324000">
               <a:spcBef>
                 <a:spcPts val="1134"/>
               </a:spcBef>
@@ -1482,17 +1678,14 @@
               <a:buChar char=""/>
             </a:pPr>
             <a:r>
-              <a:rPr b="0" lang="it-IT" sz="2800" spc="-1" strike="noStrike">
+              <a:rPr lang="it-IT" sz="2800" b="0" strike="noStrike" spc="-1">
                 <a:latin typeface="Arial"/>
               </a:rPr>
               <a:t>Second Outline Level</a:t>
             </a:r>
-            <a:endParaRPr b="0" lang="it-IT" sz="2800" spc="-1" strike="noStrike">
-              <a:latin typeface="Arial"/>
-            </a:endParaRPr>
-          </a:p>
-          <a:p>
-            <a:pPr lvl="2" marL="1296000" indent="-288000">
+          </a:p>
+          <a:p>
+            <a:pPr marL="1296000" lvl="2" indent="-288000">
               <a:spcBef>
                 <a:spcPts val="850"/>
               </a:spcBef>
@@ -1504,17 +1697,14 @@
               <a:buChar char=""/>
             </a:pPr>
             <a:r>
-              <a:rPr b="0" lang="it-IT" sz="2400" spc="-1" strike="noStrike">
+              <a:rPr lang="it-IT" sz="2400" b="0" strike="noStrike" spc="-1">
                 <a:latin typeface="Arial"/>
               </a:rPr>
               <a:t>Third Outline Level</a:t>
             </a:r>
-            <a:endParaRPr b="0" lang="it-IT" sz="2400" spc="-1" strike="noStrike">
-              <a:latin typeface="Arial"/>
-            </a:endParaRPr>
-          </a:p>
-          <a:p>
-            <a:pPr lvl="3" marL="1728000" indent="-216000">
+          </a:p>
+          <a:p>
+            <a:pPr marL="1728000" lvl="3" indent="-216000">
               <a:spcBef>
                 <a:spcPts val="567"/>
               </a:spcBef>
@@ -1526,17 +1716,14 @@
               <a:buChar char=""/>
             </a:pPr>
             <a:r>
-              <a:rPr b="0" lang="it-IT" sz="2000" spc="-1" strike="noStrike">
+              <a:rPr lang="it-IT" sz="2000" b="0" strike="noStrike" spc="-1">
                 <a:latin typeface="Arial"/>
               </a:rPr>
               <a:t>Fourth Outline Level</a:t>
             </a:r>
-            <a:endParaRPr b="0" lang="it-IT" sz="2000" spc="-1" strike="noStrike">
-              <a:latin typeface="Arial"/>
-            </a:endParaRPr>
-          </a:p>
-          <a:p>
-            <a:pPr lvl="4" marL="2160000" indent="-216000">
+          </a:p>
+          <a:p>
+            <a:pPr marL="2160000" lvl="4" indent="-216000">
               <a:spcBef>
                 <a:spcPts val="283"/>
               </a:spcBef>
@@ -1548,17 +1735,14 @@
               <a:buChar char=""/>
             </a:pPr>
             <a:r>
-              <a:rPr b="0" lang="it-IT" sz="2000" spc="-1" strike="noStrike">
+              <a:rPr lang="it-IT" sz="2000" b="0" strike="noStrike" spc="-1">
                 <a:latin typeface="Arial"/>
               </a:rPr>
               <a:t>Fifth Outline Level</a:t>
             </a:r>
-            <a:endParaRPr b="0" lang="it-IT" sz="2000" spc="-1" strike="noStrike">
-              <a:latin typeface="Arial"/>
-            </a:endParaRPr>
-          </a:p>
-          <a:p>
-            <a:pPr lvl="5" marL="2592000" indent="-216000">
+          </a:p>
+          <a:p>
+            <a:pPr marL="2592000" lvl="5" indent="-216000">
               <a:spcBef>
                 <a:spcPts val="283"/>
               </a:spcBef>
@@ -1570,17 +1754,14 @@
               <a:buChar char=""/>
             </a:pPr>
             <a:r>
-              <a:rPr b="0" lang="it-IT" sz="2000" spc="-1" strike="noStrike">
+              <a:rPr lang="it-IT" sz="2000" b="0" strike="noStrike" spc="-1">
                 <a:latin typeface="Arial"/>
               </a:rPr>
               <a:t>Sixth Outline Level</a:t>
             </a:r>
-            <a:endParaRPr b="0" lang="it-IT" sz="2000" spc="-1" strike="noStrike">
-              <a:latin typeface="Arial"/>
-            </a:endParaRPr>
-          </a:p>
-          <a:p>
-            <a:pPr lvl="6" marL="3024000" indent="-216000">
+          </a:p>
+          <a:p>
+            <a:pPr marL="3024000" lvl="6" indent="-216000">
               <a:spcBef>
                 <a:spcPts val="283"/>
               </a:spcBef>
@@ -1592,14 +1773,11 @@
               <a:buChar char=""/>
             </a:pPr>
             <a:r>
-              <a:rPr b="0" lang="it-IT" sz="2000" spc="-1" strike="noStrike">
+              <a:rPr lang="it-IT" sz="2000" b="0" strike="noStrike" spc="-1">
                 <a:latin typeface="Arial"/>
               </a:rPr>
               <a:t>Seventh Outline Level</a:t>
             </a:r>
-            <a:endParaRPr b="0" lang="it-IT" sz="2000" spc="-1" strike="noStrike">
-              <a:latin typeface="Arial"/>
-            </a:endParaRPr>
           </a:p>
         </p:txBody>
       </p:sp>
@@ -1623,19 +1801,17 @@
           </a:prstGeom>
         </p:spPr>
         <p:txBody>
-          <a:bodyPr lIns="0" rIns="0" tIns="0" bIns="0">
+          <a:bodyPr lIns="0" tIns="0" rIns="0" bIns="0">
             <a:noAutofit/>
           </a:bodyPr>
-          <a:p>
-            <a:r>
-              <a:rPr b="0" lang="it-IT" sz="1400" spc="-1" strike="noStrike">
+          <a:lstStyle/>
+          <a:p>
+            <a:r>
+              <a:rPr lang="it-IT" sz="1400" b="0" strike="noStrike" spc="-1">
                 <a:latin typeface="Times New Roman"/>
               </a:rPr>
               <a:t>&lt;date/time&gt;</a:t>
             </a:r>
-            <a:endParaRPr b="0" lang="it-IT" sz="1400" spc="-1" strike="noStrike">
-              <a:latin typeface="Times New Roman"/>
-            </a:endParaRPr>
           </a:p>
         </p:txBody>
       </p:sp>
@@ -1659,20 +1835,18 @@
           </a:prstGeom>
         </p:spPr>
         <p:txBody>
-          <a:bodyPr lIns="0" rIns="0" tIns="0" bIns="0">
+          <a:bodyPr lIns="0" tIns="0" rIns="0" bIns="0">
             <a:noAutofit/>
           </a:bodyPr>
+          <a:lstStyle/>
           <a:p>
             <a:pPr algn="ctr"/>
             <a:r>
-              <a:rPr b="0" lang="it-IT" sz="1400" spc="-1" strike="noStrike">
+              <a:rPr lang="it-IT" sz="1400" b="0" strike="noStrike" spc="-1">
                 <a:latin typeface="Times New Roman"/>
               </a:rPr>
-              <a:t>&lt;footer&gt;</a:t>
-            </a:r>
-            <a:endParaRPr b="0" lang="it-IT" sz="1400" spc="-1" strike="noStrike">
-              <a:latin typeface="Times New Roman"/>
-            </a:endParaRPr>
+              <a:t>S. van Schaik et al., "RIDL: Rogue In-Flight Data Load," 2019 IEEE Symposium on Security and Privacy (SP), San Francisco, CA, USA, 2019, pp. 88-105, doi: 10.1109/SP.2019.00087.</a:t>
+            </a:r>
           </a:p>
         </p:txBody>
       </p:sp>
@@ -1696,18 +1870,19 @@
           </a:prstGeom>
         </p:spPr>
         <p:txBody>
-          <a:bodyPr lIns="0" rIns="0" tIns="0" bIns="0">
+          <a:bodyPr lIns="0" tIns="0" rIns="0" bIns="0">
             <a:noAutofit/>
           </a:bodyPr>
+          <a:lstStyle/>
           <a:p>
             <a:pPr algn="r"/>
             <a:fld id="{0D913F28-B219-4777-A2D2-DBC72AD66505}" type="slidenum">
-              <a:rPr b="0" lang="it-IT" sz="1400" spc="-1" strike="noStrike">
+              <a:rPr lang="it-IT" sz="1400" b="0" strike="noStrike" spc="-1">
                 <a:latin typeface="Times New Roman"/>
               </a:rPr>
-              <a:t>&lt;number&gt;</a:t>
+              <a:t>‹N›</a:t>
             </a:fld>
-            <a:endParaRPr b="0" lang="it-IT" sz="1400" spc="-1" strike="noStrike">
+            <a:endParaRPr lang="it-IT" sz="1400" b="0" strike="noStrike" spc="-1">
               <a:latin typeface="Times New Roman"/>
             </a:endParaRPr>
           </a:p>
@@ -1715,26 +1890,307 @@
       </p:sp>
     </p:spTree>
   </p:cSld>
-  <p:clrMap bg1="lt1" bg2="lt2" tx1="dk1" tx2="dk2" accent1="accent1" accent2="accent2" accent3="accent3" accent4="accent4" accent5="accent5" accent6="accent6" hlink="hlink" folHlink="folHlink"/>
+  <p:clrMap bg1="lt1" tx1="dk1" bg2="lt2" tx2="dk2" accent1="accent1" accent2="accent2" accent3="accent3" accent4="accent4" accent5="accent5" accent6="accent6" hlink="hlink" folHlink="folHlink"/>
   <p:sldLayoutIdLst>
-    <p:sldLayoutId id="2147483649" r:id="rId2"/>
-    <p:sldLayoutId id="2147483650" r:id="rId3"/>
-    <p:sldLayoutId id="2147483651" r:id="rId4"/>
-    <p:sldLayoutId id="2147483652" r:id="rId5"/>
-    <p:sldLayoutId id="2147483653" r:id="rId6"/>
-    <p:sldLayoutId id="2147483654" r:id="rId7"/>
-    <p:sldLayoutId id="2147483655" r:id="rId8"/>
-    <p:sldLayoutId id="2147483656" r:id="rId9"/>
-    <p:sldLayoutId id="2147483657" r:id="rId10"/>
-    <p:sldLayoutId id="2147483658" r:id="rId11"/>
-    <p:sldLayoutId id="2147483659" r:id="rId12"/>
-    <p:sldLayoutId id="2147483660" r:id="rId13"/>
+    <p:sldLayoutId id="2147483649" r:id="rId1"/>
+    <p:sldLayoutId id="2147483650" r:id="rId2"/>
+    <p:sldLayoutId id="2147483651" r:id="rId3"/>
+    <p:sldLayoutId id="2147483652" r:id="rId4"/>
+    <p:sldLayoutId id="2147483653" r:id="rId5"/>
+    <p:sldLayoutId id="2147483654" r:id="rId6"/>
+    <p:sldLayoutId id="2147483655" r:id="rId7"/>
+    <p:sldLayoutId id="2147483656" r:id="rId8"/>
+    <p:sldLayoutId id="2147483657" r:id="rId9"/>
+    <p:sldLayoutId id="2147483658" r:id="rId10"/>
+    <p:sldLayoutId id="2147483659" r:id="rId11"/>
+    <p:sldLayoutId id="2147483660" r:id="rId12"/>
   </p:sldLayoutIdLst>
+  <p:hf hdr="0" dt="0"/>
+  <p:txStyles>
+    <p:titleStyle>
+      <a:lvl1pPr algn="l" defTabSz="914400" rtl="0" eaLnBrk="1" latinLnBrk="0" hangingPunct="1">
+        <a:lnSpc>
+          <a:spcPct val="90000"/>
+        </a:lnSpc>
+        <a:spcBef>
+          <a:spcPct val="0"/>
+        </a:spcBef>
+        <a:buNone/>
+        <a:defRPr sz="4400" kern="1200">
+          <a:solidFill>
+            <a:schemeClr val="tx1"/>
+          </a:solidFill>
+          <a:latin typeface="+mj-lt"/>
+          <a:ea typeface="+mj-ea"/>
+          <a:cs typeface="+mj-cs"/>
+        </a:defRPr>
+      </a:lvl1pPr>
+    </p:titleStyle>
+    <p:bodyStyle>
+      <a:lvl1pPr marL="228600" indent="-228600" algn="l" defTabSz="914400" rtl="0" eaLnBrk="1" latinLnBrk="0" hangingPunct="1">
+        <a:lnSpc>
+          <a:spcPct val="90000"/>
+        </a:lnSpc>
+        <a:spcBef>
+          <a:spcPts val="1000"/>
+        </a:spcBef>
+        <a:buFont typeface="Arial" panose="020B0604020202020204" pitchFamily="34" charset="0"/>
+        <a:buChar char="•"/>
+        <a:defRPr sz="2800" kern="1200">
+          <a:solidFill>
+            <a:schemeClr val="tx1"/>
+          </a:solidFill>
+          <a:latin typeface="+mn-lt"/>
+          <a:ea typeface="+mn-ea"/>
+          <a:cs typeface="+mn-cs"/>
+        </a:defRPr>
+      </a:lvl1pPr>
+      <a:lvl2pPr marL="685800" indent="-228600" algn="l" defTabSz="914400" rtl="0" eaLnBrk="1" latinLnBrk="0" hangingPunct="1">
+        <a:lnSpc>
+          <a:spcPct val="90000"/>
+        </a:lnSpc>
+        <a:spcBef>
+          <a:spcPts val="500"/>
+        </a:spcBef>
+        <a:buFont typeface="Arial" panose="020B0604020202020204" pitchFamily="34" charset="0"/>
+        <a:buChar char="•"/>
+        <a:defRPr sz="2400" kern="1200">
+          <a:solidFill>
+            <a:schemeClr val="tx1"/>
+          </a:solidFill>
+          <a:latin typeface="+mn-lt"/>
+          <a:ea typeface="+mn-ea"/>
+          <a:cs typeface="+mn-cs"/>
+        </a:defRPr>
+      </a:lvl2pPr>
+      <a:lvl3pPr marL="1143000" indent="-228600" algn="l" defTabSz="914400" rtl="0" eaLnBrk="1" latinLnBrk="0" hangingPunct="1">
+        <a:lnSpc>
+          <a:spcPct val="90000"/>
+        </a:lnSpc>
+        <a:spcBef>
+          <a:spcPts val="500"/>
+        </a:spcBef>
+        <a:buFont typeface="Arial" panose="020B0604020202020204" pitchFamily="34" charset="0"/>
+        <a:buChar char="•"/>
+        <a:defRPr sz="2000" kern="1200">
+          <a:solidFill>
+            <a:schemeClr val="tx1"/>
+          </a:solidFill>
+          <a:latin typeface="+mn-lt"/>
+          <a:ea typeface="+mn-ea"/>
+          <a:cs typeface="+mn-cs"/>
+        </a:defRPr>
+      </a:lvl3pPr>
+      <a:lvl4pPr marL="1600200" indent="-228600" algn="l" defTabSz="914400" rtl="0" eaLnBrk="1" latinLnBrk="0" hangingPunct="1">
+        <a:lnSpc>
+          <a:spcPct val="90000"/>
+        </a:lnSpc>
+        <a:spcBef>
+          <a:spcPts val="500"/>
+        </a:spcBef>
+        <a:buFont typeface="Arial" panose="020B0604020202020204" pitchFamily="34" charset="0"/>
+        <a:buChar char="•"/>
+        <a:defRPr sz="1800" kern="1200">
+          <a:solidFill>
+            <a:schemeClr val="tx1"/>
+          </a:solidFill>
+          <a:latin typeface="+mn-lt"/>
+          <a:ea typeface="+mn-ea"/>
+          <a:cs typeface="+mn-cs"/>
+        </a:defRPr>
+      </a:lvl4pPr>
+      <a:lvl5pPr marL="2057400" indent="-228600" algn="l" defTabSz="914400" rtl="0" eaLnBrk="1" latinLnBrk="0" hangingPunct="1">
+        <a:lnSpc>
+          <a:spcPct val="90000"/>
+        </a:lnSpc>
+        <a:spcBef>
+          <a:spcPts val="500"/>
+        </a:spcBef>
+        <a:buFont typeface="Arial" panose="020B0604020202020204" pitchFamily="34" charset="0"/>
+        <a:buChar char="•"/>
+        <a:defRPr sz="1800" kern="1200">
+          <a:solidFill>
+            <a:schemeClr val="tx1"/>
+          </a:solidFill>
+          <a:latin typeface="+mn-lt"/>
+          <a:ea typeface="+mn-ea"/>
+          <a:cs typeface="+mn-cs"/>
+        </a:defRPr>
+      </a:lvl5pPr>
+      <a:lvl6pPr marL="2514600" indent="-228600" algn="l" defTabSz="914400" rtl="0" eaLnBrk="1" latinLnBrk="0" hangingPunct="1">
+        <a:lnSpc>
+          <a:spcPct val="90000"/>
+        </a:lnSpc>
+        <a:spcBef>
+          <a:spcPts val="500"/>
+        </a:spcBef>
+        <a:buFont typeface="Arial" panose="020B0604020202020204" pitchFamily="34" charset="0"/>
+        <a:buChar char="•"/>
+        <a:defRPr sz="1800" kern="1200">
+          <a:solidFill>
+            <a:schemeClr val="tx1"/>
+          </a:solidFill>
+          <a:latin typeface="+mn-lt"/>
+          <a:ea typeface="+mn-ea"/>
+          <a:cs typeface="+mn-cs"/>
+        </a:defRPr>
+      </a:lvl6pPr>
+      <a:lvl7pPr marL="2971800" indent="-228600" algn="l" defTabSz="914400" rtl="0" eaLnBrk="1" latinLnBrk="0" hangingPunct="1">
+        <a:lnSpc>
+          <a:spcPct val="90000"/>
+        </a:lnSpc>
+        <a:spcBef>
+          <a:spcPts val="500"/>
+        </a:spcBef>
+        <a:buFont typeface="Arial" panose="020B0604020202020204" pitchFamily="34" charset="0"/>
+        <a:buChar char="•"/>
+        <a:defRPr sz="1800" kern="1200">
+          <a:solidFill>
+            <a:schemeClr val="tx1"/>
+          </a:solidFill>
+          <a:latin typeface="+mn-lt"/>
+          <a:ea typeface="+mn-ea"/>
+          <a:cs typeface="+mn-cs"/>
+        </a:defRPr>
+      </a:lvl7pPr>
+      <a:lvl8pPr marL="3429000" indent="-228600" algn="l" defTabSz="914400" rtl="0" eaLnBrk="1" latinLnBrk="0" hangingPunct="1">
+        <a:lnSpc>
+          <a:spcPct val="90000"/>
+        </a:lnSpc>
+        <a:spcBef>
+          <a:spcPts val="500"/>
+        </a:spcBef>
+        <a:buFont typeface="Arial" panose="020B0604020202020204" pitchFamily="34" charset="0"/>
+        <a:buChar char="•"/>
+        <a:defRPr sz="1800" kern="1200">
+          <a:solidFill>
+            <a:schemeClr val="tx1"/>
+          </a:solidFill>
+          <a:latin typeface="+mn-lt"/>
+          <a:ea typeface="+mn-ea"/>
+          <a:cs typeface="+mn-cs"/>
+        </a:defRPr>
+      </a:lvl8pPr>
+      <a:lvl9pPr marL="3886200" indent="-228600" algn="l" defTabSz="914400" rtl="0" eaLnBrk="1" latinLnBrk="0" hangingPunct="1">
+        <a:lnSpc>
+          <a:spcPct val="90000"/>
+        </a:lnSpc>
+        <a:spcBef>
+          <a:spcPts val="500"/>
+        </a:spcBef>
+        <a:buFont typeface="Arial" panose="020B0604020202020204" pitchFamily="34" charset="0"/>
+        <a:buChar char="•"/>
+        <a:defRPr sz="1800" kern="1200">
+          <a:solidFill>
+            <a:schemeClr val="tx1"/>
+          </a:solidFill>
+          <a:latin typeface="+mn-lt"/>
+          <a:ea typeface="+mn-ea"/>
+          <a:cs typeface="+mn-cs"/>
+        </a:defRPr>
+      </a:lvl9pPr>
+    </p:bodyStyle>
+    <p:otherStyle>
+      <a:defPPr>
+        <a:defRPr lang="it-IT"/>
+      </a:defPPr>
+      <a:lvl1pPr marL="0" algn="l" defTabSz="914400" rtl="0" eaLnBrk="1" latinLnBrk="0" hangingPunct="1">
+        <a:defRPr sz="1800" kern="1200">
+          <a:solidFill>
+            <a:schemeClr val="tx1"/>
+          </a:solidFill>
+          <a:latin typeface="+mn-lt"/>
+          <a:ea typeface="+mn-ea"/>
+          <a:cs typeface="+mn-cs"/>
+        </a:defRPr>
+      </a:lvl1pPr>
+      <a:lvl2pPr marL="457200" algn="l" defTabSz="914400" rtl="0" eaLnBrk="1" latinLnBrk="0" hangingPunct="1">
+        <a:defRPr sz="1800" kern="1200">
+          <a:solidFill>
+            <a:schemeClr val="tx1"/>
+          </a:solidFill>
+          <a:latin typeface="+mn-lt"/>
+          <a:ea typeface="+mn-ea"/>
+          <a:cs typeface="+mn-cs"/>
+        </a:defRPr>
+      </a:lvl2pPr>
+      <a:lvl3pPr marL="914400" algn="l" defTabSz="914400" rtl="0" eaLnBrk="1" latinLnBrk="0" hangingPunct="1">
+        <a:defRPr sz="1800" kern="1200">
+          <a:solidFill>
+            <a:schemeClr val="tx1"/>
+          </a:solidFill>
+          <a:latin typeface="+mn-lt"/>
+          <a:ea typeface="+mn-ea"/>
+          <a:cs typeface="+mn-cs"/>
+        </a:defRPr>
+      </a:lvl3pPr>
+      <a:lvl4pPr marL="1371600" algn="l" defTabSz="914400" rtl="0" eaLnBrk="1" latinLnBrk="0" hangingPunct="1">
+        <a:defRPr sz="1800" kern="1200">
+          <a:solidFill>
+            <a:schemeClr val="tx1"/>
+          </a:solidFill>
+          <a:latin typeface="+mn-lt"/>
+          <a:ea typeface="+mn-ea"/>
+          <a:cs typeface="+mn-cs"/>
+        </a:defRPr>
+      </a:lvl4pPr>
+      <a:lvl5pPr marL="1828800" algn="l" defTabSz="914400" rtl="0" eaLnBrk="1" latinLnBrk="0" hangingPunct="1">
+        <a:defRPr sz="1800" kern="1200">
+          <a:solidFill>
+            <a:schemeClr val="tx1"/>
+          </a:solidFill>
+          <a:latin typeface="+mn-lt"/>
+          <a:ea typeface="+mn-ea"/>
+          <a:cs typeface="+mn-cs"/>
+        </a:defRPr>
+      </a:lvl5pPr>
+      <a:lvl6pPr marL="2286000" algn="l" defTabSz="914400" rtl="0" eaLnBrk="1" latinLnBrk="0" hangingPunct="1">
+        <a:defRPr sz="1800" kern="1200">
+          <a:solidFill>
+            <a:schemeClr val="tx1"/>
+          </a:solidFill>
+          <a:latin typeface="+mn-lt"/>
+          <a:ea typeface="+mn-ea"/>
+          <a:cs typeface="+mn-cs"/>
+        </a:defRPr>
+      </a:lvl6pPr>
+      <a:lvl7pPr marL="2743200" algn="l" defTabSz="914400" rtl="0" eaLnBrk="1" latinLnBrk="0" hangingPunct="1">
+        <a:defRPr sz="1800" kern="1200">
+          <a:solidFill>
+            <a:schemeClr val="tx1"/>
+          </a:solidFill>
+          <a:latin typeface="+mn-lt"/>
+          <a:ea typeface="+mn-ea"/>
+          <a:cs typeface="+mn-cs"/>
+        </a:defRPr>
+      </a:lvl7pPr>
+      <a:lvl8pPr marL="3200400" algn="l" defTabSz="914400" rtl="0" eaLnBrk="1" latinLnBrk="0" hangingPunct="1">
+        <a:defRPr sz="1800" kern="1200">
+          <a:solidFill>
+            <a:schemeClr val="tx1"/>
+          </a:solidFill>
+          <a:latin typeface="+mn-lt"/>
+          <a:ea typeface="+mn-ea"/>
+          <a:cs typeface="+mn-cs"/>
+        </a:defRPr>
+      </a:lvl8pPr>
+      <a:lvl9pPr marL="3657600" algn="l" defTabSz="914400" rtl="0" eaLnBrk="1" latinLnBrk="0" hangingPunct="1">
+        <a:defRPr sz="1800" kern="1200">
+          <a:solidFill>
+            <a:schemeClr val="tx1"/>
+          </a:solidFill>
+          <a:latin typeface="+mn-lt"/>
+          <a:ea typeface="+mn-ea"/>
+          <a:cs typeface="+mn-cs"/>
+        </a:defRPr>
+      </a:lvl9pPr>
+    </p:otherStyle>
+  </p:txStyles>
 </p:sldMaster>
 </file>
 
 <file path=ppt/slides/slide1.xml><?xml version="1.0" encoding="utf-8"?>
-<p:sld xmlns:a="http://schemas.openxmlformats.org/drawingml/2006/main" xmlns:p="http://schemas.openxmlformats.org/presentationml/2006/main" xmlns:r="http://schemas.openxmlformats.org/officeDocument/2006/relationships" xmlns:p14="http://schemas.microsoft.com/office/powerpoint/2010/main" xmlns:p15="http://schemas.microsoft.com/office/powerpoint/2012/main" xmlns:mc="http://schemas.openxmlformats.org/markup-compatibility/2006">
+<p:sld xmlns:a="http://schemas.openxmlformats.org/drawingml/2006/main" xmlns:r="http://schemas.openxmlformats.org/officeDocument/2006/relationships" xmlns:p="http://schemas.openxmlformats.org/presentationml/2006/main">
   <p:cSld>
     <p:spTree>
       <p:nvGrpSpPr>
@@ -1752,18 +2208,18 @@
       </p:grpSpPr>
       <p:pic>
         <p:nvPicPr>
-          <p:cNvPr id="41" name="mds.svg" descr=""/>
+          <p:cNvPr id="41" name="mds.svg"/>
           <p:cNvPicPr/>
           <p:nvPr/>
         </p:nvPicPr>
         <p:blipFill>
-          <a:blip r:embed="rId1"/>
+          <a:blip r:embed="rId2"/>
           <a:stretch/>
         </p:blipFill>
         <p:spPr>
           <a:xfrm>
-            <a:off x="540000" y="720000"/>
-            <a:ext cx="2700000" cy="2527920"/>
+            <a:off x="532202" y="595271"/>
+            <a:ext cx="3152535" cy="2933516"/>
           </a:xfrm>
           <a:prstGeom prst="rect">
             <a:avLst/>
@@ -1781,8 +2237,8 @@
         </p:nvSpPr>
         <p:spPr>
           <a:xfrm>
-            <a:off x="1439280" y="3633840"/>
-            <a:ext cx="7740720" cy="430200"/>
+            <a:off x="6812083" y="3688409"/>
+            <a:ext cx="2630186" cy="430200"/>
           </a:xfrm>
           <a:prstGeom prst="rect">
             <a:avLst/>
@@ -1793,116 +2249,25 @@
           </a:ln>
         </p:spPr>
         <p:txBody>
-          <a:bodyPr lIns="90000" rIns="90000" tIns="45000" bIns="45000">
+          <a:bodyPr lIns="90000" tIns="45000" rIns="90000" bIns="45000" anchor="t">
             <a:noAutofit/>
           </a:bodyPr>
-          <a:p>
-            <a:pPr algn="ctr">
-              <a:lnSpc>
-                <a:spcPct val="100000"/>
-              </a:lnSpc>
-            </a:pPr>
-            <a:r>
-              <a:rPr b="0" lang="it-IT" sz="2400" spc="-1" strike="noStrike">
+          <a:lstStyle/>
+          <a:p>
+            <a:pPr lvl="1" algn="just"/>
+            <a:r>
+              <a:rPr lang="it-IT" sz="3200" spc="-1">
                 <a:solidFill>
-                  <a:srgbClr val="3465a4"/>
+                  <a:srgbClr val="3465A4"/>
                 </a:solidFill>
                 <a:latin typeface="Arial"/>
-              </a:rPr>
-              <a:t>Behaveour</a:t>
-            </a:r>
-            <a:r>
-              <a:rPr b="0" lang="it-IT" sz="2400" spc="-1" strike="noStrike">
-                <a:solidFill>
-                  <a:srgbClr val="3465a4"/>
-                </a:solidFill>
-                <a:latin typeface="Arial"/>
-              </a:rPr>
-              <a:t>	</a:t>
-            </a:r>
-            <a:r>
-              <a:rPr b="0" lang="it-IT" sz="2400" spc="-1" strike="noStrike">
-                <a:solidFill>
-                  <a:srgbClr val="3465a4"/>
-                </a:solidFill>
-                <a:latin typeface="Arial"/>
-              </a:rPr>
-              <a:t>	</a:t>
-            </a:r>
-            <a:r>
-              <a:rPr b="0" lang="it-IT" sz="2400" spc="-1" strike="noStrike">
-                <a:solidFill>
-                  <a:srgbClr val="3465a4"/>
-                </a:solidFill>
-                <a:latin typeface="Arial"/>
-              </a:rPr>
-              <a:t>	</a:t>
-            </a:r>
-            <a:r>
-              <a:rPr b="0" lang="it-IT" sz="2400" spc="-1" strike="noStrike">
-                <a:solidFill>
-                  <a:srgbClr val="3465a4"/>
-                </a:solidFill>
-                <a:latin typeface="Arial"/>
-              </a:rPr>
-              <a:t>	</a:t>
-            </a:r>
-            <a:r>
-              <a:rPr b="0" lang="it-IT" sz="2400" spc="-1" strike="noStrike">
-                <a:solidFill>
-                  <a:srgbClr val="3465a4"/>
-                </a:solidFill>
-                <a:latin typeface="Arial"/>
-              </a:rPr>
-              <a:t>Attacks</a:t>
-            </a:r>
-            <a:r>
-              <a:rPr b="0" lang="it-IT" sz="2400" spc="-1" strike="noStrike">
-                <a:solidFill>
-                  <a:srgbClr val="3465a4"/>
-                </a:solidFill>
-                <a:latin typeface="Arial"/>
-              </a:rPr>
-              <a:t>	</a:t>
-            </a:r>
-            <a:r>
-              <a:rPr b="0" lang="it-IT" sz="2400" spc="-1" strike="noStrike">
-                <a:solidFill>
-                  <a:srgbClr val="3465a4"/>
-                </a:solidFill>
-                <a:latin typeface="Arial"/>
-              </a:rPr>
-              <a:t>	</a:t>
-            </a:r>
-            <a:r>
-              <a:rPr b="0" lang="it-IT" sz="2400" spc="-1" strike="noStrike">
-                <a:solidFill>
-                  <a:srgbClr val="3465a4"/>
-                </a:solidFill>
-                <a:latin typeface="Arial"/>
-              </a:rPr>
-              <a:t>	</a:t>
-            </a:r>
-            <a:r>
-              <a:rPr b="0" lang="it-IT" sz="2400" spc="-1" strike="noStrike">
-                <a:solidFill>
-                  <a:srgbClr val="3465a4"/>
-                </a:solidFill>
-                <a:latin typeface="Arial"/>
-              </a:rPr>
-              <a:t>	</a:t>
-            </a:r>
-            <a:r>
-              <a:rPr b="0" lang="it-IT" sz="2400" spc="-1" strike="noStrike">
-                <a:solidFill>
-                  <a:srgbClr val="3465a4"/>
-                </a:solidFill>
-                <a:latin typeface="Arial"/>
-              </a:rPr>
-              <a:t>Mitigation</a:t>
-            </a:r>
-            <a:endParaRPr b="0" lang="it-IT" sz="2400" spc="-1" strike="noStrike">
-              <a:latin typeface="Arial"/>
+                <a:cs typeface="Arial"/>
+              </a:rPr>
+              <a:t>Mitigations</a:t>
+            </a:r>
+            <a:endParaRPr lang="it-IT" sz="3200" spc="-1">
+              <a:ea typeface="+mn-lt"/>
+              <a:cs typeface="+mn-lt"/>
             </a:endParaRPr>
           </a:p>
         </p:txBody>
@@ -1927,13 +2292,14 @@
           </a:ln>
         </p:spPr>
         <p:txBody>
-          <a:bodyPr lIns="0" rIns="0" tIns="0" bIns="0" anchor="ctr">
+          <a:bodyPr lIns="0" tIns="0" rIns="0" bIns="0" anchor="ctr">
             <a:noAutofit/>
           </a:bodyPr>
+          <a:lstStyle/>
           <a:p>
             <a:pPr algn="ctr"/>
             <a:r>
-              <a:rPr b="0" lang="it-IT" sz="6600" spc="-1" strike="noStrike">
+              <a:rPr lang="it-IT" sz="6600" b="0" strike="noStrike" spc="-1">
                 <a:latin typeface="Arial"/>
                 <a:ea typeface="Noto Sans CJK SC"/>
               </a:rPr>
@@ -1941,33 +2307,167 @@
             </a:r>
             <a:br/>
             <a:r>
-              <a:rPr b="0" i="1" lang="it-IT" sz="3600" spc="-1" strike="noStrike">
+              <a:rPr lang="it-IT" sz="3600" b="0" i="1" strike="noStrike" spc="-1">
                 <a:latin typeface="Arial"/>
                 <a:ea typeface="Noto Sans CJK SC"/>
               </a:rPr>
               <a:t>Rogue In-Flight Data Load</a:t>
             </a:r>
-            <a:endParaRPr b="0" lang="it-IT" sz="3600" spc="-1" strike="noStrike">
+            <a:endParaRPr lang="it-IT" sz="3600" b="0" strike="noStrike" spc="-1">
               <a:latin typeface="Arial"/>
             </a:endParaRPr>
           </a:p>
         </p:txBody>
       </p:sp>
+      <p:sp>
+        <p:nvSpPr>
+          <p:cNvPr id="5" name="TextShape 1">
+            <a:extLst>
+              <a:ext uri="{FF2B5EF4-FFF2-40B4-BE49-F238E27FC236}">
+                <a16:creationId xmlns:a16="http://schemas.microsoft.com/office/drawing/2014/main" id="{4AE8DB69-5502-4E28-9DB4-8C2A7133EF93}"/>
+              </a:ext>
+            </a:extLst>
+          </p:cNvPr>
+          <p:cNvSpPr txBox="1"/>
+          <p:nvPr/>
+        </p:nvSpPr>
+        <p:spPr>
+          <a:xfrm>
+            <a:off x="4043685" y="3688409"/>
+            <a:ext cx="2341500" cy="430200"/>
+          </a:xfrm>
+          <a:prstGeom prst="rect">
+            <a:avLst/>
+          </a:prstGeom>
+          <a:noFill/>
+          <a:ln w="0">
+            <a:noFill/>
+          </a:ln>
+        </p:spPr>
+        <p:txBody>
+          <a:bodyPr lIns="90000" tIns="45000" rIns="90000" bIns="45000" anchor="t">
+            <a:noAutofit/>
+          </a:bodyPr>
+          <a:lstStyle/>
+          <a:p>
+            <a:pPr lvl="1" algn="just"/>
+            <a:r>
+              <a:rPr lang="it-IT" sz="3200" spc="-1">
+                <a:solidFill>
+                  <a:srgbClr val="3465A4"/>
+                </a:solidFill>
+                <a:latin typeface="Arial"/>
+                <a:cs typeface="Arial"/>
+              </a:rPr>
+              <a:t>Attacks </a:t>
+            </a:r>
+            <a:endParaRPr lang="it-IT" sz="3200" spc="-1">
+              <a:ea typeface="+mn-lt"/>
+              <a:cs typeface="+mn-lt"/>
+            </a:endParaRPr>
+          </a:p>
+        </p:txBody>
+      </p:sp>
+      <p:sp>
+        <p:nvSpPr>
+          <p:cNvPr id="6" name="TextShape 1">
+            <a:extLst>
+              <a:ext uri="{FF2B5EF4-FFF2-40B4-BE49-F238E27FC236}">
+                <a16:creationId xmlns:a16="http://schemas.microsoft.com/office/drawing/2014/main" id="{7AB46888-D255-4340-9093-5D25F387BFB3}"/>
+              </a:ext>
+            </a:extLst>
+          </p:cNvPr>
+          <p:cNvSpPr txBox="1"/>
+          <p:nvPr/>
+        </p:nvSpPr>
+        <p:spPr>
+          <a:xfrm>
+            <a:off x="635928" y="3688409"/>
+            <a:ext cx="2747221" cy="430200"/>
+          </a:xfrm>
+          <a:prstGeom prst="rect">
+            <a:avLst/>
+          </a:prstGeom>
+          <a:noFill/>
+          <a:ln w="0">
+            <a:noFill/>
+          </a:ln>
+        </p:spPr>
+        <p:txBody>
+          <a:bodyPr lIns="90000" tIns="45000" rIns="90000" bIns="45000" anchor="t">
+            <a:noAutofit/>
+          </a:bodyPr>
+          <a:lstStyle/>
+          <a:p>
+            <a:pPr lvl="1" algn="just"/>
+            <a:r>
+              <a:rPr lang="it-IT" sz="3200" spc="-1">
+                <a:solidFill>
+                  <a:srgbClr val="3465A4"/>
+                </a:solidFill>
+                <a:latin typeface="Arial"/>
+                <a:cs typeface="Arial"/>
+              </a:rPr>
+              <a:t>Behaveour </a:t>
+            </a:r>
+            <a:endParaRPr lang="it-IT" sz="3200" spc="-1">
+              <a:solidFill>
+                <a:srgbClr val="3465A4"/>
+              </a:solidFill>
+              <a:ea typeface="+mn-lt"/>
+              <a:cs typeface="+mn-lt"/>
+            </a:endParaRPr>
+          </a:p>
+        </p:txBody>
+      </p:sp>
+      <p:sp>
+        <p:nvSpPr>
+          <p:cNvPr id="2" name="CasellaDiTesto 1">
+            <a:extLst>
+              <a:ext uri="{FF2B5EF4-FFF2-40B4-BE49-F238E27FC236}">
+                <a16:creationId xmlns:a16="http://schemas.microsoft.com/office/drawing/2014/main" id="{5546A543-54AC-4036-8778-9EB48B6F661F}"/>
+              </a:ext>
+            </a:extLst>
+          </p:cNvPr>
+          <p:cNvSpPr txBox="1"/>
+          <p:nvPr/>
+        </p:nvSpPr>
+        <p:spPr>
+          <a:xfrm>
+            <a:off x="494937" y="4875184"/>
+            <a:ext cx="2743200" cy="369332"/>
+          </a:xfrm>
+          <a:prstGeom prst="rect">
+            <a:avLst/>
+          </a:prstGeom>
+          <a:noFill/>
+        </p:spPr>
+        <p:txBody>
+          <a:bodyPr rot="0" spcFirstLastPara="0" vertOverflow="overflow" horzOverflow="overflow" vert="horz" wrap="square" lIns="91440" tIns="45720" rIns="91440" bIns="45720" numCol="1" spcCol="0" rtlCol="0" fromWordArt="0" anchor="t" anchorCtr="0" forceAA="0" compatLnSpc="1">
+            <a:prstTxWarp prst="textNoShape">
+              <a:avLst/>
+            </a:prstTxWarp>
+            <a:spAutoFit/>
+          </a:bodyPr>
+          <a:lstStyle/>
+          <a:p>
+            <a:r>
+              <a:rPr lang="en-US"/>
+              <a:t>https://mdsattacks.com/</a:t>
+            </a:r>
+          </a:p>
+        </p:txBody>
+      </p:sp>
     </p:spTree>
   </p:cSld>
-  <mc:AlternateContent>
-    <mc:Choice Requires="p14">
-      <p:transition spd="slow" p14:dur="2000"/>
-    </mc:Choice>
-    <mc:Fallback>
-      <p:transition spd="slow"/>
-    </mc:Fallback>
-  </mc:AlternateContent>
+  <p:clrMapOvr>
+    <a:masterClrMapping/>
+  </p:clrMapOvr>
 </p:sld>
 </file>
 
 <file path=ppt/slides/slide2.xml><?xml version="1.0" encoding="utf-8"?>
-<p:sld xmlns:a="http://schemas.openxmlformats.org/drawingml/2006/main" xmlns:p="http://schemas.openxmlformats.org/presentationml/2006/main" xmlns:r="http://schemas.openxmlformats.org/officeDocument/2006/relationships" xmlns:p14="http://schemas.microsoft.com/office/powerpoint/2010/main" xmlns:p15="http://schemas.microsoft.com/office/powerpoint/2012/main" xmlns:mc="http://schemas.openxmlformats.org/markup-compatibility/2006">
+<p:sld xmlns:a="http://schemas.openxmlformats.org/drawingml/2006/main" xmlns:r="http://schemas.openxmlformats.org/officeDocument/2006/relationships" xmlns:p="http://schemas.openxmlformats.org/presentationml/2006/main">
   <p:cSld>
     <p:spTree>
       <p:nvGrpSpPr>
@@ -2003,37 +2503,35 @@
           </a:ln>
         </p:spPr>
         <p:txBody>
-          <a:bodyPr lIns="0" rIns="0" tIns="0" bIns="0" anchor="ctr">
+          <a:bodyPr lIns="0" tIns="0" rIns="0" bIns="0" anchor="ctr">
             <a:noAutofit/>
           </a:bodyPr>
+          <a:lstStyle/>
           <a:p>
             <a:pPr algn="ctr"/>
             <a:r>
-              <a:rPr b="0" lang="it-IT" sz="4400" spc="-1" strike="noStrike">
+              <a:rPr lang="it-IT" sz="4400" b="0" strike="noStrike" spc="-1">
                 <a:latin typeface="Arial"/>
               </a:rPr>
               <a:t>Microarchitectural Data Sampling</a:t>
             </a:r>
-            <a:endParaRPr b="0" lang="it-IT" sz="4400" spc="-1" strike="noStrike">
-              <a:latin typeface="Arial"/>
-            </a:endParaRPr>
           </a:p>
         </p:txBody>
       </p:sp>
       <p:pic>
         <p:nvPicPr>
-          <p:cNvPr id="45" name="mds.svg_0" descr=""/>
+          <p:cNvPr id="45" name="mds.svg_0"/>
           <p:cNvPicPr/>
           <p:nvPr/>
         </p:nvPicPr>
         <p:blipFill>
-          <a:blip r:embed="rId1"/>
+          <a:blip r:embed="rId2"/>
           <a:stretch/>
         </p:blipFill>
         <p:spPr>
           <a:xfrm>
-            <a:off x="360000" y="1620000"/>
-            <a:ext cx="2700000" cy="2527920"/>
+            <a:off x="297411" y="1713547"/>
+            <a:ext cx="3066710" cy="2738518"/>
           </a:xfrm>
           <a:prstGeom prst="rect">
             <a:avLst/>
@@ -2051,7 +2549,7 @@
         </p:nvSpPr>
         <p:spPr>
           <a:xfrm>
-            <a:off x="3291120" y="2173680"/>
+            <a:off x="3236534" y="1861857"/>
             <a:ext cx="5348880" cy="602280"/>
           </a:xfrm>
           <a:prstGeom prst="rect">
@@ -2063,9 +2561,10 @@
           </a:ln>
         </p:spPr>
         <p:txBody>
-          <a:bodyPr lIns="90000" rIns="90000" tIns="45000" bIns="45000">
+          <a:bodyPr lIns="90000" tIns="45000" rIns="90000" bIns="45000">
             <a:noAutofit/>
           </a:bodyPr>
+          <a:lstStyle/>
           <a:p>
             <a:pPr marL="216000" indent="-216000">
               <a:buClr>
@@ -2076,20 +2575,17 @@
               <a:buChar char=""/>
             </a:pPr>
             <a:r>
-              <a:rPr b="1" lang="it-IT" sz="2000" spc="-1" strike="noStrike">
+              <a:rPr lang="it-IT" sz="2000" b="1" strike="noStrike" spc="-1">
                 <a:latin typeface="Arial"/>
               </a:rPr>
               <a:t>Side-channel</a:t>
             </a:r>
             <a:r>
-              <a:rPr b="0" lang="it-IT" sz="2000" spc="-1" strike="noStrike">
+              <a:rPr lang="it-IT" sz="2000" b="0" strike="noStrike" spc="-1">
                 <a:latin typeface="Arial"/>
               </a:rPr>
               <a:t> vulnerabilities in Intel CPUs </a:t>
             </a:r>
-            <a:endParaRPr b="0" lang="it-IT" sz="2000" spc="-1" strike="noStrike">
-              <a:latin typeface="Arial"/>
-            </a:endParaRPr>
           </a:p>
         </p:txBody>
       </p:sp>
@@ -2101,8 +2597,8 @@
         </p:nvSpPr>
         <p:spPr>
           <a:xfrm>
-            <a:off x="1620000" y="4320000"/>
-            <a:ext cx="8280000" cy="657000"/>
+            <a:off x="3265372" y="3633991"/>
+            <a:ext cx="5346320" cy="657000"/>
           </a:xfrm>
           <a:prstGeom prst="rect">
             <a:avLst/>
@@ -2113,9 +2609,10 @@
           </a:ln>
         </p:spPr>
         <p:txBody>
-          <a:bodyPr lIns="90000" rIns="90000" tIns="45000" bIns="45000">
+          <a:bodyPr lIns="90000" tIns="45000" rIns="90000" bIns="45000">
             <a:noAutofit/>
           </a:bodyPr>
+          <a:lstStyle/>
           <a:p>
             <a:pPr marL="216000" indent="-216000">
               <a:buClr>
@@ -2126,38 +2623,35 @@
               <a:buChar char=""/>
             </a:pPr>
             <a:r>
-              <a:rPr b="0" lang="it-IT" sz="1800" spc="-1" strike="noStrike">
+              <a:rPr lang="it-IT" sz="1800" b="0" strike="noStrike" spc="-1">
                 <a:latin typeface="Arial"/>
               </a:rPr>
               <a:t> </a:t>
             </a:r>
             <a:r>
-              <a:rPr b="1" lang="it-IT" sz="2000" spc="-1" strike="noStrike">
+              <a:rPr lang="it-IT" sz="2000" b="1" strike="noStrike" spc="-1">
                 <a:latin typeface="Arial"/>
               </a:rPr>
               <a:t>private data</a:t>
             </a:r>
             <a:r>
-              <a:rPr b="0" lang="it-IT" sz="2000" spc="-1" strike="noStrike">
+              <a:rPr lang="it-IT" sz="2000" b="0" strike="noStrike" spc="-1">
                 <a:latin typeface="Arial"/>
               </a:rPr>
               <a:t> can </a:t>
             </a:r>
             <a:r>
-              <a:rPr b="1" lang="it-IT" sz="2000" spc="-1" strike="noStrike">
+              <a:rPr lang="it-IT" sz="2000" b="1" strike="noStrike" spc="-1">
                 <a:latin typeface="Arial"/>
               </a:rPr>
               <a:t>leak</a:t>
             </a:r>
             <a:r>
-              <a:rPr b="0" lang="it-IT" sz="2000" spc="-1" strike="noStrike">
+              <a:rPr lang="it-IT" sz="2000" b="0" strike="noStrike" spc="-1">
                 <a:latin typeface="Arial"/>
               </a:rPr>
               <a:t> across arbitrary security boundaries</a:t>
             </a:r>
-            <a:endParaRPr b="0" lang="it-IT" sz="2000" spc="-1" strike="noStrike">
-              <a:latin typeface="Arial"/>
-            </a:endParaRPr>
           </a:p>
         </p:txBody>
       </p:sp>
@@ -2169,7 +2663,7 @@
         </p:nvSpPr>
         <p:spPr>
           <a:xfrm>
-            <a:off x="3240000" y="3060000"/>
+            <a:off x="3240000" y="2833929"/>
             <a:ext cx="5940000" cy="657000"/>
           </a:xfrm>
           <a:prstGeom prst="rect">
@@ -2181,9 +2675,10 @@
           </a:ln>
         </p:spPr>
         <p:txBody>
-          <a:bodyPr lIns="90000" rIns="90000" tIns="45000" bIns="45000">
+          <a:bodyPr lIns="90000" tIns="45000" rIns="90000" bIns="45000">
             <a:noAutofit/>
           </a:bodyPr>
+          <a:lstStyle/>
           <a:p>
             <a:pPr marL="216000" indent="-216000">
               <a:buClr>
@@ -2194,52 +2689,80 @@
               <a:buChar char=""/>
             </a:pPr>
             <a:r>
-              <a:rPr b="0" lang="it-IT" sz="2000" spc="-1" strike="noStrike">
+              <a:rPr lang="it-IT" sz="2000" b="0" strike="noStrike" spc="-1">
                 <a:latin typeface="Arial"/>
               </a:rPr>
               <a:t>Attackers can inspect </a:t>
             </a:r>
             <a:r>
-              <a:rPr b="1" lang="it-IT" sz="2000" spc="-1" strike="noStrike">
+              <a:rPr lang="it-IT" sz="2000" b="1" strike="noStrike" spc="-1">
                 <a:latin typeface="Arial"/>
                 <a:ea typeface="Arial"/>
               </a:rPr>
-              <a:t>µ-</a:t>
-            </a:r>
-            <a:r>
-              <a:rPr b="1" lang="it-IT" sz="2000" spc="-1" strike="noStrike">
+              <a:t>µ-architectural buffers</a:t>
+            </a:r>
+            <a:r>
+              <a:rPr lang="it-IT" sz="2000" b="0" strike="noStrike" spc="-1">
                 <a:latin typeface="Arial"/>
-                <a:ea typeface="Arial"/>
-              </a:rPr>
-              <a:t>architectural buffers</a:t>
-            </a:r>
-            <a:r>
-              <a:rPr b="0" lang="it-IT" sz="2000" spc="-1" strike="noStrike">
-                <a:latin typeface="Arial"/>
               </a:rPr>
               <a:t> </a:t>
             </a:r>
-            <a:endParaRPr b="0" lang="it-IT" sz="2000" spc="-1" strike="noStrike">
-              <a:latin typeface="Arial"/>
-            </a:endParaRPr>
+          </a:p>
+        </p:txBody>
+      </p:sp>
+      <p:sp>
+        <p:nvSpPr>
+          <p:cNvPr id="2" name="CasellaDiTesto 1">
+            <a:extLst>
+              <a:ext uri="{FF2B5EF4-FFF2-40B4-BE49-F238E27FC236}">
+                <a16:creationId xmlns:a16="http://schemas.microsoft.com/office/drawing/2014/main" id="{456A0F29-8C77-4E3A-9345-86ADF842A9D8}"/>
+              </a:ext>
+            </a:extLst>
+          </p:cNvPr>
+          <p:cNvSpPr txBox="1"/>
+          <p:nvPr/>
+        </p:nvSpPr>
+        <p:spPr>
+          <a:xfrm>
+            <a:off x="518331" y="5038891"/>
+            <a:ext cx="2743200" cy="369332"/>
+          </a:xfrm>
+          <a:prstGeom prst="rect">
+            <a:avLst/>
+          </a:prstGeom>
+          <a:noFill/>
+        </p:spPr>
+        <p:txBody>
+          <a:bodyPr rot="0" spcFirstLastPara="0" vertOverflow="overflow" horzOverflow="overflow" vert="horz" wrap="square" lIns="91440" tIns="45720" rIns="91440" bIns="45720" numCol="1" spcCol="0" rtlCol="0" fromWordArt="0" anchor="t" anchorCtr="0" forceAA="0" compatLnSpc="1">
+            <a:prstTxWarp prst="textNoShape">
+              <a:avLst/>
+            </a:prstTxWarp>
+            <a:spAutoFit/>
+          </a:bodyPr>
+          <a:lstStyle/>
+          <a:p>
+            <a:pPr algn="l"/>
+            <a:r>
+              <a:rPr lang="it-IT" dirty="0">
+                <a:ea typeface="+mn-lt"/>
+                <a:cs typeface="+mn-lt"/>
+              </a:rPr>
+              <a:t>https://mdsattacks.com/</a:t>
+            </a:r>
+            <a:endParaRPr lang="it-IT" dirty="0"/>
           </a:p>
         </p:txBody>
       </p:sp>
     </p:spTree>
   </p:cSld>
-  <mc:AlternateContent>
-    <mc:Choice Requires="p14">
-      <p:transition spd="slow" p14:dur="2000"/>
-    </mc:Choice>
-    <mc:Fallback>
-      <p:transition spd="slow"/>
-    </mc:Fallback>
-  </mc:AlternateContent>
+  <p:clrMapOvr>
+    <a:masterClrMapping/>
+  </p:clrMapOvr>
 </p:sld>
 </file>
 
 <file path=ppt/slides/slide3.xml><?xml version="1.0" encoding="utf-8"?>
-<p:sld xmlns:a="http://schemas.openxmlformats.org/drawingml/2006/main" xmlns:p="http://schemas.openxmlformats.org/presentationml/2006/main" xmlns:r="http://schemas.openxmlformats.org/officeDocument/2006/relationships" xmlns:p14="http://schemas.microsoft.com/office/powerpoint/2010/main" xmlns:p15="http://schemas.microsoft.com/office/powerpoint/2012/main" xmlns:mc="http://schemas.openxmlformats.org/markup-compatibility/2006">
+<p:sld xmlns:a="http://schemas.openxmlformats.org/drawingml/2006/main" xmlns:r="http://schemas.openxmlformats.org/officeDocument/2006/relationships" xmlns:p="http://schemas.openxmlformats.org/presentationml/2006/main">
   <p:cSld>
     <p:spTree>
       <p:nvGrpSpPr>
@@ -2255,16 +2778,2310 @@
           <a:chExt cx="0" cy="0"/>
         </a:xfrm>
       </p:grpSpPr>
+      <p:pic>
+        <p:nvPicPr>
+          <p:cNvPr id="2" name="Immagine 2">
+            <a:extLst>
+              <a:ext uri="{FF2B5EF4-FFF2-40B4-BE49-F238E27FC236}">
+                <a16:creationId xmlns:a16="http://schemas.microsoft.com/office/drawing/2014/main" id="{0CE0F459-D4D8-47D9-A423-A8E259F4C5EA}"/>
+              </a:ext>
+            </a:extLst>
+          </p:cNvPr>
+          <p:cNvPicPr>
+            <a:picLocks noChangeAspect="1"/>
+          </p:cNvPicPr>
+          <p:nvPr/>
+        </p:nvPicPr>
+        <p:blipFill>
+          <a:blip r:embed="rId2"/>
+          <a:stretch>
+            <a:fillRect/>
+          </a:stretch>
+        </p:blipFill>
+        <p:spPr>
+          <a:xfrm>
+            <a:off x="892180" y="2383450"/>
+            <a:ext cx="3493073" cy="2335139"/>
+          </a:xfrm>
+          <a:prstGeom prst="rect">
+            <a:avLst/>
+          </a:prstGeom>
+        </p:spPr>
+      </p:pic>
+      <p:sp>
+        <p:nvSpPr>
+          <p:cNvPr id="3" name="Titolo 2">
+            <a:extLst>
+              <a:ext uri="{FF2B5EF4-FFF2-40B4-BE49-F238E27FC236}">
+                <a16:creationId xmlns:a16="http://schemas.microsoft.com/office/drawing/2014/main" id="{F2ADBE42-2EB6-423B-9C34-034C37731D3C}"/>
+              </a:ext>
+            </a:extLst>
+          </p:cNvPr>
+          <p:cNvSpPr>
+            <a:spLocks noGrp="1"/>
+          </p:cNvSpPr>
+          <p:nvPr>
+            <p:ph type="title"/>
+          </p:nvPr>
+        </p:nvSpPr>
+        <p:spPr>
+          <a:xfrm>
+            <a:off x="433818" y="280649"/>
+            <a:ext cx="9071640" cy="946440"/>
+          </a:xfrm>
+        </p:spPr>
+        <p:txBody>
+          <a:bodyPr/>
+          <a:lstStyle/>
+          <a:p>
+            <a:pPr algn="ctr"/>
+            <a:r>
+              <a:rPr lang="it-IT" sz="4000" dirty="0">
+                <a:ea typeface="+mj-lt"/>
+                <a:cs typeface="+mj-lt"/>
+              </a:rPr>
+              <a:t>µ-architectural</a:t>
+            </a:r>
+            <a:r>
+              <a:rPr lang="it-IT" sz="4000" dirty="0"/>
+              <a:t> (shared)</a:t>
+            </a:r>
+            <a:r>
+              <a:rPr lang="it-IT" sz="4000"/>
+              <a:t> buffers</a:t>
+            </a:r>
+            <a:endParaRPr lang="it-IT"/>
+          </a:p>
+        </p:txBody>
+      </p:sp>
+      <p:sp>
+        <p:nvSpPr>
+          <p:cNvPr id="4" name="CasellaDiTesto 3">
+            <a:extLst>
+              <a:ext uri="{FF2B5EF4-FFF2-40B4-BE49-F238E27FC236}">
+                <a16:creationId xmlns:a16="http://schemas.microsoft.com/office/drawing/2014/main" id="{34F28AF8-5392-44CB-BC13-64F5CF76BE1E}"/>
+              </a:ext>
+            </a:extLst>
+          </p:cNvPr>
+          <p:cNvSpPr txBox="1"/>
+          <p:nvPr/>
+        </p:nvSpPr>
+        <p:spPr>
+          <a:xfrm>
+            <a:off x="620075" y="1382771"/>
+            <a:ext cx="8516932" cy="646331"/>
+          </a:xfrm>
+          <a:prstGeom prst="rect">
+            <a:avLst/>
+          </a:prstGeom>
+          <a:noFill/>
+        </p:spPr>
+        <p:txBody>
+          <a:bodyPr rot="0" spcFirstLastPara="0" vertOverflow="overflow" horzOverflow="overflow" vert="horz" wrap="square" lIns="91440" tIns="45720" rIns="91440" bIns="45720" numCol="1" spcCol="0" rtlCol="0" fromWordArt="0" anchor="t" anchorCtr="0" forceAA="0" compatLnSpc="1">
+            <a:prstTxWarp prst="textNoShape">
+              <a:avLst/>
+            </a:prstTxWarp>
+            <a:spAutoFit/>
+          </a:bodyPr>
+          <a:lstStyle/>
+          <a:p>
+            <a:r>
+              <a:rPr lang="it-IT" dirty="0" err="1"/>
+              <a:t>It's</a:t>
+            </a:r>
+            <a:r>
+              <a:rPr lang="it-IT" dirty="0"/>
+              <a:t> </a:t>
+            </a:r>
+            <a:r>
+              <a:rPr lang="it-IT" dirty="0" err="1"/>
+              <a:t>possbile</a:t>
+            </a:r>
+            <a:r>
+              <a:rPr lang="it-IT" dirty="0"/>
+              <a:t> to </a:t>
+            </a:r>
+            <a:r>
+              <a:rPr lang="it-IT" dirty="0" err="1"/>
+              <a:t>discover</a:t>
+            </a:r>
+            <a:r>
+              <a:rPr lang="it-IT" dirty="0"/>
+              <a:t> and </a:t>
+            </a:r>
+            <a:r>
+              <a:rPr lang="it-IT" dirty="0" err="1"/>
+              <a:t>analyze</a:t>
+            </a:r>
+            <a:r>
+              <a:rPr lang="it-IT" dirty="0"/>
+              <a:t> the </a:t>
+            </a:r>
+            <a:r>
+              <a:rPr lang="it-IT" dirty="0" err="1"/>
+              <a:t>behaveour</a:t>
+            </a:r>
+            <a:r>
+              <a:rPr lang="it-IT" dirty="0"/>
+              <a:t> of µ-</a:t>
+            </a:r>
+            <a:r>
+              <a:rPr lang="it-IT" dirty="0" err="1"/>
+              <a:t>architectural</a:t>
+            </a:r>
+            <a:r>
+              <a:rPr lang="it-IT" dirty="0"/>
+              <a:t> buffers via </a:t>
+            </a:r>
+            <a:r>
+              <a:rPr lang="it-IT" b="1" dirty="0"/>
+              <a:t>reverse </a:t>
+            </a:r>
+            <a:r>
+              <a:rPr lang="it-IT" b="1" dirty="0">
+                <a:ea typeface="+mn-lt"/>
+                <a:cs typeface="+mn-lt"/>
+              </a:rPr>
+              <a:t>engineering</a:t>
+            </a:r>
+            <a:endParaRPr lang="it-IT" b="1" dirty="0" err="1"/>
+          </a:p>
+        </p:txBody>
+      </p:sp>
+      <p:sp>
+        <p:nvSpPr>
+          <p:cNvPr id="6" name="CasellaDiTesto 5">
+            <a:extLst>
+              <a:ext uri="{FF2B5EF4-FFF2-40B4-BE49-F238E27FC236}">
+                <a16:creationId xmlns:a16="http://schemas.microsoft.com/office/drawing/2014/main" id="{CCB0F601-807B-451F-9EFB-B6329236FD75}"/>
+              </a:ext>
+            </a:extLst>
+          </p:cNvPr>
+          <p:cNvSpPr txBox="1"/>
+          <p:nvPr/>
+        </p:nvSpPr>
+        <p:spPr>
+          <a:xfrm>
+            <a:off x="5220509" y="2271466"/>
+            <a:ext cx="3624864" cy="923330"/>
+          </a:xfrm>
+          <a:prstGeom prst="rect">
+            <a:avLst/>
+          </a:prstGeom>
+          <a:noFill/>
+        </p:spPr>
+        <p:txBody>
+          <a:bodyPr rot="0" spcFirstLastPara="0" vertOverflow="overflow" horzOverflow="overflow" vert="horz" wrap="square" lIns="91440" tIns="45720" rIns="91440" bIns="45720" numCol="1" spcCol="0" rtlCol="0" fromWordArt="0" anchor="t" anchorCtr="0" forceAA="0" compatLnSpc="1">
+            <a:prstTxWarp prst="textNoShape">
+              <a:avLst/>
+            </a:prstTxWarp>
+            <a:spAutoFit/>
+          </a:bodyPr>
+          <a:lstStyle/>
+          <a:p>
+            <a:r>
+              <a:rPr lang="en-US" b="1"/>
+              <a:t>Performance counters</a:t>
+            </a:r>
+            <a:r>
+              <a:rPr lang="en-US"/>
+              <a:t>:</a:t>
+            </a:r>
+            <a:endParaRPr lang="en-US" dirty="0"/>
+          </a:p>
+          <a:p>
+            <a:pPr marL="285750" indent="-285750">
+              <a:buFont typeface="Arial"/>
+              <a:buChar char="•"/>
+            </a:pPr>
+            <a:r>
+              <a:rPr lang="en-US"/>
+              <a:t>Cache and buffers hits</a:t>
+            </a:r>
+          </a:p>
+          <a:p>
+            <a:pPr marL="285750" indent="-285750">
+              <a:buFont typeface="Arial"/>
+              <a:buChar char="•"/>
+            </a:pPr>
+            <a:r>
+              <a:rPr lang="it-IT">
+                <a:ea typeface="+mn-lt"/>
+                <a:cs typeface="+mn-lt"/>
+              </a:rPr>
+              <a:t>µ-architectural requests</a:t>
+            </a:r>
+            <a:endParaRPr lang="en-US" dirty="0"/>
+          </a:p>
+        </p:txBody>
+      </p:sp>
+      <p:sp>
+        <p:nvSpPr>
+          <p:cNvPr id="7" name="CasellaDiTesto 6">
+            <a:extLst>
+              <a:ext uri="{FF2B5EF4-FFF2-40B4-BE49-F238E27FC236}">
+                <a16:creationId xmlns:a16="http://schemas.microsoft.com/office/drawing/2014/main" id="{B3686FCF-40BB-4336-9AD2-013AEB85FD8D}"/>
+              </a:ext>
+            </a:extLst>
+          </p:cNvPr>
+          <p:cNvSpPr txBox="1"/>
+          <p:nvPr/>
+        </p:nvSpPr>
+        <p:spPr>
+          <a:xfrm>
+            <a:off x="5218841" y="3604507"/>
+            <a:ext cx="3624864" cy="923330"/>
+          </a:xfrm>
+          <a:prstGeom prst="rect">
+            <a:avLst/>
+          </a:prstGeom>
+          <a:noFill/>
+        </p:spPr>
+        <p:txBody>
+          <a:bodyPr rot="0" spcFirstLastPara="0" vertOverflow="overflow" horzOverflow="overflow" vert="horz" wrap="square" lIns="91440" tIns="45720" rIns="91440" bIns="45720" numCol="1" spcCol="0" rtlCol="0" fromWordArt="0" anchor="t" anchorCtr="0" forceAA="0" compatLnSpc="1">
+            <a:prstTxWarp prst="textNoShape">
+              <a:avLst/>
+            </a:prstTxWarp>
+            <a:spAutoFit/>
+          </a:bodyPr>
+          <a:lstStyle/>
+          <a:p>
+            <a:r>
+              <a:rPr lang="en-US" b="1"/>
+              <a:t>Speculative loads</a:t>
+            </a:r>
+            <a:r>
+              <a:rPr lang="en-US"/>
+              <a:t> (S</a:t>
+            </a:r>
+            <a:r>
+              <a:rPr lang="en-US" i="1"/>
+              <a:t>pectre</a:t>
+            </a:r>
+            <a:r>
+              <a:rPr lang="en-US"/>
+              <a:t>):</a:t>
+            </a:r>
+            <a:endParaRPr lang="en-US" dirty="0"/>
+          </a:p>
+          <a:p>
+            <a:pPr marL="285750" indent="-285750">
+              <a:buFont typeface="Arial"/>
+              <a:buChar char="•"/>
+            </a:pPr>
+            <a:r>
+              <a:rPr lang="en-US"/>
+              <a:t>FLUSH+RELOAD</a:t>
+            </a:r>
+          </a:p>
+          <a:p>
+            <a:pPr marL="285750" indent="-285750">
+              <a:buFont typeface="Arial"/>
+              <a:buChar char="•"/>
+            </a:pPr>
+            <a:r>
+              <a:rPr lang="it-IT">
+                <a:ea typeface="+mn-lt"/>
+                <a:cs typeface="+mn-lt"/>
+              </a:rPr>
+              <a:t>PRIME + PROBE</a:t>
+            </a:r>
+            <a:endParaRPr lang="en-US"/>
+          </a:p>
+        </p:txBody>
+      </p:sp>
+      <p:sp>
+        <p:nvSpPr>
+          <p:cNvPr id="9" name="CasellaDiTesto 8">
+            <a:extLst>
+              <a:ext uri="{FF2B5EF4-FFF2-40B4-BE49-F238E27FC236}">
+                <a16:creationId xmlns:a16="http://schemas.microsoft.com/office/drawing/2014/main" id="{371D0EF4-E971-44B9-9F1B-214CD288D851}"/>
+              </a:ext>
+            </a:extLst>
+          </p:cNvPr>
+          <p:cNvSpPr txBox="1"/>
+          <p:nvPr/>
+        </p:nvSpPr>
+        <p:spPr>
+          <a:xfrm>
+            <a:off x="471544" y="5116847"/>
+            <a:ext cx="9500026" cy="230832"/>
+          </a:xfrm>
+          <a:prstGeom prst="rect">
+            <a:avLst/>
+          </a:prstGeom>
+          <a:noFill/>
+        </p:spPr>
+        <p:txBody>
+          <a:bodyPr rot="0" spcFirstLastPara="0" vertOverflow="overflow" horzOverflow="overflow" vert="horz" wrap="square" lIns="91440" tIns="45720" rIns="91440" bIns="45720" numCol="1" spcCol="0" rtlCol="0" fromWordArt="0" anchor="t" anchorCtr="0" forceAA="0" compatLnSpc="1">
+            <a:prstTxWarp prst="textNoShape">
+              <a:avLst/>
+            </a:prstTxWarp>
+            <a:spAutoFit/>
+          </a:bodyPr>
+          <a:lstStyle/>
+          <a:p>
+            <a:r>
+              <a:rPr lang="it-IT" sz="900" b="1" dirty="0">
+                <a:ea typeface="+mn-lt"/>
+                <a:cs typeface="+mn-lt"/>
+                <a:hlinkClick r:id="rId3"/>
+              </a:rPr>
+              <a:t>CrossTalk: Speculative Data Leaks Across Cores Are Real. </a:t>
+            </a:r>
+            <a:r>
+              <a:rPr lang="it-IT" sz="900">
+                <a:ea typeface="+mn-lt"/>
+                <a:cs typeface="+mn-lt"/>
+              </a:rPr>
+              <a:t>Ragab, H.; Milburn, A.; </a:t>
+            </a:r>
+            <a:r>
+              <a:rPr lang="it-IT" sz="900" dirty="0">
+                <a:ea typeface="+mn-lt"/>
+                <a:cs typeface="+mn-lt"/>
+                <a:hlinkClick r:id="rId4"/>
+              </a:rPr>
+              <a:t>Razavi, K.</a:t>
+            </a:r>
+            <a:r>
+              <a:rPr lang="it-IT" sz="900">
+                <a:ea typeface="+mn-lt"/>
+                <a:cs typeface="+mn-lt"/>
+              </a:rPr>
+              <a:t>; </a:t>
+            </a:r>
+            <a:r>
+              <a:rPr lang="it-IT" sz="900" dirty="0">
+                <a:ea typeface="+mn-lt"/>
+                <a:cs typeface="+mn-lt"/>
+                <a:hlinkClick r:id="rId5"/>
+              </a:rPr>
+              <a:t>Bos, H.</a:t>
+            </a:r>
+            <a:r>
+              <a:rPr lang="it-IT" sz="900">
+                <a:ea typeface="+mn-lt"/>
+                <a:cs typeface="+mn-lt"/>
+              </a:rPr>
+              <a:t>; and </a:t>
+            </a:r>
+            <a:r>
+              <a:rPr lang="it-IT" sz="900" dirty="0">
+                <a:ea typeface="+mn-lt"/>
+                <a:cs typeface="+mn-lt"/>
+                <a:hlinkClick r:id="rId6"/>
+              </a:rPr>
+              <a:t>Giuffrida, C.</a:t>
+            </a:r>
+            <a:r>
+              <a:rPr lang="it-IT" sz="900">
+                <a:ea typeface="+mn-lt"/>
+                <a:cs typeface="+mn-lt"/>
+              </a:rPr>
+              <a:t> In </a:t>
+            </a:r>
+            <a:r>
+              <a:rPr lang="it-IT" sz="900" i="1">
+                <a:ea typeface="+mn-lt"/>
+                <a:cs typeface="+mn-lt"/>
+              </a:rPr>
+              <a:t>S&amp;P</a:t>
+            </a:r>
+            <a:r>
+              <a:rPr lang="it-IT" sz="900">
+                <a:ea typeface="+mn-lt"/>
+                <a:cs typeface="+mn-lt"/>
+              </a:rPr>
+              <a:t>, May 2021. </a:t>
+            </a:r>
+            <a:r>
+              <a:rPr lang="it-IT" sz="900" i="1">
+                <a:ea typeface="+mn-lt"/>
+                <a:cs typeface="+mn-lt"/>
+              </a:rPr>
+              <a:t>Intel Bounty Reward</a:t>
+            </a:r>
+            <a:endParaRPr lang="it-IT"/>
+          </a:p>
+        </p:txBody>
+      </p:sp>
     </p:spTree>
   </p:cSld>
-  <mc:AlternateContent>
-    <mc:Choice Requires="p14">
-      <p:transition spd="slow" p14:dur="2000"/>
-    </mc:Choice>
-    <mc:Fallback>
-      <p:transition spd="slow"/>
-    </mc:Fallback>
-  </mc:AlternateContent>
+  <p:clrMapOvr>
+    <a:masterClrMapping/>
+  </p:clrMapOvr>
+</p:sld>
+</file>
+
+<file path=ppt/slides/slide4.xml><?xml version="1.0" encoding="utf-8"?>
+<p:sld xmlns:a="http://schemas.openxmlformats.org/drawingml/2006/main" xmlns:r="http://schemas.openxmlformats.org/officeDocument/2006/relationships" xmlns:p="http://schemas.openxmlformats.org/presentationml/2006/main">
+  <p:cSld>
+    <p:spTree>
+      <p:nvGrpSpPr>
+        <p:cNvPr id="1" name=""/>
+        <p:cNvGrpSpPr/>
+        <p:nvPr/>
+      </p:nvGrpSpPr>
+      <p:grpSpPr>
+        <a:xfrm>
+          <a:off x="0" y="0"/>
+          <a:ext cx="0" cy="0"/>
+          <a:chOff x="0" y="0"/>
+          <a:chExt cx="0" cy="0"/>
+        </a:xfrm>
+      </p:grpSpPr>
+      <p:sp>
+        <p:nvSpPr>
+          <p:cNvPr id="2" name="Titolo 1">
+            <a:extLst>
+              <a:ext uri="{FF2B5EF4-FFF2-40B4-BE49-F238E27FC236}">
+                <a16:creationId xmlns:a16="http://schemas.microsoft.com/office/drawing/2014/main" id="{2DA624EF-BBD0-416B-A375-73E8557D64AF}"/>
+              </a:ext>
+            </a:extLst>
+          </p:cNvPr>
+          <p:cNvSpPr>
+            <a:spLocks noGrp="1"/>
+          </p:cNvSpPr>
+          <p:nvPr>
+            <p:ph type="title"/>
+          </p:nvPr>
+        </p:nvSpPr>
+        <p:spPr/>
+        <p:txBody>
+          <a:bodyPr/>
+          <a:lstStyle/>
+          <a:p>
+            <a:r>
+              <a:rPr lang="it-IT" sz="4000"/>
+              <a:t>Listen the "noise" from another thread</a:t>
+            </a:r>
+            <a:endParaRPr lang="it-IT" sz="4000" dirty="0"/>
+          </a:p>
+        </p:txBody>
+      </p:sp>
+      <p:pic>
+        <p:nvPicPr>
+          <p:cNvPr id="3" name="Immagine 3">
+            <a:extLst>
+              <a:ext uri="{FF2B5EF4-FFF2-40B4-BE49-F238E27FC236}">
+                <a16:creationId xmlns:a16="http://schemas.microsoft.com/office/drawing/2014/main" id="{15E5A66F-C8BF-4EBC-916E-C7CC3ACF4862}"/>
+              </a:ext>
+            </a:extLst>
+          </p:cNvPr>
+          <p:cNvPicPr>
+            <a:picLocks noChangeAspect="1"/>
+          </p:cNvPicPr>
+          <p:nvPr/>
+        </p:nvPicPr>
+        <p:blipFill>
+          <a:blip r:embed="rId2"/>
+          <a:stretch>
+            <a:fillRect/>
+          </a:stretch>
+        </p:blipFill>
+        <p:spPr>
+          <a:xfrm>
+            <a:off x="502735" y="1510943"/>
+            <a:ext cx="4498726" cy="3257425"/>
+          </a:xfrm>
+          <a:prstGeom prst="rect">
+            <a:avLst/>
+          </a:prstGeom>
+        </p:spPr>
+      </p:pic>
+      <p:pic>
+        <p:nvPicPr>
+          <p:cNvPr id="4" name="Immagine 4" descr="Immagine che contiene testo&#10;&#10;Descrizione generata automaticamente">
+            <a:extLst>
+              <a:ext uri="{FF2B5EF4-FFF2-40B4-BE49-F238E27FC236}">
+                <a16:creationId xmlns:a16="http://schemas.microsoft.com/office/drawing/2014/main" id="{45A2AB56-CF1C-43FF-AF90-50F494AAA07F}"/>
+              </a:ext>
+            </a:extLst>
+          </p:cNvPr>
+          <p:cNvPicPr>
+            <a:picLocks noChangeAspect="1"/>
+          </p:cNvPicPr>
+          <p:nvPr/>
+        </p:nvPicPr>
+        <p:blipFill>
+          <a:blip r:embed="rId3"/>
+          <a:stretch>
+            <a:fillRect/>
+          </a:stretch>
+        </p:blipFill>
+        <p:spPr>
+          <a:xfrm>
+            <a:off x="5267149" y="1234351"/>
+            <a:ext cx="3788712" cy="3599974"/>
+          </a:xfrm>
+          <a:prstGeom prst="rect">
+            <a:avLst/>
+          </a:prstGeom>
+        </p:spPr>
+      </p:pic>
+      <p:sp>
+        <p:nvSpPr>
+          <p:cNvPr id="6" name="CasellaDiTesto 5">
+            <a:extLst>
+              <a:ext uri="{FF2B5EF4-FFF2-40B4-BE49-F238E27FC236}">
+                <a16:creationId xmlns:a16="http://schemas.microsoft.com/office/drawing/2014/main" id="{2CD5F06F-CED9-4246-939A-5798B9239405}"/>
+              </a:ext>
+            </a:extLst>
+          </p:cNvPr>
+          <p:cNvSpPr txBox="1"/>
+          <p:nvPr/>
+        </p:nvSpPr>
+        <p:spPr>
+          <a:xfrm>
+            <a:off x="354574" y="5132438"/>
+            <a:ext cx="9500026" cy="230832"/>
+          </a:xfrm>
+          <a:prstGeom prst="rect">
+            <a:avLst/>
+          </a:prstGeom>
+          <a:noFill/>
+        </p:spPr>
+        <p:txBody>
+          <a:bodyPr rot="0" spcFirstLastPara="0" vertOverflow="overflow" horzOverflow="overflow" vert="horz" wrap="square" lIns="91440" tIns="45720" rIns="91440" bIns="45720" numCol="1" spcCol="0" rtlCol="0" fromWordArt="0" anchor="t" anchorCtr="0" forceAA="0" compatLnSpc="1">
+            <a:prstTxWarp prst="textNoShape">
+              <a:avLst/>
+            </a:prstTxWarp>
+            <a:spAutoFit/>
+          </a:bodyPr>
+          <a:lstStyle/>
+          <a:p>
+            <a:r>
+              <a:rPr lang="it-IT" sz="900">
+                <a:ea typeface="+mn-lt"/>
+                <a:cs typeface="+mn-lt"/>
+              </a:rPr>
+              <a:t>S. van Schaik </a:t>
+            </a:r>
+            <a:r>
+              <a:rPr lang="it-IT" sz="900" i="1">
+                <a:ea typeface="+mn-lt"/>
+                <a:cs typeface="+mn-lt"/>
+              </a:rPr>
+              <a:t>et al</a:t>
+            </a:r>
+            <a:r>
+              <a:rPr lang="it-IT" sz="900">
+                <a:ea typeface="+mn-lt"/>
+                <a:cs typeface="+mn-lt"/>
+              </a:rPr>
+              <a:t>., "RIDL: Rogue In-Flight Data Load," </a:t>
+            </a:r>
+            <a:r>
+              <a:rPr lang="it-IT" sz="900" i="1">
+                <a:ea typeface="+mn-lt"/>
+                <a:cs typeface="+mn-lt"/>
+              </a:rPr>
+              <a:t>2019 IEEE Symposium on Security and Privacy (SP)</a:t>
+            </a:r>
+            <a:r>
+              <a:rPr lang="it-IT" sz="900">
+                <a:ea typeface="+mn-lt"/>
+                <a:cs typeface="+mn-lt"/>
+              </a:rPr>
+              <a:t>, San Francisco, CA, USA, 2019, pp. 88-105, doi: 10.1109/SP.2019.00087.</a:t>
+            </a:r>
+            <a:endParaRPr lang="it-IT" sz="900"/>
+          </a:p>
+        </p:txBody>
+      </p:sp>
+    </p:spTree>
+    <p:extLst>
+      <p:ext uri="{BB962C8B-B14F-4D97-AF65-F5344CB8AC3E}">
+        <p14:creationId xmlns:p14="http://schemas.microsoft.com/office/powerpoint/2010/main" val="1842562767"/>
+      </p:ext>
+    </p:extLst>
+  </p:cSld>
+  <p:clrMapOvr>
+    <a:masterClrMapping/>
+  </p:clrMapOvr>
+</p:sld>
+</file>
+
+<file path=ppt/slides/slide5.xml><?xml version="1.0" encoding="utf-8"?>
+<p:sld xmlns:a="http://schemas.openxmlformats.org/drawingml/2006/main" xmlns:r="http://schemas.openxmlformats.org/officeDocument/2006/relationships" xmlns:p="http://schemas.openxmlformats.org/presentationml/2006/main">
+  <p:cSld>
+    <p:spTree>
+      <p:nvGrpSpPr>
+        <p:cNvPr id="1" name=""/>
+        <p:cNvGrpSpPr/>
+        <p:nvPr/>
+      </p:nvGrpSpPr>
+      <p:grpSpPr>
+        <a:xfrm>
+          <a:off x="0" y="0"/>
+          <a:ext cx="0" cy="0"/>
+          <a:chOff x="0" y="0"/>
+          <a:chExt cx="0" cy="0"/>
+        </a:xfrm>
+      </p:grpSpPr>
+      <p:sp>
+        <p:nvSpPr>
+          <p:cNvPr id="2" name="Titolo 1">
+            <a:extLst>
+              <a:ext uri="{FF2B5EF4-FFF2-40B4-BE49-F238E27FC236}">
+                <a16:creationId xmlns:a16="http://schemas.microsoft.com/office/drawing/2014/main" id="{D3AD7C40-B9EB-4A5E-B54F-03A2F2BF4FAB}"/>
+              </a:ext>
+            </a:extLst>
+          </p:cNvPr>
+          <p:cNvSpPr>
+            <a:spLocks noGrp="1"/>
+          </p:cNvSpPr>
+          <p:nvPr>
+            <p:ph type="title"/>
+          </p:nvPr>
+        </p:nvSpPr>
+        <p:spPr/>
+        <p:txBody>
+          <a:bodyPr/>
+          <a:lstStyle/>
+          <a:p>
+            <a:pPr algn="ctr"/>
+            <a:r>
+              <a:rPr lang="it-IT"/>
+              <a:t>Line Fill Buffer</a:t>
+            </a:r>
+          </a:p>
+        </p:txBody>
+      </p:sp>
+      <p:pic>
+        <p:nvPicPr>
+          <p:cNvPr id="3" name="Immagine 3">
+            <a:extLst>
+              <a:ext uri="{FF2B5EF4-FFF2-40B4-BE49-F238E27FC236}">
+                <a16:creationId xmlns:a16="http://schemas.microsoft.com/office/drawing/2014/main" id="{BBA0E518-4CE3-413B-914D-7A4970870008}"/>
+              </a:ext>
+            </a:extLst>
+          </p:cNvPr>
+          <p:cNvPicPr>
+            <a:picLocks noChangeAspect="1"/>
+          </p:cNvPicPr>
+          <p:nvPr/>
+        </p:nvPicPr>
+        <p:blipFill>
+          <a:blip r:embed="rId2"/>
+          <a:stretch>
+            <a:fillRect/>
+          </a:stretch>
+        </p:blipFill>
+        <p:spPr>
+          <a:xfrm>
+            <a:off x="502735" y="1113875"/>
+            <a:ext cx="4717192" cy="3537168"/>
+          </a:xfrm>
+          <a:prstGeom prst="rect">
+            <a:avLst/>
+          </a:prstGeom>
+        </p:spPr>
+      </p:pic>
+      <p:sp>
+        <p:nvSpPr>
+          <p:cNvPr id="5" name="CasellaDiTesto 4">
+            <a:extLst>
+              <a:ext uri="{FF2B5EF4-FFF2-40B4-BE49-F238E27FC236}">
+                <a16:creationId xmlns:a16="http://schemas.microsoft.com/office/drawing/2014/main" id="{8395F940-2127-4701-BE6F-0CBA0C9DBDA7}"/>
+              </a:ext>
+            </a:extLst>
+          </p:cNvPr>
+          <p:cNvSpPr txBox="1"/>
+          <p:nvPr/>
+        </p:nvSpPr>
+        <p:spPr>
+          <a:xfrm>
+            <a:off x="354574" y="5132438"/>
+            <a:ext cx="9500026" cy="230832"/>
+          </a:xfrm>
+          <a:prstGeom prst="rect">
+            <a:avLst/>
+          </a:prstGeom>
+          <a:noFill/>
+        </p:spPr>
+        <p:txBody>
+          <a:bodyPr rot="0" spcFirstLastPara="0" vertOverflow="overflow" horzOverflow="overflow" vert="horz" wrap="square" lIns="91440" tIns="45720" rIns="91440" bIns="45720" numCol="1" spcCol="0" rtlCol="0" fromWordArt="0" anchor="t" anchorCtr="0" forceAA="0" compatLnSpc="1">
+            <a:prstTxWarp prst="textNoShape">
+              <a:avLst/>
+            </a:prstTxWarp>
+            <a:spAutoFit/>
+          </a:bodyPr>
+          <a:lstStyle/>
+          <a:p>
+            <a:r>
+              <a:rPr lang="it-IT" sz="900">
+                <a:ea typeface="+mn-lt"/>
+                <a:cs typeface="+mn-lt"/>
+              </a:rPr>
+              <a:t>S. van Schaik </a:t>
+            </a:r>
+            <a:r>
+              <a:rPr lang="it-IT" sz="900" i="1">
+                <a:ea typeface="+mn-lt"/>
+                <a:cs typeface="+mn-lt"/>
+              </a:rPr>
+              <a:t>et al</a:t>
+            </a:r>
+            <a:r>
+              <a:rPr lang="it-IT" sz="900">
+                <a:ea typeface="+mn-lt"/>
+                <a:cs typeface="+mn-lt"/>
+              </a:rPr>
+              <a:t>., "RIDL: Rogue In-Flight Data Load," </a:t>
+            </a:r>
+            <a:r>
+              <a:rPr lang="it-IT" sz="900" i="1">
+                <a:ea typeface="+mn-lt"/>
+                <a:cs typeface="+mn-lt"/>
+              </a:rPr>
+              <a:t>2019 IEEE Symposium on Security and Privacy (SP)</a:t>
+            </a:r>
+            <a:r>
+              <a:rPr lang="it-IT" sz="900">
+                <a:ea typeface="+mn-lt"/>
+                <a:cs typeface="+mn-lt"/>
+              </a:rPr>
+              <a:t>, San Francisco, CA, USA, 2019, pp. 88-105, doi: 10.1109/SP.2019.00087.</a:t>
+            </a:r>
+            <a:endParaRPr lang="it-IT" sz="900"/>
+          </a:p>
+        </p:txBody>
+      </p:sp>
+      <p:sp>
+        <p:nvSpPr>
+          <p:cNvPr id="9" name="CasellaDiTesto 8">
+            <a:extLst>
+              <a:ext uri="{FF2B5EF4-FFF2-40B4-BE49-F238E27FC236}">
+                <a16:creationId xmlns:a16="http://schemas.microsoft.com/office/drawing/2014/main" id="{77C4A93F-915A-43F1-ABF9-9286569D0B66}"/>
+              </a:ext>
+            </a:extLst>
+          </p:cNvPr>
+          <p:cNvSpPr txBox="1"/>
+          <p:nvPr/>
+        </p:nvSpPr>
+        <p:spPr>
+          <a:xfrm>
+            <a:off x="5735175" y="1063153"/>
+            <a:ext cx="3624864" cy="1985672"/>
+          </a:xfrm>
+          <a:prstGeom prst="rect">
+            <a:avLst/>
+          </a:prstGeom>
+          <a:noFill/>
+        </p:spPr>
+        <p:txBody>
+          <a:bodyPr rot="0" spcFirstLastPara="0" vertOverflow="overflow" horzOverflow="overflow" vert="horz" wrap="square" lIns="91440" tIns="45720" rIns="91440" bIns="45720" numCol="1" spcCol="0" rtlCol="0" fromWordArt="0" anchor="t" anchorCtr="0" forceAA="0" compatLnSpc="1">
+            <a:prstTxWarp prst="textNoShape">
+              <a:avLst/>
+            </a:prstTxWarp>
+            <a:spAutoFit/>
+          </a:bodyPr>
+          <a:lstStyle/>
+          <a:p>
+            <a:pPr>
+              <a:lnSpc>
+                <a:spcPct val="150000"/>
+              </a:lnSpc>
+            </a:pPr>
+            <a:r>
+              <a:rPr lang="en-US" sz="2000" b="1">
+                <a:ea typeface="+mn-lt"/>
+                <a:cs typeface="+mn-lt"/>
+              </a:rPr>
+              <a:t>µ-optimization:</a:t>
+            </a:r>
+            <a:endParaRPr lang="it-IT" sz="2000" b="1"/>
+          </a:p>
+          <a:p>
+            <a:pPr marL="285750" indent="-285750">
+              <a:lnSpc>
+                <a:spcPct val="150000"/>
+              </a:lnSpc>
+              <a:buFont typeface="Arial"/>
+              <a:buChar char="•"/>
+            </a:pPr>
+            <a:r>
+              <a:rPr lang="en-US" sz="1600">
+                <a:ea typeface="+mn-lt"/>
+                <a:cs typeface="+mn-lt"/>
+              </a:rPr>
+              <a:t>Non-blocking cache</a:t>
+            </a:r>
+            <a:endParaRPr lang="en-US" sz="1600"/>
+          </a:p>
+          <a:p>
+            <a:pPr marL="285750" indent="-285750">
+              <a:lnSpc>
+                <a:spcPct val="150000"/>
+              </a:lnSpc>
+              <a:buFont typeface="Arial"/>
+              <a:buChar char="•"/>
+            </a:pPr>
+            <a:r>
+              <a:rPr lang="it-IT" sz="1600">
+                <a:ea typeface="+mn-lt"/>
+                <a:cs typeface="+mn-lt"/>
+              </a:rPr>
+              <a:t>Load squashing</a:t>
+            </a:r>
+          </a:p>
+          <a:p>
+            <a:pPr marL="285750" indent="-285750">
+              <a:lnSpc>
+                <a:spcPct val="150000"/>
+              </a:lnSpc>
+              <a:buFont typeface="Arial"/>
+              <a:buChar char="•"/>
+            </a:pPr>
+            <a:r>
+              <a:rPr lang="it-IT" sz="1600">
+                <a:ea typeface="+mn-lt"/>
+                <a:cs typeface="+mn-lt"/>
+              </a:rPr>
+              <a:t>Write combining</a:t>
+            </a:r>
+          </a:p>
+          <a:p>
+            <a:pPr marL="285750" indent="-285750">
+              <a:lnSpc>
+                <a:spcPct val="150000"/>
+              </a:lnSpc>
+              <a:buFont typeface="Arial"/>
+              <a:buChar char="•"/>
+            </a:pPr>
+            <a:r>
+              <a:rPr lang="it-IT" sz="1600">
+                <a:ea typeface="+mn-lt"/>
+                <a:cs typeface="+mn-lt"/>
+              </a:rPr>
+              <a:t>Non-temporal requests</a:t>
+            </a:r>
+            <a:endParaRPr lang="it-IT" sz="1600">
+              <a:cs typeface="Arial"/>
+            </a:endParaRPr>
+          </a:p>
+        </p:txBody>
+      </p:sp>
+      <p:sp>
+        <p:nvSpPr>
+          <p:cNvPr id="10" name="CasellaDiTesto 9">
+            <a:extLst>
+              <a:ext uri="{FF2B5EF4-FFF2-40B4-BE49-F238E27FC236}">
+                <a16:creationId xmlns:a16="http://schemas.microsoft.com/office/drawing/2014/main" id="{639AB3F7-F441-43BE-8F24-3EF9E25FB1AC}"/>
+              </a:ext>
+            </a:extLst>
+          </p:cNvPr>
+          <p:cNvSpPr txBox="1"/>
+          <p:nvPr/>
+        </p:nvSpPr>
+        <p:spPr>
+          <a:xfrm>
+            <a:off x="5460335" y="3269297"/>
+            <a:ext cx="4280259" cy="1154675"/>
+          </a:xfrm>
+          <a:prstGeom prst="rect">
+            <a:avLst/>
+          </a:prstGeom>
+          <a:noFill/>
+          <a:ln>
+            <a:solidFill>
+              <a:schemeClr val="tx1"/>
+            </a:solidFill>
+          </a:ln>
+        </p:spPr>
+        <p:txBody>
+          <a:bodyPr rot="0" spcFirstLastPara="0" vertOverflow="overflow" horzOverflow="overflow" vert="horz" wrap="square" lIns="91440" tIns="45720" rIns="91440" bIns="45720" numCol="1" spcCol="0" rtlCol="0" fromWordArt="0" anchor="t" anchorCtr="0" forceAA="0" compatLnSpc="1">
+            <a:prstTxWarp prst="textNoShape">
+              <a:avLst/>
+            </a:prstTxWarp>
+            <a:spAutoFit/>
+          </a:bodyPr>
+          <a:lstStyle/>
+          <a:p>
+            <a:pPr>
+              <a:lnSpc>
+                <a:spcPct val="150000"/>
+              </a:lnSpc>
+            </a:pPr>
+            <a:r>
+              <a:rPr lang="en-US" sz="1600">
+                <a:ea typeface="+mn-lt"/>
+                <a:cs typeface="+mn-lt"/>
+              </a:rPr>
+              <a:t>Reads that are </a:t>
+            </a:r>
+            <a:r>
+              <a:rPr lang="en-US" sz="1600">
+                <a:solidFill>
+                  <a:srgbClr val="FF0000"/>
+                </a:solidFill>
+                <a:ea typeface="+mn-lt"/>
+                <a:cs typeface="+mn-lt"/>
+              </a:rPr>
+              <a:t>not served from L1d</a:t>
+            </a:r>
+            <a:r>
+              <a:rPr lang="en-US" sz="1600">
+                <a:ea typeface="+mn-lt"/>
+                <a:cs typeface="+mn-lt"/>
+              </a:rPr>
+              <a:t> pull data through the LFB, while writes push data through the LFB to either L1d or memory</a:t>
+            </a:r>
+            <a:endParaRPr lang="it-IT" sz="1600"/>
+          </a:p>
+        </p:txBody>
+      </p:sp>
+    </p:spTree>
+    <p:extLst>
+      <p:ext uri="{BB962C8B-B14F-4D97-AF65-F5344CB8AC3E}">
+        <p14:creationId xmlns:p14="http://schemas.microsoft.com/office/powerpoint/2010/main" val="3481261451"/>
+      </p:ext>
+    </p:extLst>
+  </p:cSld>
+  <p:clrMapOvr>
+    <a:masterClrMapping/>
+  </p:clrMapOvr>
+</p:sld>
+</file>
+
+<file path=ppt/slides/slide6.xml><?xml version="1.0" encoding="utf-8"?>
+<p:sld xmlns:a="http://schemas.openxmlformats.org/drawingml/2006/main" xmlns:r="http://schemas.openxmlformats.org/officeDocument/2006/relationships" xmlns:p="http://schemas.openxmlformats.org/presentationml/2006/main">
+  <p:cSld>
+    <p:spTree>
+      <p:nvGrpSpPr>
+        <p:cNvPr id="1" name=""/>
+        <p:cNvGrpSpPr/>
+        <p:nvPr/>
+      </p:nvGrpSpPr>
+      <p:grpSpPr>
+        <a:xfrm>
+          <a:off x="0" y="0"/>
+          <a:ext cx="0" cy="0"/>
+          <a:chOff x="0" y="0"/>
+          <a:chExt cx="0" cy="0"/>
+        </a:xfrm>
+      </p:grpSpPr>
+      <p:sp>
+        <p:nvSpPr>
+          <p:cNvPr id="2" name="Titolo 1">
+            <a:extLst>
+              <a:ext uri="{FF2B5EF4-FFF2-40B4-BE49-F238E27FC236}">
+                <a16:creationId xmlns:a16="http://schemas.microsoft.com/office/drawing/2014/main" id="{2FE69BFD-1857-4D64-B64D-B6D97DCCB2D0}"/>
+              </a:ext>
+            </a:extLst>
+          </p:cNvPr>
+          <p:cNvSpPr>
+            <a:spLocks noGrp="1"/>
+          </p:cNvSpPr>
+          <p:nvPr>
+            <p:ph type="title"/>
+          </p:nvPr>
+        </p:nvSpPr>
+        <p:spPr/>
+        <p:txBody>
+          <a:bodyPr/>
+          <a:lstStyle/>
+          <a:p>
+            <a:pPr algn="ctr"/>
+            <a:r>
+              <a:rPr lang="it-IT">
+                <a:ea typeface="+mj-lt"/>
+                <a:cs typeface="+mj-lt"/>
+              </a:rPr>
+              <a:t>Synchronization</a:t>
+            </a:r>
+            <a:endParaRPr lang="it-IT"/>
+          </a:p>
+        </p:txBody>
+      </p:sp>
+      <p:sp>
+        <p:nvSpPr>
+          <p:cNvPr id="3" name="CasellaDiTesto 2">
+            <a:extLst>
+              <a:ext uri="{FF2B5EF4-FFF2-40B4-BE49-F238E27FC236}">
+                <a16:creationId xmlns:a16="http://schemas.microsoft.com/office/drawing/2014/main" id="{8971C3B6-016B-4017-B074-B8B52B92F748}"/>
+              </a:ext>
+            </a:extLst>
+          </p:cNvPr>
+          <p:cNvSpPr txBox="1"/>
+          <p:nvPr/>
+        </p:nvSpPr>
+        <p:spPr>
+          <a:xfrm>
+            <a:off x="362372" y="1094336"/>
+            <a:ext cx="9320572" cy="646331"/>
+          </a:xfrm>
+          <a:prstGeom prst="rect">
+            <a:avLst/>
+          </a:prstGeom>
+          <a:noFill/>
+        </p:spPr>
+        <p:txBody>
+          <a:bodyPr rot="0" spcFirstLastPara="0" vertOverflow="overflow" horzOverflow="overflow" vert="horz" wrap="square" lIns="91440" tIns="45720" rIns="91440" bIns="45720" numCol="1" spcCol="0" rtlCol="0" fromWordArt="0" anchor="t" anchorCtr="0" forceAA="0" compatLnSpc="1">
+            <a:prstTxWarp prst="textNoShape">
+              <a:avLst/>
+            </a:prstTxWarp>
+            <a:spAutoFit/>
+          </a:bodyPr>
+          <a:lstStyle/>
+          <a:p>
+            <a:r>
+              <a:rPr lang="it-IT">
+                <a:ea typeface="+mn-lt"/>
+                <a:cs typeface="+mn-lt"/>
+              </a:rPr>
+              <a:t>To leak information, the attacker must make sure that the right data is visible in the LFB at the right time, by synchronizing with the victim. This can be done in 3 different ways:</a:t>
+            </a:r>
+            <a:endParaRPr lang="it-IT"/>
+          </a:p>
+        </p:txBody>
+      </p:sp>
+      <p:sp>
+        <p:nvSpPr>
+          <p:cNvPr id="4" name="CasellaDiTesto 3">
+            <a:extLst>
+              <a:ext uri="{FF2B5EF4-FFF2-40B4-BE49-F238E27FC236}">
+                <a16:creationId xmlns:a16="http://schemas.microsoft.com/office/drawing/2014/main" id="{E0564CE1-BFFA-458A-A311-1E121F15627D}"/>
+              </a:ext>
+            </a:extLst>
+          </p:cNvPr>
+          <p:cNvSpPr txBox="1"/>
+          <p:nvPr/>
+        </p:nvSpPr>
+        <p:spPr>
+          <a:xfrm>
+            <a:off x="279105" y="2164883"/>
+            <a:ext cx="3039688" cy="2723823"/>
+          </a:xfrm>
+          <a:prstGeom prst="rect">
+            <a:avLst/>
+          </a:prstGeom>
+          <a:noFill/>
+        </p:spPr>
+        <p:txBody>
+          <a:bodyPr rot="0" spcFirstLastPara="0" vertOverflow="overflow" horzOverflow="overflow" vert="horz" wrap="square" lIns="91440" tIns="45720" rIns="91440" bIns="45720" numCol="1" spcCol="0" rtlCol="0" fromWordArt="0" anchor="t" anchorCtr="0" forceAA="0" compatLnSpc="1">
+            <a:prstTxWarp prst="textNoShape">
+              <a:avLst/>
+            </a:prstTxWarp>
+            <a:spAutoFit/>
+          </a:bodyPr>
+          <a:lstStyle/>
+          <a:p>
+            <a:pPr algn="ctr">
+              <a:lnSpc>
+                <a:spcPct val="150000"/>
+              </a:lnSpc>
+            </a:pPr>
+            <a:r>
+              <a:rPr lang="it-IT" b="1">
+                <a:ea typeface="+mn-lt"/>
+                <a:cs typeface="+mn-lt"/>
+              </a:rPr>
+              <a:t>Serialization</a:t>
+            </a:r>
+            <a:endParaRPr lang="it-IT"/>
+          </a:p>
+          <a:p>
+            <a:r>
+              <a:rPr lang="it-IT" sz="1600" i="1">
+                <a:ea typeface="+mn-lt"/>
+                <a:cs typeface="+mn-lt"/>
+              </a:rPr>
+              <a:t>mfence </a:t>
+            </a:r>
+            <a:r>
+              <a:rPr lang="it-IT" sz="1600">
+                <a:ea typeface="+mn-lt"/>
+                <a:cs typeface="+mn-lt"/>
+              </a:rPr>
+              <a:t>instruction</a:t>
+            </a:r>
+            <a:r>
+              <a:rPr lang="it-IT" sz="1600" i="1" dirty="0">
+                <a:ea typeface="+mn-lt"/>
+                <a:cs typeface="+mn-lt"/>
+              </a:rPr>
+              <a:t> </a:t>
+            </a:r>
+            <a:r>
+              <a:rPr lang="it-IT" sz="1600">
+                <a:ea typeface="+mn-lt"/>
+                <a:cs typeface="+mn-lt"/>
+              </a:rPr>
+              <a:t>guarantees that </a:t>
+            </a:r>
+            <a:r>
+              <a:rPr lang="it-IT" sz="1600" dirty="0">
+                <a:ea typeface="+mn-lt"/>
+                <a:cs typeface="+mn-lt"/>
+              </a:rPr>
+              <a:t>both load and stores </a:t>
+            </a:r>
+            <a:r>
+              <a:rPr lang="it-IT" sz="1600">
+                <a:ea typeface="+mn-lt"/>
+                <a:cs typeface="+mn-lt"/>
+              </a:rPr>
+              <a:t>before it's execution become globally visible (eg in the LFB).</a:t>
+            </a:r>
+            <a:endParaRPr lang="it-IT"/>
+          </a:p>
+          <a:p>
+            <a:r>
+              <a:rPr lang="it-IT" sz="1600">
+                <a:ea typeface="+mn-lt"/>
+                <a:cs typeface="+mn-lt"/>
+              </a:rPr>
+              <a:t>The </a:t>
+            </a:r>
+            <a:r>
+              <a:rPr lang="it-IT" sz="1600" i="1">
+                <a:ea typeface="+mn-lt"/>
+                <a:cs typeface="+mn-lt"/>
+              </a:rPr>
+              <a:t>mfence </a:t>
+            </a:r>
+            <a:r>
+              <a:rPr lang="it-IT" sz="1600">
+                <a:ea typeface="+mn-lt"/>
+                <a:cs typeface="+mn-lt"/>
+              </a:rPr>
+              <a:t>instruction forms a point of synchronization that allows us to observe the last few loads and stores before the buffers are completely drained.</a:t>
+            </a:r>
+            <a:endParaRPr lang="it-IT" sz="1600"/>
+          </a:p>
+        </p:txBody>
+      </p:sp>
+      <p:sp>
+        <p:nvSpPr>
+          <p:cNvPr id="5" name="CasellaDiTesto 4">
+            <a:extLst>
+              <a:ext uri="{FF2B5EF4-FFF2-40B4-BE49-F238E27FC236}">
+                <a16:creationId xmlns:a16="http://schemas.microsoft.com/office/drawing/2014/main" id="{1F6EE1F6-E1CB-43D7-8A9C-04E62A8DC7C9}"/>
+              </a:ext>
+            </a:extLst>
+          </p:cNvPr>
+          <p:cNvSpPr txBox="1"/>
+          <p:nvPr/>
+        </p:nvSpPr>
+        <p:spPr>
+          <a:xfrm>
+            <a:off x="3678853" y="2164883"/>
+            <a:ext cx="2844630" cy="2231380"/>
+          </a:xfrm>
+          <a:prstGeom prst="rect">
+            <a:avLst/>
+          </a:prstGeom>
+          <a:noFill/>
+        </p:spPr>
+        <p:txBody>
+          <a:bodyPr rot="0" spcFirstLastPara="0" vertOverflow="overflow" horzOverflow="overflow" vert="horz" wrap="square" lIns="91440" tIns="45720" rIns="91440" bIns="45720" numCol="1" spcCol="0" rtlCol="0" fromWordArt="0" anchor="t" anchorCtr="0" forceAA="0" compatLnSpc="1">
+            <a:prstTxWarp prst="textNoShape">
+              <a:avLst/>
+            </a:prstTxWarp>
+            <a:spAutoFit/>
+          </a:bodyPr>
+          <a:lstStyle/>
+          <a:p>
+            <a:pPr algn="ctr">
+              <a:lnSpc>
+                <a:spcPct val="150000"/>
+              </a:lnSpc>
+            </a:pPr>
+            <a:r>
+              <a:rPr lang="it-IT" b="1">
+                <a:ea typeface="+mn-lt"/>
+                <a:cs typeface="+mn-lt"/>
+              </a:rPr>
+              <a:t>Contention</a:t>
+            </a:r>
+          </a:p>
+          <a:p>
+            <a:r>
+              <a:rPr lang="it-IT" sz="1600" dirty="0">
+                <a:ea typeface="+mn-lt"/>
+                <a:cs typeface="+mn-lt"/>
+              </a:rPr>
+              <a:t>With victim and attacker running in the same hardware thread (e.g., in a sandbox, without SMT), we can create contention forcing </a:t>
+            </a:r>
+            <a:r>
+              <a:rPr lang="it-IT" sz="1600">
+                <a:ea typeface="+mn-lt"/>
+                <a:cs typeface="+mn-lt"/>
+              </a:rPr>
+              <a:t>entries to be evicted from the LFB</a:t>
+            </a:r>
+            <a:r>
+              <a:rPr lang="it-IT" sz="1600" dirty="0">
+                <a:ea typeface="+mn-lt"/>
+                <a:cs typeface="+mn-lt"/>
+              </a:rPr>
+              <a:t>.</a:t>
+            </a:r>
+            <a:endParaRPr lang="it-IT" sz="1600" dirty="0"/>
+          </a:p>
+        </p:txBody>
+      </p:sp>
+      <p:sp>
+        <p:nvSpPr>
+          <p:cNvPr id="6" name="CasellaDiTesto 5">
+            <a:extLst>
+              <a:ext uri="{FF2B5EF4-FFF2-40B4-BE49-F238E27FC236}">
+                <a16:creationId xmlns:a16="http://schemas.microsoft.com/office/drawing/2014/main" id="{0030B980-37BF-42DE-9B41-EA80FD035577}"/>
+              </a:ext>
+            </a:extLst>
+          </p:cNvPr>
+          <p:cNvSpPr txBox="1"/>
+          <p:nvPr/>
+        </p:nvSpPr>
+        <p:spPr>
+          <a:xfrm>
+            <a:off x="6718995" y="2164883"/>
+            <a:ext cx="2844630" cy="2970044"/>
+          </a:xfrm>
+          <a:prstGeom prst="rect">
+            <a:avLst/>
+          </a:prstGeom>
+          <a:noFill/>
+        </p:spPr>
+        <p:txBody>
+          <a:bodyPr rot="0" spcFirstLastPara="0" vertOverflow="overflow" horzOverflow="overflow" vert="horz" wrap="square" lIns="91440" tIns="45720" rIns="91440" bIns="45720" numCol="1" spcCol="0" rtlCol="0" fromWordArt="0" anchor="t" anchorCtr="0" forceAA="0" compatLnSpc="1">
+            <a:prstTxWarp prst="textNoShape">
+              <a:avLst/>
+            </a:prstTxWarp>
+            <a:spAutoFit/>
+          </a:bodyPr>
+          <a:lstStyle/>
+          <a:p>
+            <a:pPr algn="ctr">
+              <a:lnSpc>
+                <a:spcPct val="150000"/>
+              </a:lnSpc>
+            </a:pPr>
+            <a:r>
+              <a:rPr lang="it-IT" b="1">
+                <a:ea typeface="+mn-lt"/>
+                <a:cs typeface="+mn-lt"/>
+              </a:rPr>
+              <a:t>Eviction</a:t>
+            </a:r>
+            <a:endParaRPr lang="it-IT"/>
+          </a:p>
+          <a:p>
+            <a:r>
+              <a:rPr lang="it-IT" sz="1600" dirty="0">
+                <a:ea typeface="+mn-lt"/>
+                <a:cs typeface="+mn-lt"/>
+              </a:rPr>
+              <a:t>We can control the values that we leak from the victim by evicting cache entries from the cache set in which we are interested. If these </a:t>
+            </a:r>
+            <a:r>
+              <a:rPr lang="it-IT" sz="1600">
+                <a:ea typeface="+mn-lt"/>
+                <a:cs typeface="+mn-lt"/>
+              </a:rPr>
+              <a:t>cache lines were dirty, the </a:t>
+            </a:r>
+            <a:r>
+              <a:rPr lang="it-IT" sz="1600" dirty="0">
+                <a:ea typeface="+mn-lt"/>
+                <a:cs typeface="+mn-lt"/>
+              </a:rPr>
+              <a:t>processor has to write them back through the memory hierarchy and will do this </a:t>
+            </a:r>
+            <a:r>
+              <a:rPr lang="it-IT" sz="1600">
+                <a:ea typeface="+mn-lt"/>
+                <a:cs typeface="+mn-lt"/>
+              </a:rPr>
+              <a:t>through the LFB.</a:t>
+            </a:r>
+            <a:endParaRPr lang="it-IT" sz="1600" dirty="0"/>
+          </a:p>
+        </p:txBody>
+      </p:sp>
+    </p:spTree>
+    <p:extLst>
+      <p:ext uri="{BB962C8B-B14F-4D97-AF65-F5344CB8AC3E}">
+        <p14:creationId xmlns:p14="http://schemas.microsoft.com/office/powerpoint/2010/main" val="1434962918"/>
+      </p:ext>
+    </p:extLst>
+  </p:cSld>
+  <p:clrMapOvr>
+    <a:masterClrMapping/>
+  </p:clrMapOvr>
+</p:sld>
+</file>
+
+<file path=ppt/slides/slide7.xml><?xml version="1.0" encoding="utf-8"?>
+<p:sld xmlns:a="http://schemas.openxmlformats.org/drawingml/2006/main" xmlns:r="http://schemas.openxmlformats.org/officeDocument/2006/relationships" xmlns:p="http://schemas.openxmlformats.org/presentationml/2006/main">
+  <p:cSld>
+    <p:spTree>
+      <p:nvGrpSpPr>
+        <p:cNvPr id="1" name=""/>
+        <p:cNvGrpSpPr/>
+        <p:nvPr/>
+      </p:nvGrpSpPr>
+      <p:grpSpPr>
+        <a:xfrm>
+          <a:off x="0" y="0"/>
+          <a:ext cx="0" cy="0"/>
+          <a:chOff x="0" y="0"/>
+          <a:chExt cx="0" cy="0"/>
+        </a:xfrm>
+      </p:grpSpPr>
+      <p:sp>
+        <p:nvSpPr>
+          <p:cNvPr id="2" name="Titolo 1">
+            <a:extLst>
+              <a:ext uri="{FF2B5EF4-FFF2-40B4-BE49-F238E27FC236}">
+                <a16:creationId xmlns:a16="http://schemas.microsoft.com/office/drawing/2014/main" id="{922B153C-E8E4-4AAA-B491-1EAF044B109D}"/>
+              </a:ext>
+            </a:extLst>
+          </p:cNvPr>
+          <p:cNvSpPr>
+            <a:spLocks noGrp="1"/>
+          </p:cNvSpPr>
+          <p:nvPr>
+            <p:ph type="title"/>
+          </p:nvPr>
+        </p:nvSpPr>
+        <p:spPr/>
+        <p:txBody>
+          <a:bodyPr/>
+          <a:lstStyle/>
+          <a:p>
+            <a:pPr algn="ctr"/>
+            <a:r>
+              <a:rPr lang="it-IT"/>
+              <a:t>CrossTalk</a:t>
+            </a:r>
+          </a:p>
+        </p:txBody>
+      </p:sp>
+      <p:pic>
+        <p:nvPicPr>
+          <p:cNvPr id="4" name="Immagine 4">
+            <a:extLst>
+              <a:ext uri="{FF2B5EF4-FFF2-40B4-BE49-F238E27FC236}">
+                <a16:creationId xmlns:a16="http://schemas.microsoft.com/office/drawing/2014/main" id="{060F1EDC-4C68-4A95-B386-9E95F1CEA07D}"/>
+              </a:ext>
+            </a:extLst>
+          </p:cNvPr>
+          <p:cNvPicPr>
+            <a:picLocks noChangeAspect="1"/>
+          </p:cNvPicPr>
+          <p:nvPr/>
+        </p:nvPicPr>
+        <p:blipFill>
+          <a:blip r:embed="rId2"/>
+          <a:stretch>
+            <a:fillRect/>
+          </a:stretch>
+        </p:blipFill>
+        <p:spPr>
+          <a:xfrm>
+            <a:off x="338524" y="1093195"/>
+            <a:ext cx="4858481" cy="3902895"/>
+          </a:xfrm>
+          <a:prstGeom prst="rect">
+            <a:avLst/>
+          </a:prstGeom>
+        </p:spPr>
+      </p:pic>
+      <p:sp>
+        <p:nvSpPr>
+          <p:cNvPr id="6" name="CasellaDiTesto 5">
+            <a:extLst>
+              <a:ext uri="{FF2B5EF4-FFF2-40B4-BE49-F238E27FC236}">
+                <a16:creationId xmlns:a16="http://schemas.microsoft.com/office/drawing/2014/main" id="{9B86425B-1231-4F37-94FB-6CCCE7AAA2C5}"/>
+              </a:ext>
+            </a:extLst>
+          </p:cNvPr>
+          <p:cNvSpPr txBox="1"/>
+          <p:nvPr/>
+        </p:nvSpPr>
+        <p:spPr>
+          <a:xfrm>
+            <a:off x="471544" y="5116847"/>
+            <a:ext cx="9500026" cy="230832"/>
+          </a:xfrm>
+          <a:prstGeom prst="rect">
+            <a:avLst/>
+          </a:prstGeom>
+          <a:noFill/>
+        </p:spPr>
+        <p:txBody>
+          <a:bodyPr rot="0" spcFirstLastPara="0" vertOverflow="overflow" horzOverflow="overflow" vert="horz" wrap="square" lIns="91440" tIns="45720" rIns="91440" bIns="45720" numCol="1" spcCol="0" rtlCol="0" fromWordArt="0" anchor="t" anchorCtr="0" forceAA="0" compatLnSpc="1">
+            <a:prstTxWarp prst="textNoShape">
+              <a:avLst/>
+            </a:prstTxWarp>
+            <a:spAutoFit/>
+          </a:bodyPr>
+          <a:lstStyle/>
+          <a:p>
+            <a:r>
+              <a:rPr lang="it-IT" sz="900" b="1" dirty="0">
+                <a:ea typeface="+mn-lt"/>
+                <a:cs typeface="+mn-lt"/>
+                <a:hlinkClick r:id="rId3"/>
+              </a:rPr>
+              <a:t>CrossTalk: Speculative Data Leaks Across Cores Are Real. </a:t>
+            </a:r>
+            <a:r>
+              <a:rPr lang="it-IT" sz="900">
+                <a:ea typeface="+mn-lt"/>
+                <a:cs typeface="+mn-lt"/>
+              </a:rPr>
+              <a:t>Ragab, H.; Milburn, A.; </a:t>
+            </a:r>
+            <a:r>
+              <a:rPr lang="it-IT" sz="900" dirty="0">
+                <a:ea typeface="+mn-lt"/>
+                <a:cs typeface="+mn-lt"/>
+                <a:hlinkClick r:id="rId4"/>
+              </a:rPr>
+              <a:t>Razavi, K.</a:t>
+            </a:r>
+            <a:r>
+              <a:rPr lang="it-IT" sz="900">
+                <a:ea typeface="+mn-lt"/>
+                <a:cs typeface="+mn-lt"/>
+              </a:rPr>
+              <a:t>; </a:t>
+            </a:r>
+            <a:r>
+              <a:rPr lang="it-IT" sz="900" dirty="0">
+                <a:ea typeface="+mn-lt"/>
+                <a:cs typeface="+mn-lt"/>
+                <a:hlinkClick r:id="rId5"/>
+              </a:rPr>
+              <a:t>Bos, H.</a:t>
+            </a:r>
+            <a:r>
+              <a:rPr lang="it-IT" sz="900">
+                <a:ea typeface="+mn-lt"/>
+                <a:cs typeface="+mn-lt"/>
+              </a:rPr>
+              <a:t>; and </a:t>
+            </a:r>
+            <a:r>
+              <a:rPr lang="it-IT" sz="900" dirty="0">
+                <a:ea typeface="+mn-lt"/>
+                <a:cs typeface="+mn-lt"/>
+                <a:hlinkClick r:id="rId6"/>
+              </a:rPr>
+              <a:t>Giuffrida, C.</a:t>
+            </a:r>
+            <a:r>
+              <a:rPr lang="it-IT" sz="900">
+                <a:ea typeface="+mn-lt"/>
+                <a:cs typeface="+mn-lt"/>
+              </a:rPr>
+              <a:t> In </a:t>
+            </a:r>
+            <a:r>
+              <a:rPr lang="it-IT" sz="900" i="1">
+                <a:ea typeface="+mn-lt"/>
+                <a:cs typeface="+mn-lt"/>
+              </a:rPr>
+              <a:t>S&amp;P</a:t>
+            </a:r>
+            <a:r>
+              <a:rPr lang="it-IT" sz="900">
+                <a:ea typeface="+mn-lt"/>
+                <a:cs typeface="+mn-lt"/>
+              </a:rPr>
+              <a:t>, May 2021. </a:t>
+            </a:r>
+            <a:r>
+              <a:rPr lang="it-IT" sz="900" i="1">
+                <a:ea typeface="+mn-lt"/>
+                <a:cs typeface="+mn-lt"/>
+              </a:rPr>
+              <a:t>Intel Bounty Reward</a:t>
+            </a:r>
+            <a:endParaRPr lang="it-IT"/>
+          </a:p>
+        </p:txBody>
+      </p:sp>
+      <p:sp>
+        <p:nvSpPr>
+          <p:cNvPr id="7" name="CasellaDiTesto 6">
+            <a:extLst>
+              <a:ext uri="{FF2B5EF4-FFF2-40B4-BE49-F238E27FC236}">
+                <a16:creationId xmlns:a16="http://schemas.microsoft.com/office/drawing/2014/main" id="{B231F0D1-9F1C-4EB6-B5DB-231E64B50409}"/>
+              </a:ext>
+            </a:extLst>
+          </p:cNvPr>
+          <p:cNvSpPr txBox="1"/>
+          <p:nvPr/>
+        </p:nvSpPr>
+        <p:spPr>
+          <a:xfrm>
+            <a:off x="5485640" y="1203474"/>
+            <a:ext cx="3827725" cy="1200329"/>
+          </a:xfrm>
+          <a:prstGeom prst="rect">
+            <a:avLst/>
+          </a:prstGeom>
+          <a:noFill/>
+        </p:spPr>
+        <p:txBody>
+          <a:bodyPr rot="0" spcFirstLastPara="0" vertOverflow="overflow" horzOverflow="overflow" vert="horz" wrap="square" lIns="91440" tIns="45720" rIns="91440" bIns="45720" numCol="1" spcCol="0" rtlCol="0" fromWordArt="0" anchor="t" anchorCtr="0" forceAA="0" compatLnSpc="1">
+            <a:prstTxWarp prst="textNoShape">
+              <a:avLst/>
+            </a:prstTxWarp>
+            <a:spAutoFit/>
+          </a:bodyPr>
+          <a:lstStyle/>
+          <a:p>
+            <a:r>
+              <a:rPr lang="it-IT" dirty="0"/>
+              <a:t>Exploiting RIDL capabilities of reading </a:t>
+            </a:r>
+            <a:r>
+              <a:rPr lang="en-US" dirty="0">
+                <a:cs typeface="Arial"/>
+              </a:rPr>
+              <a:t>µ-</a:t>
+            </a:r>
+            <a:r>
+              <a:rPr lang="it-IT" dirty="0">
+                <a:cs typeface="Arial"/>
+              </a:rPr>
+              <a:t>architectural buffers It's possible to leak the deep </a:t>
+            </a:r>
+            <a:r>
+              <a:rPr lang="it-IT">
+                <a:cs typeface="Arial"/>
+              </a:rPr>
+              <a:t>impementation of instructions</a:t>
+            </a:r>
+          </a:p>
+        </p:txBody>
+      </p:sp>
+      <p:sp>
+        <p:nvSpPr>
+          <p:cNvPr id="8" name="CasellaDiTesto 7">
+            <a:extLst>
+              <a:ext uri="{FF2B5EF4-FFF2-40B4-BE49-F238E27FC236}">
+                <a16:creationId xmlns:a16="http://schemas.microsoft.com/office/drawing/2014/main" id="{43DB191F-AA8A-4722-8396-3CF7625044AB}"/>
+              </a:ext>
+            </a:extLst>
+          </p:cNvPr>
+          <p:cNvSpPr txBox="1"/>
+          <p:nvPr/>
+        </p:nvSpPr>
+        <p:spPr>
+          <a:xfrm>
+            <a:off x="5618206" y="2559903"/>
+            <a:ext cx="3827725" cy="646331"/>
+          </a:xfrm>
+          <a:prstGeom prst="rect">
+            <a:avLst/>
+          </a:prstGeom>
+          <a:noFill/>
+        </p:spPr>
+        <p:txBody>
+          <a:bodyPr rot="0" spcFirstLastPara="0" vertOverflow="overflow" horzOverflow="overflow" vert="horz" wrap="square" lIns="91440" tIns="45720" rIns="91440" bIns="45720" numCol="1" spcCol="0" rtlCol="0" fromWordArt="0" anchor="t" anchorCtr="0" forceAA="0" compatLnSpc="1">
+            <a:prstTxWarp prst="textNoShape">
+              <a:avLst/>
+            </a:prstTxWarp>
+            <a:spAutoFit/>
+          </a:bodyPr>
+          <a:lstStyle/>
+          <a:p>
+            <a:r>
+              <a:rPr lang="it-IT">
+                <a:solidFill>
+                  <a:srgbClr val="0070C0"/>
+                </a:solidFill>
+                <a:latin typeface="Courier New"/>
+              </a:rPr>
+              <a:t>CPUID RDRANDR RDSEED CLFLUSH RDMSR</a:t>
+            </a:r>
+          </a:p>
+        </p:txBody>
+      </p:sp>
+      <p:sp>
+        <p:nvSpPr>
+          <p:cNvPr id="9" name="CasellaDiTesto 8">
+            <a:extLst>
+              <a:ext uri="{FF2B5EF4-FFF2-40B4-BE49-F238E27FC236}">
+                <a16:creationId xmlns:a16="http://schemas.microsoft.com/office/drawing/2014/main" id="{1EF783C6-928A-48ED-8293-F2DA8A982D8E}"/>
+              </a:ext>
+            </a:extLst>
+          </p:cNvPr>
+          <p:cNvSpPr txBox="1"/>
+          <p:nvPr/>
+        </p:nvSpPr>
+        <p:spPr>
+          <a:xfrm>
+            <a:off x="5488151" y="3396582"/>
+            <a:ext cx="3726295" cy="1200329"/>
+          </a:xfrm>
+          <a:prstGeom prst="rect">
+            <a:avLst/>
+          </a:prstGeom>
+          <a:noFill/>
+        </p:spPr>
+        <p:txBody>
+          <a:bodyPr rot="0" spcFirstLastPara="0" vertOverflow="overflow" horzOverflow="overflow" vert="horz" wrap="square" lIns="91440" tIns="45720" rIns="91440" bIns="45720" numCol="1" spcCol="0" rtlCol="0" fromWordArt="0" anchor="t" anchorCtr="0" forceAA="0" compatLnSpc="1">
+            <a:prstTxWarp prst="textNoShape">
+              <a:avLst/>
+            </a:prstTxWarp>
+            <a:spAutoFit/>
+          </a:bodyPr>
+          <a:lstStyle/>
+          <a:p>
+            <a:r>
+              <a:rPr lang="it-IT"/>
+              <a:t>We are intrested in:</a:t>
+            </a:r>
+            <a:endParaRPr lang="it-IT" dirty="0"/>
+          </a:p>
+          <a:p>
+            <a:pPr marL="285750" indent="-285750">
+              <a:buFont typeface="Arial"/>
+              <a:buChar char="•"/>
+            </a:pPr>
+            <a:r>
+              <a:rPr lang="it-IT"/>
+              <a:t>OFFCORE_REQUESTS</a:t>
+            </a:r>
+          </a:p>
+          <a:p>
+            <a:pPr marL="285750" indent="-285750">
+              <a:buFont typeface="Arial"/>
+              <a:buChar char="•"/>
+            </a:pPr>
+            <a:r>
+              <a:rPr lang="it-IT"/>
+              <a:t>OFFCORE_RESPONSE</a:t>
+            </a:r>
+          </a:p>
+          <a:p>
+            <a:pPr marL="285750" indent="-285750">
+              <a:buFont typeface="Arial"/>
+              <a:buChar char="•"/>
+            </a:pPr>
+            <a:r>
+              <a:rPr lang="it-IT"/>
+              <a:t>buffers flush</a:t>
+            </a:r>
+          </a:p>
+        </p:txBody>
+      </p:sp>
+    </p:spTree>
+    <p:extLst>
+      <p:ext uri="{BB962C8B-B14F-4D97-AF65-F5344CB8AC3E}">
+        <p14:creationId xmlns:p14="http://schemas.microsoft.com/office/powerpoint/2010/main" val="1022340156"/>
+      </p:ext>
+    </p:extLst>
+  </p:cSld>
+  <p:clrMapOvr>
+    <a:masterClrMapping/>
+  </p:clrMapOvr>
+</p:sld>
+</file>
+
+<file path=ppt/slides/slide8.xml><?xml version="1.0" encoding="utf-8"?>
+<p:sld xmlns:a="http://schemas.openxmlformats.org/drawingml/2006/main" xmlns:r="http://schemas.openxmlformats.org/officeDocument/2006/relationships" xmlns:p="http://schemas.openxmlformats.org/presentationml/2006/main">
+  <p:cSld>
+    <p:spTree>
+      <p:nvGrpSpPr>
+        <p:cNvPr id="1" name=""/>
+        <p:cNvGrpSpPr/>
+        <p:nvPr/>
+      </p:nvGrpSpPr>
+      <p:grpSpPr>
+        <a:xfrm>
+          <a:off x="0" y="0"/>
+          <a:ext cx="0" cy="0"/>
+          <a:chOff x="0" y="0"/>
+          <a:chExt cx="0" cy="0"/>
+        </a:xfrm>
+      </p:grpSpPr>
+      <p:sp>
+        <p:nvSpPr>
+          <p:cNvPr id="2" name="Titolo 1">
+            <a:extLst>
+              <a:ext uri="{FF2B5EF4-FFF2-40B4-BE49-F238E27FC236}">
+                <a16:creationId xmlns:a16="http://schemas.microsoft.com/office/drawing/2014/main" id="{94268F50-F0C5-441A-8CAE-428176067F16}"/>
+              </a:ext>
+            </a:extLst>
+          </p:cNvPr>
+          <p:cNvSpPr>
+            <a:spLocks noGrp="1"/>
+          </p:cNvSpPr>
+          <p:nvPr>
+            <p:ph type="title"/>
+          </p:nvPr>
+        </p:nvSpPr>
+        <p:spPr/>
+        <p:txBody>
+          <a:bodyPr/>
+          <a:lstStyle/>
+          <a:p>
+            <a:pPr algn="ctr"/>
+            <a:r>
+              <a:rPr lang="it-IT"/>
+              <a:t>CrossTalk: The shared buffer</a:t>
+            </a:r>
+          </a:p>
+        </p:txBody>
+      </p:sp>
+      <p:pic>
+        <p:nvPicPr>
+          <p:cNvPr id="3" name="Immagine 3" descr="Immagine che contiene testo, segnale, screenshot&#10;&#10;Descrizione generata automaticamente">
+            <a:extLst>
+              <a:ext uri="{FF2B5EF4-FFF2-40B4-BE49-F238E27FC236}">
+                <a16:creationId xmlns:a16="http://schemas.microsoft.com/office/drawing/2014/main" id="{5B50A368-3CBA-45A1-A7FB-8BB3ED79C6BF}"/>
+              </a:ext>
+            </a:extLst>
+          </p:cNvPr>
+          <p:cNvPicPr>
+            <a:picLocks noChangeAspect="1"/>
+          </p:cNvPicPr>
+          <p:nvPr/>
+        </p:nvPicPr>
+        <p:blipFill>
+          <a:blip r:embed="rId2"/>
+          <a:stretch>
+            <a:fillRect/>
+          </a:stretch>
+        </p:blipFill>
+        <p:spPr>
+          <a:xfrm>
+            <a:off x="915574" y="1857861"/>
+            <a:ext cx="4249899" cy="2466647"/>
+          </a:xfrm>
+          <a:prstGeom prst="rect">
+            <a:avLst/>
+          </a:prstGeom>
+        </p:spPr>
+      </p:pic>
+      <p:sp>
+        <p:nvSpPr>
+          <p:cNvPr id="5" name="CasellaDiTesto 4">
+            <a:extLst>
+              <a:ext uri="{FF2B5EF4-FFF2-40B4-BE49-F238E27FC236}">
+                <a16:creationId xmlns:a16="http://schemas.microsoft.com/office/drawing/2014/main" id="{4C27AA58-531E-4085-948E-A2F026AE4E15}"/>
+              </a:ext>
+            </a:extLst>
+          </p:cNvPr>
+          <p:cNvSpPr txBox="1"/>
+          <p:nvPr/>
+        </p:nvSpPr>
+        <p:spPr>
+          <a:xfrm>
+            <a:off x="502736" y="5023300"/>
+            <a:ext cx="9500026" cy="230832"/>
+          </a:xfrm>
+          <a:prstGeom prst="rect">
+            <a:avLst/>
+          </a:prstGeom>
+          <a:noFill/>
+        </p:spPr>
+        <p:txBody>
+          <a:bodyPr rot="0" spcFirstLastPara="0" vertOverflow="overflow" horzOverflow="overflow" vert="horz" wrap="square" lIns="91440" tIns="45720" rIns="91440" bIns="45720" numCol="1" spcCol="0" rtlCol="0" fromWordArt="0" anchor="t" anchorCtr="0" forceAA="0" compatLnSpc="1">
+            <a:prstTxWarp prst="textNoShape">
+              <a:avLst/>
+            </a:prstTxWarp>
+            <a:spAutoFit/>
+          </a:bodyPr>
+          <a:lstStyle/>
+          <a:p>
+            <a:r>
+              <a:rPr lang="it-IT" sz="900" b="1" dirty="0">
+                <a:ea typeface="+mn-lt"/>
+                <a:cs typeface="+mn-lt"/>
+                <a:hlinkClick r:id="rId3"/>
+              </a:rPr>
+              <a:t>CrossTalk: Speculative Data Leaks Across Cores Are Real. </a:t>
+            </a:r>
+            <a:r>
+              <a:rPr lang="it-IT" sz="900">
+                <a:ea typeface="+mn-lt"/>
+                <a:cs typeface="+mn-lt"/>
+              </a:rPr>
+              <a:t>Ragab, H.; Milburn, A.; </a:t>
+            </a:r>
+            <a:r>
+              <a:rPr lang="it-IT" sz="900" dirty="0">
+                <a:ea typeface="+mn-lt"/>
+                <a:cs typeface="+mn-lt"/>
+                <a:hlinkClick r:id="rId4"/>
+              </a:rPr>
+              <a:t>Razavi, K.</a:t>
+            </a:r>
+            <a:r>
+              <a:rPr lang="it-IT" sz="900">
+                <a:ea typeface="+mn-lt"/>
+                <a:cs typeface="+mn-lt"/>
+              </a:rPr>
+              <a:t>; </a:t>
+            </a:r>
+            <a:r>
+              <a:rPr lang="it-IT" sz="900" dirty="0">
+                <a:ea typeface="+mn-lt"/>
+                <a:cs typeface="+mn-lt"/>
+                <a:hlinkClick r:id="rId5"/>
+              </a:rPr>
+              <a:t>Bos, H.</a:t>
+            </a:r>
+            <a:r>
+              <a:rPr lang="it-IT" sz="900">
+                <a:ea typeface="+mn-lt"/>
+                <a:cs typeface="+mn-lt"/>
+              </a:rPr>
+              <a:t>; and </a:t>
+            </a:r>
+            <a:r>
+              <a:rPr lang="it-IT" sz="900" dirty="0">
+                <a:ea typeface="+mn-lt"/>
+                <a:cs typeface="+mn-lt"/>
+                <a:hlinkClick r:id="rId6"/>
+              </a:rPr>
+              <a:t>Giuffrida, C.</a:t>
+            </a:r>
+            <a:r>
+              <a:rPr lang="it-IT" sz="900">
+                <a:ea typeface="+mn-lt"/>
+                <a:cs typeface="+mn-lt"/>
+              </a:rPr>
+              <a:t> In </a:t>
+            </a:r>
+            <a:r>
+              <a:rPr lang="it-IT" sz="900" i="1">
+                <a:ea typeface="+mn-lt"/>
+                <a:cs typeface="+mn-lt"/>
+              </a:rPr>
+              <a:t>S&amp;P</a:t>
+            </a:r>
+            <a:r>
+              <a:rPr lang="it-IT" sz="900">
+                <a:ea typeface="+mn-lt"/>
+                <a:cs typeface="+mn-lt"/>
+              </a:rPr>
+              <a:t>, May 2021. </a:t>
+            </a:r>
+            <a:r>
+              <a:rPr lang="it-IT" sz="900" i="1">
+                <a:ea typeface="+mn-lt"/>
+                <a:cs typeface="+mn-lt"/>
+              </a:rPr>
+              <a:t>Intel Bounty Reward</a:t>
+            </a:r>
+            <a:endParaRPr lang="it-IT"/>
+          </a:p>
+        </p:txBody>
+      </p:sp>
+      <p:sp>
+        <p:nvSpPr>
+          <p:cNvPr id="6" name="CasellaDiTesto 5">
+            <a:extLst>
+              <a:ext uri="{FF2B5EF4-FFF2-40B4-BE49-F238E27FC236}">
+                <a16:creationId xmlns:a16="http://schemas.microsoft.com/office/drawing/2014/main" id="{6FE9F8CB-B62D-4EBE-9881-CBAE7D721326}"/>
+              </a:ext>
+            </a:extLst>
+          </p:cNvPr>
+          <p:cNvSpPr txBox="1"/>
+          <p:nvPr/>
+        </p:nvSpPr>
+        <p:spPr>
+          <a:xfrm>
+            <a:off x="502735" y="1195677"/>
+            <a:ext cx="4974668" cy="369332"/>
+          </a:xfrm>
+          <a:prstGeom prst="rect">
+            <a:avLst/>
+          </a:prstGeom>
+          <a:noFill/>
+        </p:spPr>
+        <p:txBody>
+          <a:bodyPr rot="0" spcFirstLastPara="0" vertOverflow="overflow" horzOverflow="overflow" vert="horz" wrap="square" lIns="91440" tIns="45720" rIns="91440" bIns="45720" numCol="1" spcCol="0" rtlCol="0" fromWordArt="0" anchor="t" anchorCtr="0" forceAA="0" compatLnSpc="1">
+            <a:prstTxWarp prst="textNoShape">
+              <a:avLst/>
+            </a:prstTxWarp>
+            <a:spAutoFit/>
+          </a:bodyPr>
+          <a:lstStyle/>
+          <a:p>
+            <a:r>
+              <a:rPr lang="it-IT"/>
+              <a:t>The </a:t>
+            </a:r>
+            <a:r>
+              <a:rPr lang="it-IT" b="1"/>
+              <a:t>Staging Buffer</a:t>
+            </a:r>
+            <a:r>
+              <a:rPr lang="it-IT"/>
+              <a:t> is </a:t>
+            </a:r>
+            <a:r>
+              <a:rPr lang="it-IT" b="1"/>
+              <a:t>Shared </a:t>
+            </a:r>
+            <a:r>
+              <a:rPr lang="it-IT"/>
+              <a:t>among all cores</a:t>
+            </a:r>
+            <a:endParaRPr lang="it-IT" dirty="0"/>
+          </a:p>
+        </p:txBody>
+      </p:sp>
+      <p:sp>
+        <p:nvSpPr>
+          <p:cNvPr id="7" name="CasellaDiTesto 6">
+            <a:extLst>
+              <a:ext uri="{FF2B5EF4-FFF2-40B4-BE49-F238E27FC236}">
+                <a16:creationId xmlns:a16="http://schemas.microsoft.com/office/drawing/2014/main" id="{1C4E6465-3C45-41F4-BE07-B11203BAD4A3}"/>
+              </a:ext>
+            </a:extLst>
+          </p:cNvPr>
+          <p:cNvSpPr txBox="1"/>
+          <p:nvPr/>
+        </p:nvSpPr>
+        <p:spPr>
+          <a:xfrm>
+            <a:off x="5698400" y="1307370"/>
+            <a:ext cx="4124213" cy="2949525"/>
+          </a:xfrm>
+          <a:prstGeom prst="rect">
+            <a:avLst/>
+          </a:prstGeom>
+          <a:noFill/>
+          <a:ln>
+            <a:solidFill>
+              <a:schemeClr val="tx1"/>
+            </a:solidFill>
+          </a:ln>
+        </p:spPr>
+        <p:txBody>
+          <a:bodyPr rot="0" spcFirstLastPara="0" vertOverflow="overflow" horzOverflow="overflow" vert="horz" wrap="square" lIns="91440" tIns="45720" rIns="91440" bIns="45720" numCol="1" spcCol="0" rtlCol="0" fromWordArt="0" anchor="t" anchorCtr="0" forceAA="0" compatLnSpc="1">
+            <a:prstTxWarp prst="textNoShape">
+              <a:avLst/>
+            </a:prstTxWarp>
+            <a:spAutoFit/>
+          </a:bodyPr>
+          <a:lstStyle/>
+          <a:p>
+            <a:pPr>
+              <a:lnSpc>
+                <a:spcPct val="150000"/>
+              </a:lnSpc>
+            </a:pPr>
+            <a:r>
+              <a:rPr lang="it-IT"/>
+              <a:t>The Staging Buffer is </a:t>
+            </a:r>
+            <a:r>
+              <a:rPr lang="it-IT" dirty="0"/>
+              <a:t>used to store pending request to unique (shared) resources like the </a:t>
+            </a:r>
+            <a:r>
+              <a:rPr lang="it-IT" u="sng" dirty="0"/>
+              <a:t>Random Number Generator</a:t>
+            </a:r>
+            <a:r>
+              <a:rPr lang="it-IT" dirty="0"/>
+              <a:t>; for optimization purpose </a:t>
+            </a:r>
+            <a:r>
+              <a:rPr lang="it-IT"/>
+              <a:t>this buffer is able to aggregate</a:t>
+            </a:r>
+          </a:p>
+          <a:p>
+            <a:pPr>
+              <a:lnSpc>
+                <a:spcPct val="150000"/>
+              </a:lnSpc>
+            </a:pPr>
+            <a:r>
+              <a:rPr lang="en-US" dirty="0">
+                <a:ea typeface="+mn-lt"/>
+                <a:cs typeface="+mn-lt"/>
+              </a:rPr>
+              <a:t>µ-operations </a:t>
+            </a:r>
+            <a:r>
+              <a:rPr lang="en-US" b="1" dirty="0">
+                <a:ea typeface="+mn-lt"/>
+                <a:cs typeface="+mn-lt"/>
+              </a:rPr>
+              <a:t>delivering unrequested </a:t>
+            </a:r>
+            <a:r>
+              <a:rPr lang="en-US" b="1">
+                <a:ea typeface="+mn-lt"/>
+                <a:cs typeface="+mn-lt"/>
+              </a:rPr>
+              <a:t>data to ALL cores LFB</a:t>
+            </a:r>
+            <a:endParaRPr lang="it-IT" b="1"/>
+          </a:p>
+        </p:txBody>
+      </p:sp>
+      <p:sp>
+        <p:nvSpPr>
+          <p:cNvPr id="8" name="CasellaDiTesto 7">
+            <a:extLst>
+              <a:ext uri="{FF2B5EF4-FFF2-40B4-BE49-F238E27FC236}">
+                <a16:creationId xmlns:a16="http://schemas.microsoft.com/office/drawing/2014/main" id="{D005A614-7793-46D4-97D7-595485FD3F99}"/>
+              </a:ext>
+            </a:extLst>
+          </p:cNvPr>
+          <p:cNvSpPr txBox="1"/>
+          <p:nvPr/>
+        </p:nvSpPr>
+        <p:spPr>
+          <a:xfrm>
+            <a:off x="502535" y="4532178"/>
+            <a:ext cx="6979869" cy="369332"/>
+          </a:xfrm>
+          <a:prstGeom prst="rect">
+            <a:avLst/>
+          </a:prstGeom>
+          <a:noFill/>
+        </p:spPr>
+        <p:txBody>
+          <a:bodyPr rot="0" spcFirstLastPara="0" vertOverflow="overflow" horzOverflow="overflow" vert="horz" wrap="square" lIns="91440" tIns="45720" rIns="91440" bIns="45720" numCol="1" spcCol="0" rtlCol="0" fromWordArt="0" anchor="t" anchorCtr="0" forceAA="0" compatLnSpc="1">
+            <a:prstTxWarp prst="textNoShape">
+              <a:avLst/>
+            </a:prstTxWarp>
+            <a:spAutoFit/>
+          </a:bodyPr>
+          <a:lstStyle/>
+          <a:p>
+            <a:r>
+              <a:rPr lang="it-IT"/>
+              <a:t>Note that the interconnection mechanis is (probably) asincronous</a:t>
+            </a:r>
+            <a:endParaRPr lang="it-IT" dirty="0"/>
+          </a:p>
+        </p:txBody>
+      </p:sp>
+    </p:spTree>
+    <p:extLst>
+      <p:ext uri="{BB962C8B-B14F-4D97-AF65-F5344CB8AC3E}">
+        <p14:creationId xmlns:p14="http://schemas.microsoft.com/office/powerpoint/2010/main" val="3268854216"/>
+      </p:ext>
+    </p:extLst>
+  </p:cSld>
+  <p:clrMapOvr>
+    <a:masterClrMapping/>
+  </p:clrMapOvr>
+</p:sld>
+</file>
+
+<file path=ppt/slides/slide9.xml><?xml version="1.0" encoding="utf-8"?>
+<p:sld xmlns:a="http://schemas.openxmlformats.org/drawingml/2006/main" xmlns:r="http://schemas.openxmlformats.org/officeDocument/2006/relationships" xmlns:p="http://schemas.openxmlformats.org/presentationml/2006/main">
+  <p:cSld>
+    <p:spTree>
+      <p:nvGrpSpPr>
+        <p:cNvPr id="1" name=""/>
+        <p:cNvGrpSpPr/>
+        <p:nvPr/>
+      </p:nvGrpSpPr>
+      <p:grpSpPr>
+        <a:xfrm>
+          <a:off x="0" y="0"/>
+          <a:ext cx="0" cy="0"/>
+          <a:chOff x="0" y="0"/>
+          <a:chExt cx="0" cy="0"/>
+        </a:xfrm>
+      </p:grpSpPr>
+      <p:sp>
+        <p:nvSpPr>
+          <p:cNvPr id="2" name="Titolo 1">
+            <a:extLst>
+              <a:ext uri="{FF2B5EF4-FFF2-40B4-BE49-F238E27FC236}">
+                <a16:creationId xmlns:a16="http://schemas.microsoft.com/office/drawing/2014/main" id="{D382F5F8-E1D7-4F34-B89A-AD493B2EE019}"/>
+              </a:ext>
+            </a:extLst>
+          </p:cNvPr>
+          <p:cNvSpPr>
+            <a:spLocks noGrp="1"/>
+          </p:cNvSpPr>
+          <p:nvPr>
+            <p:ph type="title"/>
+          </p:nvPr>
+        </p:nvSpPr>
+        <p:spPr/>
+        <p:txBody>
+          <a:bodyPr/>
+          <a:lstStyle/>
+          <a:p>
+            <a:pPr algn="ctr"/>
+            <a:r>
+              <a:rPr lang="it-IT"/>
+              <a:t>CrossTalk (in action)</a:t>
+            </a:r>
+          </a:p>
+        </p:txBody>
+      </p:sp>
+      <p:pic>
+        <p:nvPicPr>
+          <p:cNvPr id="3" name="Immagine 3">
+            <a:extLst>
+              <a:ext uri="{FF2B5EF4-FFF2-40B4-BE49-F238E27FC236}">
+                <a16:creationId xmlns:a16="http://schemas.microsoft.com/office/drawing/2014/main" id="{727D7C9D-68FC-4017-B566-7BA9E12BAD2C}"/>
+              </a:ext>
+            </a:extLst>
+          </p:cNvPr>
+          <p:cNvPicPr>
+            <a:picLocks noChangeAspect="1"/>
+          </p:cNvPicPr>
+          <p:nvPr/>
+        </p:nvPicPr>
+        <p:blipFill>
+          <a:blip r:embed="rId2"/>
+          <a:stretch>
+            <a:fillRect/>
+          </a:stretch>
+        </p:blipFill>
+        <p:spPr>
+          <a:xfrm>
+            <a:off x="1336664" y="1168906"/>
+            <a:ext cx="7175777" cy="3775217"/>
+          </a:xfrm>
+          <a:prstGeom prst="rect">
+            <a:avLst/>
+          </a:prstGeom>
+        </p:spPr>
+      </p:pic>
+      <p:sp>
+        <p:nvSpPr>
+          <p:cNvPr id="6" name="CasellaDiTesto 5">
+            <a:extLst>
+              <a:ext uri="{FF2B5EF4-FFF2-40B4-BE49-F238E27FC236}">
+                <a16:creationId xmlns:a16="http://schemas.microsoft.com/office/drawing/2014/main" id="{90FBD9BC-7279-4594-976F-1EED8C5D08F4}"/>
+              </a:ext>
+            </a:extLst>
+          </p:cNvPr>
+          <p:cNvSpPr txBox="1"/>
+          <p:nvPr/>
+        </p:nvSpPr>
+        <p:spPr>
+          <a:xfrm>
+            <a:off x="471544" y="5116847"/>
+            <a:ext cx="9500026" cy="230832"/>
+          </a:xfrm>
+          <a:prstGeom prst="rect">
+            <a:avLst/>
+          </a:prstGeom>
+          <a:noFill/>
+        </p:spPr>
+        <p:txBody>
+          <a:bodyPr rot="0" spcFirstLastPara="0" vertOverflow="overflow" horzOverflow="overflow" vert="horz" wrap="square" lIns="91440" tIns="45720" rIns="91440" bIns="45720" numCol="1" spcCol="0" rtlCol="0" fromWordArt="0" anchor="t" anchorCtr="0" forceAA="0" compatLnSpc="1">
+            <a:prstTxWarp prst="textNoShape">
+              <a:avLst/>
+            </a:prstTxWarp>
+            <a:spAutoFit/>
+          </a:bodyPr>
+          <a:lstStyle/>
+          <a:p>
+            <a:r>
+              <a:rPr lang="it-IT" sz="900" b="1" dirty="0">
+                <a:ea typeface="+mn-lt"/>
+                <a:cs typeface="+mn-lt"/>
+                <a:hlinkClick r:id="rId3"/>
+              </a:rPr>
+              <a:t>CrossTalk: Speculative Data Leaks Across Cores Are Real. </a:t>
+            </a:r>
+            <a:r>
+              <a:rPr lang="it-IT" sz="900">
+                <a:ea typeface="+mn-lt"/>
+                <a:cs typeface="+mn-lt"/>
+              </a:rPr>
+              <a:t>Ragab, H.; Milburn, A.; </a:t>
+            </a:r>
+            <a:r>
+              <a:rPr lang="it-IT" sz="900" dirty="0">
+                <a:ea typeface="+mn-lt"/>
+                <a:cs typeface="+mn-lt"/>
+                <a:hlinkClick r:id="rId4"/>
+              </a:rPr>
+              <a:t>Razavi, K.</a:t>
+            </a:r>
+            <a:r>
+              <a:rPr lang="it-IT" sz="900">
+                <a:ea typeface="+mn-lt"/>
+                <a:cs typeface="+mn-lt"/>
+              </a:rPr>
+              <a:t>; </a:t>
+            </a:r>
+            <a:r>
+              <a:rPr lang="it-IT" sz="900" dirty="0">
+                <a:ea typeface="+mn-lt"/>
+                <a:cs typeface="+mn-lt"/>
+                <a:hlinkClick r:id="rId5"/>
+              </a:rPr>
+              <a:t>Bos, H.</a:t>
+            </a:r>
+            <a:r>
+              <a:rPr lang="it-IT" sz="900">
+                <a:ea typeface="+mn-lt"/>
+                <a:cs typeface="+mn-lt"/>
+              </a:rPr>
+              <a:t>; and </a:t>
+            </a:r>
+            <a:r>
+              <a:rPr lang="it-IT" sz="900" dirty="0">
+                <a:ea typeface="+mn-lt"/>
+                <a:cs typeface="+mn-lt"/>
+                <a:hlinkClick r:id="rId6"/>
+              </a:rPr>
+              <a:t>Giuffrida, C.</a:t>
+            </a:r>
+            <a:r>
+              <a:rPr lang="it-IT" sz="900">
+                <a:ea typeface="+mn-lt"/>
+                <a:cs typeface="+mn-lt"/>
+              </a:rPr>
+              <a:t> In </a:t>
+            </a:r>
+            <a:r>
+              <a:rPr lang="it-IT" sz="900" i="1">
+                <a:ea typeface="+mn-lt"/>
+                <a:cs typeface="+mn-lt"/>
+              </a:rPr>
+              <a:t>S&amp;P</a:t>
+            </a:r>
+            <a:r>
+              <a:rPr lang="it-IT" sz="900">
+                <a:ea typeface="+mn-lt"/>
+                <a:cs typeface="+mn-lt"/>
+              </a:rPr>
+              <a:t>, May 2021. </a:t>
+            </a:r>
+            <a:r>
+              <a:rPr lang="it-IT" sz="900" i="1">
+                <a:ea typeface="+mn-lt"/>
+                <a:cs typeface="+mn-lt"/>
+              </a:rPr>
+              <a:t>Intel Bounty Reward</a:t>
+            </a:r>
+            <a:endParaRPr lang="it-IT"/>
+          </a:p>
+        </p:txBody>
+      </p:sp>
+    </p:spTree>
+    <p:extLst>
+      <p:ext uri="{BB962C8B-B14F-4D97-AF65-F5344CB8AC3E}">
+        <p14:creationId xmlns:p14="http://schemas.microsoft.com/office/powerpoint/2010/main" val="3713387626"/>
+      </p:ext>
+    </p:extLst>
+  </p:cSld>
+  <p:clrMapOvr>
+    <a:masterClrMapping/>
+  </p:clrMapOvr>
 </p:sld>
 </file>
 
@@ -2279,31 +5096,31 @@
         <a:sysClr val="window" lastClr="FFFFFF"/>
       </a:lt1>
       <a:dk2>
-        <a:srgbClr val="1f497d"/>
+        <a:srgbClr val="1F497D"/>
       </a:dk2>
       <a:lt2>
-        <a:srgbClr val="eeece1"/>
+        <a:srgbClr val="EEECE1"/>
       </a:lt2>
       <a:accent1>
-        <a:srgbClr val="4f81bd"/>
+        <a:srgbClr val="4F81BD"/>
       </a:accent1>
       <a:accent2>
-        <a:srgbClr val="c0504d"/>
+        <a:srgbClr val="C0504D"/>
       </a:accent2>
       <a:accent3>
-        <a:srgbClr val="9bbb59"/>
+        <a:srgbClr val="9BBB59"/>
       </a:accent3>
       <a:accent4>
-        <a:srgbClr val="8064a2"/>
+        <a:srgbClr val="8064A2"/>
       </a:accent4>
       <a:accent5>
-        <a:srgbClr val="4bacc6"/>
+        <a:srgbClr val="4BACC6"/>
       </a:accent5>
       <a:accent6>
-        <a:srgbClr val="f79646"/>
+        <a:srgbClr val="F79646"/>
       </a:accent6>
       <a:hlink>
-        <a:srgbClr val="0000ff"/>
+        <a:srgbClr val="0000FF"/>
       </a:hlink>
       <a:folHlink>
         <a:srgbClr val="800080"/>
@@ -2491,5 +5308,7 @@
       </a:bgFillStyleLst>
     </a:fmtScheme>
   </a:themeElements>
+  <a:objectDefaults/>
+  <a:extraClrSchemeLst/>
 </a:theme>
 </file>
</xml_diff>